<commit_message>
intro for pptx checkin
</commit_message>
<xml_diff>
--- a/Research Documents/Thesis/NeuroGazeThesisDefense.pptx
+++ b/Research Documents/Thesis/NeuroGazeThesisDefense.pptx
@@ -7,63 +7,65 @@
     <p:sldMasterId id="2147483766" r:id="rId3"/>
     <p:sldMasterId id="2147483833" r:id="rId4"/>
   </p:sldMasterIdLst>
+  <p:notesMasterIdLst>
+    <p:notesMasterId r:id="rId60"/>
+  </p:notesMasterIdLst>
   <p:sldIdLst>
     <p:sldId id="256" r:id="rId5"/>
     <p:sldId id="280" r:id="rId6"/>
     <p:sldId id="273" r:id="rId7"/>
     <p:sldId id="284" r:id="rId8"/>
     <p:sldId id="290" r:id="rId9"/>
-    <p:sldId id="292" r:id="rId10"/>
-    <p:sldId id="327" r:id="rId11"/>
-    <p:sldId id="326" r:id="rId12"/>
-    <p:sldId id="325" r:id="rId13"/>
-    <p:sldId id="285" r:id="rId14"/>
-    <p:sldId id="293" r:id="rId15"/>
-    <p:sldId id="294" r:id="rId16"/>
-    <p:sldId id="295" r:id="rId17"/>
-    <p:sldId id="296" r:id="rId18"/>
-    <p:sldId id="297" r:id="rId19"/>
-    <p:sldId id="286" r:id="rId20"/>
-    <p:sldId id="298" r:id="rId21"/>
-    <p:sldId id="299" r:id="rId22"/>
-    <p:sldId id="300" r:id="rId23"/>
-    <p:sldId id="301" r:id="rId24"/>
-    <p:sldId id="302" r:id="rId25"/>
-    <p:sldId id="303" r:id="rId26"/>
-    <p:sldId id="304" r:id="rId27"/>
-    <p:sldId id="305" r:id="rId28"/>
-    <p:sldId id="306" r:id="rId29"/>
-    <p:sldId id="307" r:id="rId30"/>
-    <p:sldId id="308" r:id="rId31"/>
-    <p:sldId id="309" r:id="rId32"/>
-    <p:sldId id="310" r:id="rId33"/>
-    <p:sldId id="311" r:id="rId34"/>
-    <p:sldId id="287" r:id="rId35"/>
-    <p:sldId id="312" r:id="rId36"/>
-    <p:sldId id="313" r:id="rId37"/>
-    <p:sldId id="314" r:id="rId38"/>
-    <p:sldId id="315" r:id="rId39"/>
-    <p:sldId id="316" r:id="rId40"/>
-    <p:sldId id="317" r:id="rId41"/>
-    <p:sldId id="318" r:id="rId42"/>
-    <p:sldId id="319" r:id="rId43"/>
-    <p:sldId id="320" r:id="rId44"/>
-    <p:sldId id="288" r:id="rId45"/>
-    <p:sldId id="321" r:id="rId46"/>
-    <p:sldId id="322" r:id="rId47"/>
-    <p:sldId id="323" r:id="rId48"/>
-    <p:sldId id="289" r:id="rId49"/>
-    <p:sldId id="324" r:id="rId50"/>
-    <p:sldId id="259" r:id="rId51"/>
-    <p:sldId id="278" r:id="rId52"/>
-    <p:sldId id="266" r:id="rId53"/>
-    <p:sldId id="265" r:id="rId54"/>
-    <p:sldId id="270" r:id="rId55"/>
-    <p:sldId id="275" r:id="rId56"/>
-    <p:sldId id="276" r:id="rId57"/>
-    <p:sldId id="281" r:id="rId58"/>
-    <p:sldId id="282" r:id="rId59"/>
-    <p:sldId id="283" r:id="rId60"/>
+    <p:sldId id="328" r:id="rId10"/>
+    <p:sldId id="292" r:id="rId11"/>
+    <p:sldId id="327" r:id="rId12"/>
+    <p:sldId id="326" r:id="rId13"/>
+    <p:sldId id="325" r:id="rId14"/>
+    <p:sldId id="285" r:id="rId15"/>
+    <p:sldId id="295" r:id="rId16"/>
+    <p:sldId id="296" r:id="rId17"/>
+    <p:sldId id="297" r:id="rId18"/>
+    <p:sldId id="286" r:id="rId19"/>
+    <p:sldId id="298" r:id="rId20"/>
+    <p:sldId id="299" r:id="rId21"/>
+    <p:sldId id="300" r:id="rId22"/>
+    <p:sldId id="301" r:id="rId23"/>
+    <p:sldId id="302" r:id="rId24"/>
+    <p:sldId id="303" r:id="rId25"/>
+    <p:sldId id="304" r:id="rId26"/>
+    <p:sldId id="305" r:id="rId27"/>
+    <p:sldId id="306" r:id="rId28"/>
+    <p:sldId id="307" r:id="rId29"/>
+    <p:sldId id="308" r:id="rId30"/>
+    <p:sldId id="309" r:id="rId31"/>
+    <p:sldId id="310" r:id="rId32"/>
+    <p:sldId id="311" r:id="rId33"/>
+    <p:sldId id="287" r:id="rId34"/>
+    <p:sldId id="312" r:id="rId35"/>
+    <p:sldId id="313" r:id="rId36"/>
+    <p:sldId id="314" r:id="rId37"/>
+    <p:sldId id="315" r:id="rId38"/>
+    <p:sldId id="316" r:id="rId39"/>
+    <p:sldId id="317" r:id="rId40"/>
+    <p:sldId id="318" r:id="rId41"/>
+    <p:sldId id="319" r:id="rId42"/>
+    <p:sldId id="320" r:id="rId43"/>
+    <p:sldId id="288" r:id="rId44"/>
+    <p:sldId id="321" r:id="rId45"/>
+    <p:sldId id="322" r:id="rId46"/>
+    <p:sldId id="323" r:id="rId47"/>
+    <p:sldId id="289" r:id="rId48"/>
+    <p:sldId id="324" r:id="rId49"/>
+    <p:sldId id="259" r:id="rId50"/>
+    <p:sldId id="278" r:id="rId51"/>
+    <p:sldId id="266" r:id="rId52"/>
+    <p:sldId id="265" r:id="rId53"/>
+    <p:sldId id="270" r:id="rId54"/>
+    <p:sldId id="275" r:id="rId55"/>
+    <p:sldId id="276" r:id="rId56"/>
+    <p:sldId id="281" r:id="rId57"/>
+    <p:sldId id="282" r:id="rId58"/>
+    <p:sldId id="283" r:id="rId59"/>
   </p:sldIdLst>
   <p:sldSz cx="12192000" cy="6858000"/>
   <p:notesSz cx="6858000" cy="9144000"/>
@@ -179,6 +181,1419 @@
     </p:ext>
   </p:extLst>
 </p:presentation>
+</file>
+
+<file path=ppt/notesMasters/notesMaster1.xml><?xml version="1.0" encoding="utf-8"?>
+<p:notesMaster xmlns:a="http://schemas.openxmlformats.org/drawingml/2006/main" xmlns:r="http://schemas.openxmlformats.org/officeDocument/2006/relationships" xmlns:p="http://schemas.openxmlformats.org/presentationml/2006/main">
+  <p:cSld>
+    <p:bg>
+      <p:bgRef idx="1001">
+        <a:schemeClr val="bg1"/>
+      </p:bgRef>
+    </p:bg>
+    <p:spTree>
+      <p:nvGrpSpPr>
+        <p:cNvPr id="1" name=""/>
+        <p:cNvGrpSpPr/>
+        <p:nvPr/>
+      </p:nvGrpSpPr>
+      <p:grpSpPr>
+        <a:xfrm>
+          <a:off x="0" y="0"/>
+          <a:ext cx="0" cy="0"/>
+          <a:chOff x="0" y="0"/>
+          <a:chExt cx="0" cy="0"/>
+        </a:xfrm>
+      </p:grpSpPr>
+      <p:sp>
+        <p:nvSpPr>
+          <p:cNvPr id="2" name="Header Placeholder 1"/>
+          <p:cNvSpPr>
+            <a:spLocks noGrp="1"/>
+          </p:cNvSpPr>
+          <p:nvPr>
+            <p:ph type="hdr" sz="quarter"/>
+          </p:nvPr>
+        </p:nvSpPr>
+        <p:spPr>
+          <a:xfrm>
+            <a:off x="0" y="0"/>
+            <a:ext cx="2971800" cy="458788"/>
+          </a:xfrm>
+          <a:prstGeom prst="rect">
+            <a:avLst/>
+          </a:prstGeom>
+        </p:spPr>
+        <p:txBody>
+          <a:bodyPr vert="horz" lIns="91440" tIns="45720" rIns="91440" bIns="45720" rtlCol="0"/>
+          <a:lstStyle>
+            <a:lvl1pPr algn="l">
+              <a:defRPr sz="1200"/>
+            </a:lvl1pPr>
+          </a:lstStyle>
+          <a:p>
+            <a:endParaRPr lang="en-US"/>
+          </a:p>
+        </p:txBody>
+      </p:sp>
+      <p:sp>
+        <p:nvSpPr>
+          <p:cNvPr id="3" name="Date Placeholder 2"/>
+          <p:cNvSpPr>
+            <a:spLocks noGrp="1"/>
+          </p:cNvSpPr>
+          <p:nvPr>
+            <p:ph type="dt" idx="1"/>
+          </p:nvPr>
+        </p:nvSpPr>
+        <p:spPr>
+          <a:xfrm>
+            <a:off x="3884613" y="0"/>
+            <a:ext cx="2971800" cy="458788"/>
+          </a:xfrm>
+          <a:prstGeom prst="rect">
+            <a:avLst/>
+          </a:prstGeom>
+        </p:spPr>
+        <p:txBody>
+          <a:bodyPr vert="horz" lIns="91440" tIns="45720" rIns="91440" bIns="45720" rtlCol="0"/>
+          <a:lstStyle>
+            <a:lvl1pPr algn="r">
+              <a:defRPr sz="1200"/>
+            </a:lvl1pPr>
+          </a:lstStyle>
+          <a:p>
+            <a:fld id="{714B6D2E-9B08-4FFA-9F70-73D4149E4366}" type="datetimeFigureOut">
+              <a:rPr lang="en-US" smtClean="0"/>
+              <a:t>3/31/2024</a:t>
+            </a:fld>
+            <a:endParaRPr lang="en-US"/>
+          </a:p>
+        </p:txBody>
+      </p:sp>
+      <p:sp>
+        <p:nvSpPr>
+          <p:cNvPr id="4" name="Slide Image Placeholder 3"/>
+          <p:cNvSpPr>
+            <a:spLocks noGrp="1" noRot="1" noChangeAspect="1"/>
+          </p:cNvSpPr>
+          <p:nvPr>
+            <p:ph type="sldImg" idx="2"/>
+          </p:nvPr>
+        </p:nvSpPr>
+        <p:spPr>
+          <a:xfrm>
+            <a:off x="685800" y="1143000"/>
+            <a:ext cx="5486400" cy="3086100"/>
+          </a:xfrm>
+          <a:prstGeom prst="rect">
+            <a:avLst/>
+          </a:prstGeom>
+          <a:noFill/>
+          <a:ln w="12700">
+            <a:solidFill>
+              <a:prstClr val="black"/>
+            </a:solidFill>
+          </a:ln>
+        </p:spPr>
+        <p:txBody>
+          <a:bodyPr vert="horz" lIns="91440" tIns="45720" rIns="91440" bIns="45720" rtlCol="0" anchor="ctr"/>
+          <a:lstStyle/>
+          <a:p>
+            <a:endParaRPr lang="en-US"/>
+          </a:p>
+        </p:txBody>
+      </p:sp>
+      <p:sp>
+        <p:nvSpPr>
+          <p:cNvPr id="5" name="Notes Placeholder 4"/>
+          <p:cNvSpPr>
+            <a:spLocks noGrp="1"/>
+          </p:cNvSpPr>
+          <p:nvPr>
+            <p:ph type="body" sz="quarter" idx="3"/>
+          </p:nvPr>
+        </p:nvSpPr>
+        <p:spPr>
+          <a:xfrm>
+            <a:off x="685800" y="4400550"/>
+            <a:ext cx="5486400" cy="3600450"/>
+          </a:xfrm>
+          <a:prstGeom prst="rect">
+            <a:avLst/>
+          </a:prstGeom>
+        </p:spPr>
+        <p:txBody>
+          <a:bodyPr vert="horz" lIns="91440" tIns="45720" rIns="91440" bIns="45720" rtlCol="0"/>
+          <a:lstStyle/>
+          <a:p>
+            <a:pPr lvl="0"/>
+            <a:r>
+              <a:rPr lang="en-US"/>
+              <a:t>Click to edit Master text styles</a:t>
+            </a:r>
+          </a:p>
+          <a:p>
+            <a:pPr lvl="1"/>
+            <a:r>
+              <a:rPr lang="en-US"/>
+              <a:t>Second level</a:t>
+            </a:r>
+          </a:p>
+          <a:p>
+            <a:pPr lvl="2"/>
+            <a:r>
+              <a:rPr lang="en-US"/>
+              <a:t>Third level</a:t>
+            </a:r>
+          </a:p>
+          <a:p>
+            <a:pPr lvl="3"/>
+            <a:r>
+              <a:rPr lang="en-US"/>
+              <a:t>Fourth level</a:t>
+            </a:r>
+          </a:p>
+          <a:p>
+            <a:pPr lvl="4"/>
+            <a:r>
+              <a:rPr lang="en-US"/>
+              <a:t>Fifth level</a:t>
+            </a:r>
+          </a:p>
+        </p:txBody>
+      </p:sp>
+      <p:sp>
+        <p:nvSpPr>
+          <p:cNvPr id="6" name="Footer Placeholder 5"/>
+          <p:cNvSpPr>
+            <a:spLocks noGrp="1"/>
+          </p:cNvSpPr>
+          <p:nvPr>
+            <p:ph type="ftr" sz="quarter" idx="4"/>
+          </p:nvPr>
+        </p:nvSpPr>
+        <p:spPr>
+          <a:xfrm>
+            <a:off x="0" y="8685213"/>
+            <a:ext cx="2971800" cy="458787"/>
+          </a:xfrm>
+          <a:prstGeom prst="rect">
+            <a:avLst/>
+          </a:prstGeom>
+        </p:spPr>
+        <p:txBody>
+          <a:bodyPr vert="horz" lIns="91440" tIns="45720" rIns="91440" bIns="45720" rtlCol="0" anchor="b"/>
+          <a:lstStyle>
+            <a:lvl1pPr algn="l">
+              <a:defRPr sz="1200"/>
+            </a:lvl1pPr>
+          </a:lstStyle>
+          <a:p>
+            <a:endParaRPr lang="en-US"/>
+          </a:p>
+        </p:txBody>
+      </p:sp>
+      <p:sp>
+        <p:nvSpPr>
+          <p:cNvPr id="7" name="Slide Number Placeholder 6"/>
+          <p:cNvSpPr>
+            <a:spLocks noGrp="1"/>
+          </p:cNvSpPr>
+          <p:nvPr>
+            <p:ph type="sldNum" sz="quarter" idx="5"/>
+          </p:nvPr>
+        </p:nvSpPr>
+        <p:spPr>
+          <a:xfrm>
+            <a:off x="3884613" y="8685213"/>
+            <a:ext cx="2971800" cy="458787"/>
+          </a:xfrm>
+          <a:prstGeom prst="rect">
+            <a:avLst/>
+          </a:prstGeom>
+        </p:spPr>
+        <p:txBody>
+          <a:bodyPr vert="horz" lIns="91440" tIns="45720" rIns="91440" bIns="45720" rtlCol="0" anchor="b"/>
+          <a:lstStyle>
+            <a:lvl1pPr algn="r">
+              <a:defRPr sz="1200"/>
+            </a:lvl1pPr>
+          </a:lstStyle>
+          <a:p>
+            <a:fld id="{3924F813-D057-4535-A701-BD4A321515C7}" type="slidenum">
+              <a:rPr lang="en-US" smtClean="0"/>
+              <a:t>‹#›</a:t>
+            </a:fld>
+            <a:endParaRPr lang="en-US"/>
+          </a:p>
+        </p:txBody>
+      </p:sp>
+    </p:spTree>
+    <p:extLst>
+      <p:ext uri="{BB962C8B-B14F-4D97-AF65-F5344CB8AC3E}">
+        <p14:creationId xmlns:p14="http://schemas.microsoft.com/office/powerpoint/2010/main" val="4198398226"/>
+      </p:ext>
+    </p:extLst>
+  </p:cSld>
+  <p:clrMap bg1="lt1" tx1="dk1" bg2="lt2" tx2="dk2" accent1="accent1" accent2="accent2" accent3="accent3" accent4="accent4" accent5="accent5" accent6="accent6" hlink="hlink" folHlink="folHlink"/>
+  <p:notesStyle>
+    <a:lvl1pPr marL="0" algn="l" defTabSz="914400" rtl="0" eaLnBrk="1" latinLnBrk="0" hangingPunct="1">
+      <a:defRPr sz="1200" kern="1200">
+        <a:solidFill>
+          <a:schemeClr val="tx1"/>
+        </a:solidFill>
+        <a:latin typeface="+mn-lt"/>
+        <a:ea typeface="+mn-ea"/>
+        <a:cs typeface="+mn-cs"/>
+      </a:defRPr>
+    </a:lvl1pPr>
+    <a:lvl2pPr marL="457200" algn="l" defTabSz="914400" rtl="0" eaLnBrk="1" latinLnBrk="0" hangingPunct="1">
+      <a:defRPr sz="1200" kern="1200">
+        <a:solidFill>
+          <a:schemeClr val="tx1"/>
+        </a:solidFill>
+        <a:latin typeface="+mn-lt"/>
+        <a:ea typeface="+mn-ea"/>
+        <a:cs typeface="+mn-cs"/>
+      </a:defRPr>
+    </a:lvl2pPr>
+    <a:lvl3pPr marL="914400" algn="l" defTabSz="914400" rtl="0" eaLnBrk="1" latinLnBrk="0" hangingPunct="1">
+      <a:defRPr sz="1200" kern="1200">
+        <a:solidFill>
+          <a:schemeClr val="tx1"/>
+        </a:solidFill>
+        <a:latin typeface="+mn-lt"/>
+        <a:ea typeface="+mn-ea"/>
+        <a:cs typeface="+mn-cs"/>
+      </a:defRPr>
+    </a:lvl3pPr>
+    <a:lvl4pPr marL="1371600" algn="l" defTabSz="914400" rtl="0" eaLnBrk="1" latinLnBrk="0" hangingPunct="1">
+      <a:defRPr sz="1200" kern="1200">
+        <a:solidFill>
+          <a:schemeClr val="tx1"/>
+        </a:solidFill>
+        <a:latin typeface="+mn-lt"/>
+        <a:ea typeface="+mn-ea"/>
+        <a:cs typeface="+mn-cs"/>
+      </a:defRPr>
+    </a:lvl4pPr>
+    <a:lvl5pPr marL="1828800" algn="l" defTabSz="914400" rtl="0" eaLnBrk="1" latinLnBrk="0" hangingPunct="1">
+      <a:defRPr sz="1200" kern="1200">
+        <a:solidFill>
+          <a:schemeClr val="tx1"/>
+        </a:solidFill>
+        <a:latin typeface="+mn-lt"/>
+        <a:ea typeface="+mn-ea"/>
+        <a:cs typeface="+mn-cs"/>
+      </a:defRPr>
+    </a:lvl5pPr>
+    <a:lvl6pPr marL="2286000" algn="l" defTabSz="914400" rtl="0" eaLnBrk="1" latinLnBrk="0" hangingPunct="1">
+      <a:defRPr sz="1200" kern="1200">
+        <a:solidFill>
+          <a:schemeClr val="tx1"/>
+        </a:solidFill>
+        <a:latin typeface="+mn-lt"/>
+        <a:ea typeface="+mn-ea"/>
+        <a:cs typeface="+mn-cs"/>
+      </a:defRPr>
+    </a:lvl6pPr>
+    <a:lvl7pPr marL="2743200" algn="l" defTabSz="914400" rtl="0" eaLnBrk="1" latinLnBrk="0" hangingPunct="1">
+      <a:defRPr sz="1200" kern="1200">
+        <a:solidFill>
+          <a:schemeClr val="tx1"/>
+        </a:solidFill>
+        <a:latin typeface="+mn-lt"/>
+        <a:ea typeface="+mn-ea"/>
+        <a:cs typeface="+mn-cs"/>
+      </a:defRPr>
+    </a:lvl7pPr>
+    <a:lvl8pPr marL="3200400" algn="l" defTabSz="914400" rtl="0" eaLnBrk="1" latinLnBrk="0" hangingPunct="1">
+      <a:defRPr sz="1200" kern="1200">
+        <a:solidFill>
+          <a:schemeClr val="tx1"/>
+        </a:solidFill>
+        <a:latin typeface="+mn-lt"/>
+        <a:ea typeface="+mn-ea"/>
+        <a:cs typeface="+mn-cs"/>
+      </a:defRPr>
+    </a:lvl8pPr>
+    <a:lvl9pPr marL="3657600" algn="l" defTabSz="914400" rtl="0" eaLnBrk="1" latinLnBrk="0" hangingPunct="1">
+      <a:defRPr sz="1200" kern="1200">
+        <a:solidFill>
+          <a:schemeClr val="tx1"/>
+        </a:solidFill>
+        <a:latin typeface="+mn-lt"/>
+        <a:ea typeface="+mn-ea"/>
+        <a:cs typeface="+mn-cs"/>
+      </a:defRPr>
+    </a:lvl9pPr>
+  </p:notesStyle>
+</p:notesMaster>
+</file>
+
+<file path=ppt/notesSlides/notesSlide1.xml><?xml version="1.0" encoding="utf-8"?>
+<p:notes xmlns:a="http://schemas.openxmlformats.org/drawingml/2006/main" xmlns:r="http://schemas.openxmlformats.org/officeDocument/2006/relationships" xmlns:p="http://schemas.openxmlformats.org/presentationml/2006/main">
+  <p:cSld>
+    <p:spTree>
+      <p:nvGrpSpPr>
+        <p:cNvPr id="1" name=""/>
+        <p:cNvGrpSpPr/>
+        <p:nvPr/>
+      </p:nvGrpSpPr>
+      <p:grpSpPr>
+        <a:xfrm>
+          <a:off x="0" y="0"/>
+          <a:ext cx="0" cy="0"/>
+          <a:chOff x="0" y="0"/>
+          <a:chExt cx="0" cy="0"/>
+        </a:xfrm>
+      </p:grpSpPr>
+      <p:sp>
+        <p:nvSpPr>
+          <p:cNvPr id="2" name="Slide Image Placeholder 1"/>
+          <p:cNvSpPr>
+            <a:spLocks noGrp="1" noRot="1" noChangeAspect="1"/>
+          </p:cNvSpPr>
+          <p:nvPr>
+            <p:ph type="sldImg"/>
+          </p:nvPr>
+        </p:nvSpPr>
+        <p:spPr/>
+      </p:sp>
+      <p:sp>
+        <p:nvSpPr>
+          <p:cNvPr id="3" name="Notes Placeholder 2"/>
+          <p:cNvSpPr>
+            <a:spLocks noGrp="1"/>
+          </p:cNvSpPr>
+          <p:nvPr>
+            <p:ph type="body" idx="1"/>
+          </p:nvPr>
+        </p:nvSpPr>
+        <p:spPr/>
+        <p:txBody>
+          <a:bodyPr/>
+          <a:lstStyle/>
+          <a:p>
+            <a:r>
+              <a:rPr lang="en-US" dirty="0"/>
+              <a:t>test</a:t>
+            </a:r>
+          </a:p>
+        </p:txBody>
+      </p:sp>
+      <p:sp>
+        <p:nvSpPr>
+          <p:cNvPr id="4" name="Slide Number Placeholder 3"/>
+          <p:cNvSpPr>
+            <a:spLocks noGrp="1"/>
+          </p:cNvSpPr>
+          <p:nvPr>
+            <p:ph type="sldNum" sz="quarter" idx="5"/>
+          </p:nvPr>
+        </p:nvSpPr>
+        <p:spPr/>
+        <p:txBody>
+          <a:bodyPr/>
+          <a:lstStyle/>
+          <a:p>
+            <a:fld id="{3924F813-D057-4535-A701-BD4A321515C7}" type="slidenum">
+              <a:rPr lang="en-US" smtClean="0"/>
+              <a:t>1</a:t>
+            </a:fld>
+            <a:endParaRPr lang="en-US"/>
+          </a:p>
+        </p:txBody>
+      </p:sp>
+    </p:spTree>
+    <p:extLst>
+      <p:ext uri="{BB962C8B-B14F-4D97-AF65-F5344CB8AC3E}">
+        <p14:creationId xmlns:p14="http://schemas.microsoft.com/office/powerpoint/2010/main" val="3842306722"/>
+      </p:ext>
+    </p:extLst>
+  </p:cSld>
+  <p:clrMapOvr>
+    <a:masterClrMapping/>
+  </p:clrMapOvr>
+</p:notes>
+</file>
+
+<file path=ppt/notesSlides/notesSlide2.xml><?xml version="1.0" encoding="utf-8"?>
+<p:notes xmlns:a="http://schemas.openxmlformats.org/drawingml/2006/main" xmlns:r="http://schemas.openxmlformats.org/officeDocument/2006/relationships" xmlns:p="http://schemas.openxmlformats.org/presentationml/2006/main">
+  <p:cSld>
+    <p:spTree>
+      <p:nvGrpSpPr>
+        <p:cNvPr id="1" name=""/>
+        <p:cNvGrpSpPr/>
+        <p:nvPr/>
+      </p:nvGrpSpPr>
+      <p:grpSpPr>
+        <a:xfrm>
+          <a:off x="0" y="0"/>
+          <a:ext cx="0" cy="0"/>
+          <a:chOff x="0" y="0"/>
+          <a:chExt cx="0" cy="0"/>
+        </a:xfrm>
+      </p:grpSpPr>
+      <p:sp>
+        <p:nvSpPr>
+          <p:cNvPr id="2" name="Slide Image Placeholder 1"/>
+          <p:cNvSpPr>
+            <a:spLocks noGrp="1" noRot="1" noChangeAspect="1"/>
+          </p:cNvSpPr>
+          <p:nvPr>
+            <p:ph type="sldImg"/>
+          </p:nvPr>
+        </p:nvSpPr>
+        <p:spPr/>
+      </p:sp>
+      <p:sp>
+        <p:nvSpPr>
+          <p:cNvPr id="3" name="Notes Placeholder 2"/>
+          <p:cNvSpPr>
+            <a:spLocks noGrp="1"/>
+          </p:cNvSpPr>
+          <p:nvPr>
+            <p:ph type="body" idx="1"/>
+          </p:nvPr>
+        </p:nvSpPr>
+        <p:spPr/>
+        <p:txBody>
+          <a:bodyPr/>
+          <a:lstStyle/>
+          <a:p>
+            <a:pPr marL="171450" indent="-171450">
+              <a:buFont typeface="Arial" panose="020B0604020202020204" pitchFamily="34" charset="0"/>
+              <a:buChar char="•"/>
+            </a:pPr>
+            <a:endParaRPr lang="en-US" dirty="0"/>
+          </a:p>
+          <a:p>
+            <a:pPr marL="0" indent="0">
+              <a:buFont typeface="Arial" panose="020B0604020202020204" pitchFamily="34" charset="0"/>
+              <a:buNone/>
+            </a:pPr>
+            <a:endParaRPr lang="en-US" dirty="0"/>
+          </a:p>
+        </p:txBody>
+      </p:sp>
+      <p:sp>
+        <p:nvSpPr>
+          <p:cNvPr id="4" name="Slide Number Placeholder 3"/>
+          <p:cNvSpPr>
+            <a:spLocks noGrp="1"/>
+          </p:cNvSpPr>
+          <p:nvPr>
+            <p:ph type="sldNum" sz="quarter" idx="5"/>
+          </p:nvPr>
+        </p:nvSpPr>
+        <p:spPr/>
+        <p:txBody>
+          <a:bodyPr/>
+          <a:lstStyle/>
+          <a:p>
+            <a:fld id="{3924F813-D057-4535-A701-BD4A321515C7}" type="slidenum">
+              <a:rPr lang="en-US" smtClean="0"/>
+              <a:t>2</a:t>
+            </a:fld>
+            <a:endParaRPr lang="en-US"/>
+          </a:p>
+        </p:txBody>
+      </p:sp>
+    </p:spTree>
+    <p:extLst>
+      <p:ext uri="{BB962C8B-B14F-4D97-AF65-F5344CB8AC3E}">
+        <p14:creationId xmlns:p14="http://schemas.microsoft.com/office/powerpoint/2010/main" val="1608862863"/>
+      </p:ext>
+    </p:extLst>
+  </p:cSld>
+  <p:clrMapOvr>
+    <a:masterClrMapping/>
+  </p:clrMapOvr>
+</p:notes>
+</file>
+
+<file path=ppt/notesSlides/notesSlide3.xml><?xml version="1.0" encoding="utf-8"?>
+<p:notes xmlns:a="http://schemas.openxmlformats.org/drawingml/2006/main" xmlns:r="http://schemas.openxmlformats.org/officeDocument/2006/relationships" xmlns:p="http://schemas.openxmlformats.org/presentationml/2006/main">
+  <p:cSld>
+    <p:spTree>
+      <p:nvGrpSpPr>
+        <p:cNvPr id="1" name=""/>
+        <p:cNvGrpSpPr/>
+        <p:nvPr/>
+      </p:nvGrpSpPr>
+      <p:grpSpPr>
+        <a:xfrm>
+          <a:off x="0" y="0"/>
+          <a:ext cx="0" cy="0"/>
+          <a:chOff x="0" y="0"/>
+          <a:chExt cx="0" cy="0"/>
+        </a:xfrm>
+      </p:grpSpPr>
+      <p:sp>
+        <p:nvSpPr>
+          <p:cNvPr id="2" name="Slide Image Placeholder 1"/>
+          <p:cNvSpPr>
+            <a:spLocks noGrp="1" noRot="1" noChangeAspect="1"/>
+          </p:cNvSpPr>
+          <p:nvPr>
+            <p:ph type="sldImg"/>
+          </p:nvPr>
+        </p:nvSpPr>
+        <p:spPr/>
+      </p:sp>
+      <p:sp>
+        <p:nvSpPr>
+          <p:cNvPr id="3" name="Notes Placeholder 2"/>
+          <p:cNvSpPr>
+            <a:spLocks noGrp="1"/>
+          </p:cNvSpPr>
+          <p:nvPr>
+            <p:ph type="body" idx="1"/>
+          </p:nvPr>
+        </p:nvSpPr>
+        <p:spPr/>
+        <p:txBody>
+          <a:bodyPr/>
+          <a:lstStyle/>
+          <a:p>
+            <a:pPr marL="171450" indent="-171450">
+              <a:buFont typeface="Arial" panose="020B0604020202020204" pitchFamily="34" charset="0"/>
+              <a:buChar char="•"/>
+            </a:pPr>
+            <a:r>
+              <a:rPr lang="en-US" dirty="0"/>
+              <a:t>Exigence for being a MRE in the first place </a:t>
+            </a:r>
+            <a:r>
+              <a:rPr lang="en-US" dirty="0">
+                <a:sym typeface="Wingdings" panose="05000000000000000000" pitchFamily="2" charset="2"/>
+              </a:rPr>
+              <a:t> Randy Pausch Last lecture and work as an HCI researcher  Building virtual worlds in VR at CMU and expanding on his work</a:t>
+            </a:r>
+          </a:p>
+          <a:p>
+            <a:pPr marL="171450" indent="-171450">
+              <a:buFont typeface="Arial" panose="020B0604020202020204" pitchFamily="34" charset="0"/>
+              <a:buChar char="•"/>
+            </a:pPr>
+            <a:endParaRPr lang="en-US" dirty="0">
+              <a:sym typeface="Wingdings" panose="05000000000000000000" pitchFamily="2" charset="2"/>
+            </a:endParaRPr>
+          </a:p>
+          <a:p>
+            <a:pPr marL="171450" marR="0" lvl="0" indent="-171450" algn="l" defTabSz="914400" rtl="0" eaLnBrk="1" fontAlgn="auto" latinLnBrk="0" hangingPunct="1">
+              <a:lnSpc>
+                <a:spcPct val="100000"/>
+              </a:lnSpc>
+              <a:spcBef>
+                <a:spcPts val="0"/>
+              </a:spcBef>
+              <a:spcAft>
+                <a:spcPts val="0"/>
+              </a:spcAft>
+              <a:buClrTx/>
+              <a:buSzTx/>
+              <a:buFont typeface="Arial" panose="020B0604020202020204" pitchFamily="34" charset="0"/>
+              <a:buChar char="•"/>
+              <a:tabLst/>
+              <a:defRPr/>
+            </a:pPr>
+            <a:r>
+              <a:rPr lang="en-US" dirty="0">
+                <a:sym typeface="Wingdings" panose="05000000000000000000" pitchFamily="2" charset="2"/>
+              </a:rPr>
+              <a:t>Interesting in selection specifically because how it enables any interaction in HCI </a:t>
+            </a:r>
+          </a:p>
+          <a:p>
+            <a:pPr marL="171450" marR="0" lvl="0" indent="-171450" algn="l" defTabSz="914400" rtl="0" eaLnBrk="1" fontAlgn="auto" latinLnBrk="0" hangingPunct="1">
+              <a:lnSpc>
+                <a:spcPct val="100000"/>
+              </a:lnSpc>
+              <a:spcBef>
+                <a:spcPts val="0"/>
+              </a:spcBef>
+              <a:spcAft>
+                <a:spcPts val="0"/>
+              </a:spcAft>
+              <a:buClrTx/>
+              <a:buSzTx/>
+              <a:buFont typeface="Arial" panose="020B0604020202020204" pitchFamily="34" charset="0"/>
+              <a:buChar char="•"/>
+              <a:tabLst/>
+              <a:defRPr/>
+            </a:pPr>
+            <a:endParaRPr lang="en-US" dirty="0">
+              <a:sym typeface="Wingdings" panose="05000000000000000000" pitchFamily="2" charset="2"/>
+            </a:endParaRPr>
+          </a:p>
+          <a:p>
+            <a:pPr marL="628650" marR="0" lvl="1" indent="-171450" algn="l" defTabSz="914400" rtl="0" eaLnBrk="1" fontAlgn="auto" latinLnBrk="0" hangingPunct="1">
+              <a:lnSpc>
+                <a:spcPct val="100000"/>
+              </a:lnSpc>
+              <a:spcBef>
+                <a:spcPts val="0"/>
+              </a:spcBef>
+              <a:spcAft>
+                <a:spcPts val="0"/>
+              </a:spcAft>
+              <a:buClrTx/>
+              <a:buSzTx/>
+              <a:buFont typeface="Arial" panose="020B0604020202020204" pitchFamily="34" charset="0"/>
+              <a:buChar char="•"/>
+              <a:tabLst/>
+              <a:defRPr/>
+            </a:pPr>
+            <a:r>
+              <a:rPr lang="en-US" dirty="0">
+                <a:sym typeface="Wingdings" panose="05000000000000000000" pitchFamily="2" charset="2"/>
+              </a:rPr>
+              <a:t>My personal experience with VR  discussions with friends about VR  controllers don’t feel as natural to use in a VR as they do in a non-VE (e.g. 3D stereoscopic display vs. 3D flat-screen displays)</a:t>
+            </a:r>
+          </a:p>
+          <a:p>
+            <a:pPr marL="628650" marR="0" lvl="1" indent="-171450" algn="l" defTabSz="914400" rtl="0" eaLnBrk="1" fontAlgn="auto" latinLnBrk="0" hangingPunct="1">
+              <a:lnSpc>
+                <a:spcPct val="100000"/>
+              </a:lnSpc>
+              <a:spcBef>
+                <a:spcPts val="0"/>
+              </a:spcBef>
+              <a:spcAft>
+                <a:spcPts val="0"/>
+              </a:spcAft>
+              <a:buClrTx/>
+              <a:buSzTx/>
+              <a:buFont typeface="Arial" panose="020B0604020202020204" pitchFamily="34" charset="0"/>
+              <a:buChar char="•"/>
+              <a:tabLst/>
+              <a:defRPr/>
+            </a:pPr>
+            <a:endParaRPr lang="en-US" dirty="0">
+              <a:sym typeface="Wingdings" panose="05000000000000000000" pitchFamily="2" charset="2"/>
+            </a:endParaRPr>
+          </a:p>
+          <a:p>
+            <a:pPr marL="628650" marR="0" lvl="1" indent="-171450" algn="l" defTabSz="914400" rtl="0" eaLnBrk="1" fontAlgn="auto" latinLnBrk="0" hangingPunct="1">
+              <a:lnSpc>
+                <a:spcPct val="100000"/>
+              </a:lnSpc>
+              <a:spcBef>
+                <a:spcPts val="0"/>
+              </a:spcBef>
+              <a:spcAft>
+                <a:spcPts val="0"/>
+              </a:spcAft>
+              <a:buClrTx/>
+              <a:buSzTx/>
+              <a:buFont typeface="Arial" panose="020B0604020202020204" pitchFamily="34" charset="0"/>
+              <a:buChar char="•"/>
+              <a:tabLst/>
+              <a:defRPr/>
+            </a:pPr>
+            <a:r>
+              <a:rPr lang="en-US" dirty="0">
+                <a:sym typeface="Wingdings" panose="05000000000000000000" pitchFamily="2" charset="2"/>
+              </a:rPr>
+              <a:t>Cumbersome and repeated  having to either keep arm up entire time to select (constant </a:t>
+            </a:r>
+            <a:r>
+              <a:rPr lang="en-US" sz="1800" dirty="0">
+                <a:effectLst/>
+                <a:latin typeface="Times New Roman" panose="02020603050405020304" pitchFamily="18" charset="0"/>
+                <a:ea typeface="Calibri" panose="020F0502020204030204" pitchFamily="34" charset="0"/>
+              </a:rPr>
+              <a:t>isotonic contractions) or repeated trigger/button pressing (isometric contractions)</a:t>
+            </a:r>
+            <a:endParaRPr lang="en-US" dirty="0">
+              <a:sym typeface="Wingdings" panose="05000000000000000000" pitchFamily="2" charset="2"/>
+            </a:endParaRPr>
+          </a:p>
+          <a:p>
+            <a:pPr marL="628650" marR="0" lvl="1" indent="-171450" algn="l" defTabSz="914400" rtl="0" eaLnBrk="1" fontAlgn="auto" latinLnBrk="0" hangingPunct="1">
+              <a:lnSpc>
+                <a:spcPct val="100000"/>
+              </a:lnSpc>
+              <a:spcBef>
+                <a:spcPts val="0"/>
+              </a:spcBef>
+              <a:spcAft>
+                <a:spcPts val="0"/>
+              </a:spcAft>
+              <a:buClrTx/>
+              <a:buSzTx/>
+              <a:buFont typeface="Arial" panose="020B0604020202020204" pitchFamily="34" charset="0"/>
+              <a:buChar char="•"/>
+              <a:tabLst/>
+              <a:defRPr/>
+            </a:pPr>
+            <a:endParaRPr lang="en-US" dirty="0">
+              <a:sym typeface="Wingdings" panose="05000000000000000000" pitchFamily="2" charset="2"/>
+            </a:endParaRPr>
+          </a:p>
+          <a:p>
+            <a:pPr marL="171450" indent="-171450">
+              <a:buFont typeface="Arial" panose="020B0604020202020204" pitchFamily="34" charset="0"/>
+              <a:buChar char="•"/>
+            </a:pPr>
+            <a:endParaRPr lang="en-US" dirty="0">
+              <a:sym typeface="Wingdings" panose="05000000000000000000" pitchFamily="2" charset="2"/>
+            </a:endParaRPr>
+          </a:p>
+          <a:p>
+            <a:pPr marL="171450" indent="-171450">
+              <a:buFont typeface="Arial" panose="020B0604020202020204" pitchFamily="34" charset="0"/>
+              <a:buChar char="•"/>
+            </a:pPr>
+            <a:endParaRPr lang="en-US" dirty="0">
+              <a:sym typeface="Wingdings" panose="05000000000000000000" pitchFamily="2" charset="2"/>
+            </a:endParaRPr>
+          </a:p>
+          <a:p>
+            <a:pPr marL="171450" indent="-171450">
+              <a:buFont typeface="Arial" panose="020B0604020202020204" pitchFamily="34" charset="0"/>
+              <a:buChar char="•"/>
+            </a:pPr>
+            <a:endParaRPr lang="en-US" dirty="0">
+              <a:sym typeface="Wingdings" panose="05000000000000000000" pitchFamily="2" charset="2"/>
+            </a:endParaRPr>
+          </a:p>
+          <a:p>
+            <a:pPr marL="171450" indent="-171450">
+              <a:buFont typeface="Arial" panose="020B0604020202020204" pitchFamily="34" charset="0"/>
+              <a:buChar char="•"/>
+            </a:pPr>
+            <a:endParaRPr lang="en-US" dirty="0">
+              <a:sym typeface="Wingdings" panose="05000000000000000000" pitchFamily="2" charset="2"/>
+            </a:endParaRPr>
+          </a:p>
+        </p:txBody>
+      </p:sp>
+      <p:sp>
+        <p:nvSpPr>
+          <p:cNvPr id="4" name="Slide Number Placeholder 3"/>
+          <p:cNvSpPr>
+            <a:spLocks noGrp="1"/>
+          </p:cNvSpPr>
+          <p:nvPr>
+            <p:ph type="sldNum" sz="quarter" idx="5"/>
+          </p:nvPr>
+        </p:nvSpPr>
+        <p:spPr/>
+        <p:txBody>
+          <a:bodyPr/>
+          <a:lstStyle/>
+          <a:p>
+            <a:fld id="{3924F813-D057-4535-A701-BD4A321515C7}" type="slidenum">
+              <a:rPr lang="en-US" smtClean="0"/>
+              <a:t>5</a:t>
+            </a:fld>
+            <a:endParaRPr lang="en-US"/>
+          </a:p>
+        </p:txBody>
+      </p:sp>
+    </p:spTree>
+    <p:extLst>
+      <p:ext uri="{BB962C8B-B14F-4D97-AF65-F5344CB8AC3E}">
+        <p14:creationId xmlns:p14="http://schemas.microsoft.com/office/powerpoint/2010/main" val="1192279785"/>
+      </p:ext>
+    </p:extLst>
+  </p:cSld>
+  <p:clrMapOvr>
+    <a:masterClrMapping/>
+  </p:clrMapOvr>
+</p:notes>
+</file>
+
+<file path=ppt/notesSlides/notesSlide4.xml><?xml version="1.0" encoding="utf-8"?>
+<p:notes xmlns:a="http://schemas.openxmlformats.org/drawingml/2006/main" xmlns:r="http://schemas.openxmlformats.org/officeDocument/2006/relationships" xmlns:p="http://schemas.openxmlformats.org/presentationml/2006/main">
+  <p:cSld>
+    <p:spTree>
+      <p:nvGrpSpPr>
+        <p:cNvPr id="1" name="">
+          <a:extLst>
+            <a:ext uri="{FF2B5EF4-FFF2-40B4-BE49-F238E27FC236}">
+              <a16:creationId xmlns:a16="http://schemas.microsoft.com/office/drawing/2014/main" id="{08555353-53CF-3F3E-92A1-40B8D208389A}"/>
+            </a:ext>
+          </a:extLst>
+        </p:cNvPr>
+        <p:cNvGrpSpPr/>
+        <p:nvPr/>
+      </p:nvGrpSpPr>
+      <p:grpSpPr>
+        <a:xfrm>
+          <a:off x="0" y="0"/>
+          <a:ext cx="0" cy="0"/>
+          <a:chOff x="0" y="0"/>
+          <a:chExt cx="0" cy="0"/>
+        </a:xfrm>
+      </p:grpSpPr>
+      <p:sp>
+        <p:nvSpPr>
+          <p:cNvPr id="2" name="Slide Image Placeholder 1">
+            <a:extLst>
+              <a:ext uri="{FF2B5EF4-FFF2-40B4-BE49-F238E27FC236}">
+                <a16:creationId xmlns:a16="http://schemas.microsoft.com/office/drawing/2014/main" id="{5C4BA909-5389-F8F0-FD90-880487EE6C92}"/>
+              </a:ext>
+            </a:extLst>
+          </p:cNvPr>
+          <p:cNvSpPr>
+            <a:spLocks noGrp="1" noRot="1" noChangeAspect="1"/>
+          </p:cNvSpPr>
+          <p:nvPr>
+            <p:ph type="sldImg"/>
+          </p:nvPr>
+        </p:nvSpPr>
+        <p:spPr/>
+      </p:sp>
+      <p:sp>
+        <p:nvSpPr>
+          <p:cNvPr id="3" name="Notes Placeholder 2">
+            <a:extLst>
+              <a:ext uri="{FF2B5EF4-FFF2-40B4-BE49-F238E27FC236}">
+                <a16:creationId xmlns:a16="http://schemas.microsoft.com/office/drawing/2014/main" id="{E21B0446-A8B7-7D9D-D0B3-812925C8BC4F}"/>
+              </a:ext>
+            </a:extLst>
+          </p:cNvPr>
+          <p:cNvSpPr>
+            <a:spLocks noGrp="1"/>
+          </p:cNvSpPr>
+          <p:nvPr>
+            <p:ph type="body" idx="1"/>
+          </p:nvPr>
+        </p:nvSpPr>
+        <p:spPr/>
+        <p:txBody>
+          <a:bodyPr/>
+          <a:lstStyle/>
+          <a:p>
+            <a:pPr marL="171450" indent="-171450">
+              <a:buFont typeface="Arial" panose="020B0604020202020204" pitchFamily="34" charset="0"/>
+              <a:buChar char="•"/>
+            </a:pPr>
+            <a:r>
+              <a:rPr lang="en-US" dirty="0">
+                <a:sym typeface="Wingdings" panose="05000000000000000000" pitchFamily="2" charset="2"/>
+              </a:rPr>
+              <a:t>Researcher and engineer at Universal Creative in the Advanced Technology Interactives department  reading works involving BCI and BCI book  Toward Brain-Computer Interfacing by Guido </a:t>
+            </a:r>
+            <a:r>
+              <a:rPr lang="en-US" dirty="0" err="1">
+                <a:sym typeface="Wingdings" panose="05000000000000000000" pitchFamily="2" charset="2"/>
+              </a:rPr>
+              <a:t>Dornhege</a:t>
+            </a:r>
+            <a:r>
+              <a:rPr lang="en-US" dirty="0">
+                <a:sym typeface="Wingdings" panose="05000000000000000000" pitchFamily="2" charset="2"/>
+              </a:rPr>
+              <a:t>. </a:t>
+            </a:r>
+          </a:p>
+          <a:p>
+            <a:pPr marL="0" indent="0">
+              <a:buFont typeface="Arial" panose="020B0604020202020204" pitchFamily="34" charset="0"/>
+              <a:buNone/>
+            </a:pPr>
+            <a:endParaRPr lang="en-US" dirty="0">
+              <a:sym typeface="Wingdings" panose="05000000000000000000" pitchFamily="2" charset="2"/>
+            </a:endParaRPr>
+          </a:p>
+          <a:p>
+            <a:pPr marL="171450" indent="-171450">
+              <a:buFont typeface="Arial" panose="020B0604020202020204" pitchFamily="34" charset="0"/>
+              <a:buChar char="•"/>
+            </a:pPr>
+            <a:r>
+              <a:rPr lang="en-US" dirty="0">
+                <a:sym typeface="Wingdings" panose="05000000000000000000" pitchFamily="2" charset="2"/>
+              </a:rPr>
+              <a:t>Existing work in this space is scarce </a:t>
+            </a:r>
+          </a:p>
+          <a:p>
+            <a:pPr marL="0" indent="0">
+              <a:buFont typeface="Arial" panose="020B0604020202020204" pitchFamily="34" charset="0"/>
+              <a:buNone/>
+            </a:pPr>
+            <a:endParaRPr lang="en-US" dirty="0">
+              <a:sym typeface="Wingdings" panose="05000000000000000000" pitchFamily="2" charset="2"/>
+            </a:endParaRPr>
+          </a:p>
+          <a:p>
+            <a:pPr marL="628650" lvl="1" indent="-171450">
+              <a:buFont typeface="Wingdings" panose="05000000000000000000" pitchFamily="2" charset="2"/>
+              <a:buChar char="à"/>
+            </a:pPr>
+            <a:r>
+              <a:rPr lang="en-US" dirty="0">
+                <a:sym typeface="Wingdings" panose="05000000000000000000" pitchFamily="2" charset="2"/>
+              </a:rPr>
+              <a:t>Using eye gaze and EEG is done but a majority of the works I read during my literature review showed VR being used a medium for gathering EEG data under specific conditions (e.g. traumatic experiences, decision-points)</a:t>
+            </a:r>
+          </a:p>
+          <a:p>
+            <a:pPr marL="457200" lvl="1" indent="0">
+              <a:buFont typeface="Wingdings" panose="05000000000000000000" pitchFamily="2" charset="2"/>
+              <a:buNone/>
+            </a:pPr>
+            <a:endParaRPr lang="en-US" dirty="0">
+              <a:sym typeface="Wingdings" panose="05000000000000000000" pitchFamily="2" charset="2"/>
+            </a:endParaRPr>
+          </a:p>
+          <a:p>
+            <a:pPr marL="457200" lvl="1" indent="0">
+              <a:buFont typeface="Arial" panose="020B0604020202020204" pitchFamily="34" charset="0"/>
+              <a:buNone/>
+            </a:pPr>
+            <a:r>
+              <a:rPr lang="en-US" dirty="0">
+                <a:sym typeface="Wingdings" panose="05000000000000000000" pitchFamily="2" charset="2"/>
+              </a:rPr>
+              <a:t> I want to help pave the road for BCI research specifically focused on interaction within VR interaction in the forefront!</a:t>
+            </a:r>
+          </a:p>
+        </p:txBody>
+      </p:sp>
+      <p:sp>
+        <p:nvSpPr>
+          <p:cNvPr id="4" name="Slide Number Placeholder 3">
+            <a:extLst>
+              <a:ext uri="{FF2B5EF4-FFF2-40B4-BE49-F238E27FC236}">
+                <a16:creationId xmlns:a16="http://schemas.microsoft.com/office/drawing/2014/main" id="{6C78AF1A-B0BB-E173-DB51-210FBDB9487F}"/>
+              </a:ext>
+            </a:extLst>
+          </p:cNvPr>
+          <p:cNvSpPr>
+            <a:spLocks noGrp="1"/>
+          </p:cNvSpPr>
+          <p:nvPr>
+            <p:ph type="sldNum" sz="quarter" idx="5"/>
+          </p:nvPr>
+        </p:nvSpPr>
+        <p:spPr/>
+        <p:txBody>
+          <a:bodyPr/>
+          <a:lstStyle/>
+          <a:p>
+            <a:fld id="{3924F813-D057-4535-A701-BD4A321515C7}" type="slidenum">
+              <a:rPr lang="en-US" smtClean="0"/>
+              <a:t>6</a:t>
+            </a:fld>
+            <a:endParaRPr lang="en-US"/>
+          </a:p>
+        </p:txBody>
+      </p:sp>
+    </p:spTree>
+    <p:extLst>
+      <p:ext uri="{BB962C8B-B14F-4D97-AF65-F5344CB8AC3E}">
+        <p14:creationId xmlns:p14="http://schemas.microsoft.com/office/powerpoint/2010/main" val="17129158"/>
+      </p:ext>
+    </p:extLst>
+  </p:cSld>
+  <p:clrMapOvr>
+    <a:masterClrMapping/>
+  </p:clrMapOvr>
+</p:notes>
+</file>
+
+<file path=ppt/notesSlides/notesSlide5.xml><?xml version="1.0" encoding="utf-8"?>
+<p:notes xmlns:a="http://schemas.openxmlformats.org/drawingml/2006/main" xmlns:r="http://schemas.openxmlformats.org/officeDocument/2006/relationships" xmlns:p="http://schemas.openxmlformats.org/presentationml/2006/main">
+  <p:cSld>
+    <p:spTree>
+      <p:nvGrpSpPr>
+        <p:cNvPr id="1" name=""/>
+        <p:cNvGrpSpPr/>
+        <p:nvPr/>
+      </p:nvGrpSpPr>
+      <p:grpSpPr>
+        <a:xfrm>
+          <a:off x="0" y="0"/>
+          <a:ext cx="0" cy="0"/>
+          <a:chOff x="0" y="0"/>
+          <a:chExt cx="0" cy="0"/>
+        </a:xfrm>
+      </p:grpSpPr>
+      <p:sp>
+        <p:nvSpPr>
+          <p:cNvPr id="2" name="Slide Image Placeholder 1"/>
+          <p:cNvSpPr>
+            <a:spLocks noGrp="1" noRot="1" noChangeAspect="1"/>
+          </p:cNvSpPr>
+          <p:nvPr>
+            <p:ph type="sldImg"/>
+          </p:nvPr>
+        </p:nvSpPr>
+        <p:spPr/>
+      </p:sp>
+      <p:sp>
+        <p:nvSpPr>
+          <p:cNvPr id="3" name="Notes Placeholder 2"/>
+          <p:cNvSpPr>
+            <a:spLocks noGrp="1"/>
+          </p:cNvSpPr>
+          <p:nvPr>
+            <p:ph type="body" idx="1"/>
+          </p:nvPr>
+        </p:nvSpPr>
+        <p:spPr/>
+        <p:txBody>
+          <a:bodyPr/>
+          <a:lstStyle/>
+          <a:p>
+            <a:pPr marL="171450" indent="-171450">
+              <a:buFont typeface="Arial" panose="020B0604020202020204" pitchFamily="34" charset="0"/>
+              <a:buChar char="•"/>
+            </a:pPr>
+            <a:r>
+              <a:rPr lang="en-US" dirty="0"/>
+              <a:t>I know I’m siting in a room of subject matter experts but bear with me, just want to make sure we’re on the same page</a:t>
+            </a:r>
+          </a:p>
+          <a:p>
+            <a:pPr marL="0" indent="0">
+              <a:buFont typeface="Arial" panose="020B0604020202020204" pitchFamily="34" charset="0"/>
+              <a:buNone/>
+            </a:pPr>
+            <a:endParaRPr lang="en-US" dirty="0"/>
+          </a:p>
+          <a:p>
+            <a:pPr marL="171450" indent="-171450">
+              <a:buFont typeface="Arial" panose="020B0604020202020204" pitchFamily="34" charset="0"/>
+              <a:buChar char="•"/>
+            </a:pPr>
+            <a:r>
+              <a:rPr lang="en-US" dirty="0"/>
+              <a:t>I want to take a look at where we’ve come from, where we are, and where I believe we should be going</a:t>
+            </a:r>
+          </a:p>
+          <a:p>
+            <a:pPr marL="171450" indent="-171450">
+              <a:buFont typeface="Arial" panose="020B0604020202020204" pitchFamily="34" charset="0"/>
+              <a:buChar char="•"/>
+            </a:pPr>
+            <a:endParaRPr lang="en-US" dirty="0"/>
+          </a:p>
+          <a:p>
+            <a:pPr marL="171450" indent="-171450">
+              <a:buFont typeface="Arial" panose="020B0604020202020204" pitchFamily="34" charset="0"/>
+              <a:buChar char="•"/>
+            </a:pPr>
+            <a:r>
+              <a:rPr lang="en-US" dirty="0"/>
+              <a:t>Starting with VR controllers</a:t>
+            </a:r>
+          </a:p>
+          <a:p>
+            <a:pPr marL="0" indent="0">
+              <a:buFont typeface="Arial" panose="020B0604020202020204" pitchFamily="34" charset="0"/>
+              <a:buNone/>
+            </a:pPr>
+            <a:endParaRPr lang="en-US" dirty="0"/>
+          </a:p>
+          <a:p>
+            <a:pPr marL="628650" lvl="1" indent="-171450">
+              <a:buFont typeface="Wingdings" panose="05000000000000000000" pitchFamily="2" charset="2"/>
+              <a:buChar char="à"/>
+            </a:pPr>
+            <a:r>
+              <a:rPr lang="en-US" dirty="0">
+                <a:sym typeface="Wingdings" panose="05000000000000000000" pitchFamily="2" charset="2"/>
+              </a:rPr>
+              <a:t>Point and click is a selection technique where you aim for interest and click for intent (seen early on with mouse movement and mouse click)</a:t>
+            </a:r>
+          </a:p>
+          <a:p>
+            <a:pPr marL="628650" lvl="1" indent="-171450">
+              <a:buFont typeface="Wingdings" panose="05000000000000000000" pitchFamily="2" charset="2"/>
+              <a:buChar char="à"/>
+            </a:pPr>
+            <a:endParaRPr lang="en-US" dirty="0">
+              <a:sym typeface="Wingdings" panose="05000000000000000000" pitchFamily="2" charset="2"/>
+            </a:endParaRPr>
+          </a:p>
+          <a:p>
+            <a:pPr marL="457200" lvl="1" indent="0">
+              <a:buFont typeface="Arial" panose="020B0604020202020204" pitchFamily="34" charset="0"/>
+              <a:buNone/>
+            </a:pPr>
+            <a:r>
+              <a:rPr lang="en-US" dirty="0">
+                <a:sym typeface="Wingdings" panose="05000000000000000000" pitchFamily="2" charset="2"/>
+              </a:rPr>
+              <a:t> Precise control but can tiring over time, especially if repeated</a:t>
+            </a:r>
+            <a:endParaRPr lang="en-US" dirty="0"/>
+          </a:p>
+          <a:p>
+            <a:pPr marL="171450" indent="-171450">
+              <a:buFont typeface="Arial" panose="020B0604020202020204" pitchFamily="34" charset="0"/>
+              <a:buChar char="•"/>
+            </a:pPr>
+            <a:endParaRPr lang="en-US" dirty="0"/>
+          </a:p>
+          <a:p>
+            <a:pPr marL="171450" indent="-171450">
+              <a:buFont typeface="Arial" panose="020B0604020202020204" pitchFamily="34" charset="0"/>
+              <a:buChar char="•"/>
+            </a:pPr>
+            <a:endParaRPr lang="en-US" dirty="0"/>
+          </a:p>
+        </p:txBody>
+      </p:sp>
+      <p:sp>
+        <p:nvSpPr>
+          <p:cNvPr id="4" name="Slide Number Placeholder 3"/>
+          <p:cNvSpPr>
+            <a:spLocks noGrp="1"/>
+          </p:cNvSpPr>
+          <p:nvPr>
+            <p:ph type="sldNum" sz="quarter" idx="5"/>
+          </p:nvPr>
+        </p:nvSpPr>
+        <p:spPr/>
+        <p:txBody>
+          <a:bodyPr/>
+          <a:lstStyle/>
+          <a:p>
+            <a:fld id="{3924F813-D057-4535-A701-BD4A321515C7}" type="slidenum">
+              <a:rPr lang="en-US" smtClean="0"/>
+              <a:t>7</a:t>
+            </a:fld>
+            <a:endParaRPr lang="en-US"/>
+          </a:p>
+        </p:txBody>
+      </p:sp>
+    </p:spTree>
+    <p:extLst>
+      <p:ext uri="{BB962C8B-B14F-4D97-AF65-F5344CB8AC3E}">
+        <p14:creationId xmlns:p14="http://schemas.microsoft.com/office/powerpoint/2010/main" val="1816834316"/>
+      </p:ext>
+    </p:extLst>
+  </p:cSld>
+  <p:clrMapOvr>
+    <a:masterClrMapping/>
+  </p:clrMapOvr>
+</p:notes>
+</file>
+
+<file path=ppt/notesSlides/notesSlide6.xml><?xml version="1.0" encoding="utf-8"?>
+<p:notes xmlns:a="http://schemas.openxmlformats.org/drawingml/2006/main" xmlns:r="http://schemas.openxmlformats.org/officeDocument/2006/relationships" xmlns:p="http://schemas.openxmlformats.org/presentationml/2006/main">
+  <p:cSld>
+    <p:spTree>
+      <p:nvGrpSpPr>
+        <p:cNvPr id="1" name=""/>
+        <p:cNvGrpSpPr/>
+        <p:nvPr/>
+      </p:nvGrpSpPr>
+      <p:grpSpPr>
+        <a:xfrm>
+          <a:off x="0" y="0"/>
+          <a:ext cx="0" cy="0"/>
+          <a:chOff x="0" y="0"/>
+          <a:chExt cx="0" cy="0"/>
+        </a:xfrm>
+      </p:grpSpPr>
+      <p:sp>
+        <p:nvSpPr>
+          <p:cNvPr id="2" name="Slide Image Placeholder 1"/>
+          <p:cNvSpPr>
+            <a:spLocks noGrp="1" noRot="1" noChangeAspect="1"/>
+          </p:cNvSpPr>
+          <p:nvPr>
+            <p:ph type="sldImg"/>
+          </p:nvPr>
+        </p:nvSpPr>
+        <p:spPr/>
+      </p:sp>
+      <p:sp>
+        <p:nvSpPr>
+          <p:cNvPr id="3" name="Notes Placeholder 2"/>
+          <p:cNvSpPr>
+            <a:spLocks noGrp="1"/>
+          </p:cNvSpPr>
+          <p:nvPr>
+            <p:ph type="body" idx="1"/>
+          </p:nvPr>
+        </p:nvSpPr>
+        <p:spPr/>
+        <p:txBody>
+          <a:bodyPr/>
+          <a:lstStyle/>
+          <a:p>
+            <a:pPr marL="171450" indent="-171450">
+              <a:buFont typeface="Arial" panose="020B0604020202020204" pitchFamily="34" charset="0"/>
+              <a:buChar char="•"/>
+            </a:pPr>
+            <a:r>
+              <a:rPr lang="en-US" dirty="0"/>
+              <a:t>Hand tracking is used in a variety of headsets such as the Meta Quest 2</a:t>
+            </a:r>
+          </a:p>
+          <a:p>
+            <a:pPr marL="171450" indent="-171450">
+              <a:buFont typeface="Arial" panose="020B0604020202020204" pitchFamily="34" charset="0"/>
+              <a:buChar char="•"/>
+            </a:pPr>
+            <a:endParaRPr lang="en-US" dirty="0"/>
+          </a:p>
+          <a:p>
+            <a:pPr marL="171450" indent="-171450">
+              <a:buFont typeface="Arial" panose="020B0604020202020204" pitchFamily="34" charset="0"/>
+              <a:buChar char="•"/>
+            </a:pPr>
+            <a:r>
+              <a:rPr lang="en-US" dirty="0"/>
+              <a:t>Eye tracking and hand tracking and eye tracking are supported by the Meta Quest Pro and Magic Leap II </a:t>
+            </a:r>
+          </a:p>
+          <a:p>
+            <a:pPr marL="171450" indent="-171450">
+              <a:buFont typeface="Arial" panose="020B0604020202020204" pitchFamily="34" charset="0"/>
+              <a:buChar char="•"/>
+            </a:pPr>
+            <a:endParaRPr lang="en-US" dirty="0"/>
+          </a:p>
+          <a:p>
+            <a:pPr marL="171450" indent="-171450">
+              <a:buFont typeface="Arial" panose="020B0604020202020204" pitchFamily="34" charset="0"/>
+              <a:buChar char="•"/>
+            </a:pPr>
+            <a:r>
+              <a:rPr lang="en-US" dirty="0"/>
+              <a:t>Eye Gaze + Hand Tracking is main input technique for interaction with VE in new Apple Vision Pro </a:t>
+            </a:r>
+          </a:p>
+          <a:p>
+            <a:pPr marL="171450" indent="-171450">
+              <a:buFont typeface="Arial" panose="020B0604020202020204" pitchFamily="34" charset="0"/>
+              <a:buChar char="•"/>
+            </a:pPr>
+            <a:endParaRPr lang="en-US" dirty="0"/>
+          </a:p>
+        </p:txBody>
+      </p:sp>
+      <p:sp>
+        <p:nvSpPr>
+          <p:cNvPr id="4" name="Slide Number Placeholder 3"/>
+          <p:cNvSpPr>
+            <a:spLocks noGrp="1"/>
+          </p:cNvSpPr>
+          <p:nvPr>
+            <p:ph type="sldNum" sz="quarter" idx="5"/>
+          </p:nvPr>
+        </p:nvSpPr>
+        <p:spPr/>
+        <p:txBody>
+          <a:bodyPr/>
+          <a:lstStyle/>
+          <a:p>
+            <a:fld id="{3924F813-D057-4535-A701-BD4A321515C7}" type="slidenum">
+              <a:rPr lang="en-US" smtClean="0"/>
+              <a:t>8</a:t>
+            </a:fld>
+            <a:endParaRPr lang="en-US"/>
+          </a:p>
+        </p:txBody>
+      </p:sp>
+    </p:spTree>
+    <p:extLst>
+      <p:ext uri="{BB962C8B-B14F-4D97-AF65-F5344CB8AC3E}">
+        <p14:creationId xmlns:p14="http://schemas.microsoft.com/office/powerpoint/2010/main" val="1918364686"/>
+      </p:ext>
+    </p:extLst>
+  </p:cSld>
+  <p:clrMapOvr>
+    <a:masterClrMapping/>
+  </p:clrMapOvr>
+</p:notes>
+</file>
+
+<file path=ppt/notesSlides/notesSlide7.xml><?xml version="1.0" encoding="utf-8"?>
+<p:notes xmlns:a="http://schemas.openxmlformats.org/drawingml/2006/main" xmlns:r="http://schemas.openxmlformats.org/officeDocument/2006/relationships" xmlns:p="http://schemas.openxmlformats.org/presentationml/2006/main">
+  <p:cSld>
+    <p:spTree>
+      <p:nvGrpSpPr>
+        <p:cNvPr id="1" name=""/>
+        <p:cNvGrpSpPr/>
+        <p:nvPr/>
+      </p:nvGrpSpPr>
+      <p:grpSpPr>
+        <a:xfrm>
+          <a:off x="0" y="0"/>
+          <a:ext cx="0" cy="0"/>
+          <a:chOff x="0" y="0"/>
+          <a:chExt cx="0" cy="0"/>
+        </a:xfrm>
+      </p:grpSpPr>
+      <p:sp>
+        <p:nvSpPr>
+          <p:cNvPr id="2" name="Slide Image Placeholder 1"/>
+          <p:cNvSpPr>
+            <a:spLocks noGrp="1" noRot="1" noChangeAspect="1"/>
+          </p:cNvSpPr>
+          <p:nvPr>
+            <p:ph type="sldImg"/>
+          </p:nvPr>
+        </p:nvSpPr>
+        <p:spPr/>
+      </p:sp>
+      <p:sp>
+        <p:nvSpPr>
+          <p:cNvPr id="3" name="Notes Placeholder 2"/>
+          <p:cNvSpPr>
+            <a:spLocks noGrp="1"/>
+          </p:cNvSpPr>
+          <p:nvPr>
+            <p:ph type="body" idx="1"/>
+          </p:nvPr>
+        </p:nvSpPr>
+        <p:spPr/>
+        <p:txBody>
+          <a:bodyPr/>
+          <a:lstStyle/>
+          <a:p>
+            <a:endParaRPr lang="en-US" dirty="0"/>
+          </a:p>
+        </p:txBody>
+      </p:sp>
+      <p:sp>
+        <p:nvSpPr>
+          <p:cNvPr id="4" name="Slide Number Placeholder 3"/>
+          <p:cNvSpPr>
+            <a:spLocks noGrp="1"/>
+          </p:cNvSpPr>
+          <p:nvPr>
+            <p:ph type="sldNum" sz="quarter" idx="5"/>
+          </p:nvPr>
+        </p:nvSpPr>
+        <p:spPr/>
+        <p:txBody>
+          <a:bodyPr/>
+          <a:lstStyle/>
+          <a:p>
+            <a:fld id="{3924F813-D057-4535-A701-BD4A321515C7}" type="slidenum">
+              <a:rPr lang="en-US" smtClean="0"/>
+              <a:t>9</a:t>
+            </a:fld>
+            <a:endParaRPr lang="en-US"/>
+          </a:p>
+        </p:txBody>
+      </p:sp>
+    </p:spTree>
+    <p:extLst>
+      <p:ext uri="{BB962C8B-B14F-4D97-AF65-F5344CB8AC3E}">
+        <p14:creationId xmlns:p14="http://schemas.microsoft.com/office/powerpoint/2010/main" val="3762895653"/>
+      </p:ext>
+    </p:extLst>
+  </p:cSld>
+  <p:clrMapOvr>
+    <a:masterClrMapping/>
+  </p:clrMapOvr>
+</p:notes>
 </file>
 
 <file path=ppt/slideLayouts/slideLayout1.xml><?xml version="1.0" encoding="utf-8"?>
@@ -21916,7 +23331,7 @@
         <p:cNvPr id="1" name="">
           <a:extLst>
             <a:ext uri="{FF2B5EF4-FFF2-40B4-BE49-F238E27FC236}">
-              <a16:creationId xmlns:a16="http://schemas.microsoft.com/office/drawing/2014/main" id="{6F538EF5-F2BB-36E5-631F-7DC455344161}"/>
+              <a16:creationId xmlns:a16="http://schemas.microsoft.com/office/drawing/2014/main" id="{2D937850-13E5-EBAF-CEC8-92E441C446D1}"/>
             </a:ext>
           </a:extLst>
         </p:cNvPr>
@@ -21933,48 +23348,105 @@
       </p:grpSpPr>
       <p:sp>
         <p:nvSpPr>
-          <p:cNvPr id="3" name="TextBox 2">
-            <a:extLst>
-              <a:ext uri="{FF2B5EF4-FFF2-40B4-BE49-F238E27FC236}">
-                <a16:creationId xmlns:a16="http://schemas.microsoft.com/office/drawing/2014/main" id="{AE5BF5F9-0D8D-EEA7-8124-2059C2BB669B}"/>
-              </a:ext>
-            </a:extLst>
-          </p:cNvPr>
-          <p:cNvSpPr txBox="1"/>
-          <p:nvPr/>
-        </p:nvSpPr>
-        <p:spPr>
-          <a:xfrm>
-            <a:off x="3508075" y="3213556"/>
-            <a:ext cx="5175849" cy="430887"/>
-          </a:xfrm>
-          <a:prstGeom prst="rect">
-            <a:avLst/>
-          </a:prstGeom>
-        </p:spPr>
-        <p:txBody>
-          <a:bodyPr wrap="square" lIns="0" tIns="0" rIns="0" bIns="0" rtlCol="0" anchor="t" anchorCtr="0">
-            <a:spAutoFit/>
+          <p:cNvPr id="2" name="Title 1">
+            <a:extLst>
+              <a:ext uri="{FF2B5EF4-FFF2-40B4-BE49-F238E27FC236}">
+                <a16:creationId xmlns:a16="http://schemas.microsoft.com/office/drawing/2014/main" id="{39E5F5F7-B28F-DAA6-F49F-3AE53A6520E8}"/>
+              </a:ext>
+            </a:extLst>
+          </p:cNvPr>
+          <p:cNvSpPr>
+            <a:spLocks noGrp="1"/>
+          </p:cNvSpPr>
+          <p:nvPr>
+            <p:ph type="title"/>
+          </p:nvPr>
+        </p:nvSpPr>
+        <p:spPr/>
+        <p:txBody>
+          <a:bodyPr anchor="b">
+            <a:normAutofit/>
           </a:bodyPr>
           <a:lstStyle/>
           <a:p>
-            <a:pPr algn="ctr"/>
-            <a:r>
-              <a:rPr lang="en-US" sz="2800" b="1" dirty="0">
-                <a:solidFill>
-                  <a:schemeClr val="bg1"/>
-                </a:solidFill>
-                <a:latin typeface="Gotham Black"/>
-              </a:rPr>
-              <a:t>LITERATURE REVIEW</a:t>
-            </a:r>
+            <a:r>
+              <a:rPr lang="en-US" dirty="0"/>
+              <a:t>PICTURE PLACEHOLDERS</a:t>
+            </a:r>
+          </a:p>
+        </p:txBody>
+      </p:sp>
+      <p:sp>
+        <p:nvSpPr>
+          <p:cNvPr id="3" name="Content Placeholder 2">
+            <a:extLst>
+              <a:ext uri="{FF2B5EF4-FFF2-40B4-BE49-F238E27FC236}">
+                <a16:creationId xmlns:a16="http://schemas.microsoft.com/office/drawing/2014/main" id="{D5FEECAD-6B1D-40D1-71D2-5DF58B3B0D50}"/>
+              </a:ext>
+            </a:extLst>
+          </p:cNvPr>
+          <p:cNvSpPr>
+            <a:spLocks noGrp="1"/>
+          </p:cNvSpPr>
+          <p:nvPr>
+            <p:ph idx="1"/>
+          </p:nvPr>
+        </p:nvSpPr>
+        <p:spPr/>
+        <p:txBody>
+          <a:bodyPr anchor="t">
+            <a:normAutofit/>
+          </a:bodyPr>
+          <a:lstStyle/>
+          <a:p>
+            <a:r>
+              <a:rPr lang="en-US" dirty="0"/>
+              <a:t>To add a photo, click on the icon in the picture placeholder area</a:t>
+            </a:r>
+          </a:p>
+          <a:p>
+            <a:r>
+              <a:rPr lang="en-US" dirty="0"/>
+              <a:t>If you are inserting an image with a transparent background — such as a .png file — you can remove the light grey background in the picture placeholder. Select the picture frame, go to the ”Home” tab, select “Shape Fill.” Select “No Fill” from the drop-down menu.</a:t>
+            </a:r>
+          </a:p>
+          <a:p>
+            <a:r>
+              <a:rPr lang="en-US" dirty="0"/>
+              <a:t>You may additional photos to each slide manually</a:t>
+            </a:r>
+          </a:p>
+        </p:txBody>
+      </p:sp>
+      <p:sp>
+        <p:nvSpPr>
+          <p:cNvPr id="13" name="Picture Placeholder 3">
+            <a:extLst>
+              <a:ext uri="{FF2B5EF4-FFF2-40B4-BE49-F238E27FC236}">
+                <a16:creationId xmlns:a16="http://schemas.microsoft.com/office/drawing/2014/main" id="{7CC0CA8C-F189-AEE3-404A-A572B9D181ED}"/>
+              </a:ext>
+            </a:extLst>
+          </p:cNvPr>
+          <p:cNvSpPr>
+            <a:spLocks noGrp="1"/>
+          </p:cNvSpPr>
+          <p:nvPr>
+            <p:ph type="pic" sz="quarter" idx="13"/>
+          </p:nvPr>
+        </p:nvSpPr>
+        <p:spPr/>
+        <p:txBody>
+          <a:bodyPr/>
+          <a:lstStyle/>
+          <a:p>
+            <a:endParaRPr lang="en-US"/>
           </a:p>
         </p:txBody>
       </p:sp>
     </p:spTree>
     <p:extLst>
       <p:ext uri="{BB962C8B-B14F-4D97-AF65-F5344CB8AC3E}">
-        <p14:creationId xmlns:p14="http://schemas.microsoft.com/office/powerpoint/2010/main" val="1109583541"/>
+        <p14:creationId xmlns:p14="http://schemas.microsoft.com/office/powerpoint/2010/main" val="1225507778"/>
       </p:ext>
     </p:extLst>
   </p:cSld>
@@ -21992,7 +23464,7 @@
         <p:cNvPr id="1" name="">
           <a:extLst>
             <a:ext uri="{FF2B5EF4-FFF2-40B4-BE49-F238E27FC236}">
-              <a16:creationId xmlns:a16="http://schemas.microsoft.com/office/drawing/2014/main" id="{33D6CA61-F65F-765B-0DCC-7F3CBA4C1B25}"/>
+              <a16:creationId xmlns:a16="http://schemas.microsoft.com/office/drawing/2014/main" id="{6F538EF5-F2BB-36E5-631F-7DC455344161}"/>
             </a:ext>
           </a:extLst>
         </p:cNvPr>
@@ -22009,61 +23481,48 @@
       </p:grpSpPr>
       <p:sp>
         <p:nvSpPr>
-          <p:cNvPr id="2" name="Title 1">
-            <a:extLst>
-              <a:ext uri="{FF2B5EF4-FFF2-40B4-BE49-F238E27FC236}">
-                <a16:creationId xmlns:a16="http://schemas.microsoft.com/office/drawing/2014/main" id="{4AF4D0C4-90B3-19FF-4C8A-FF8A4FAD8D45}"/>
-              </a:ext>
-            </a:extLst>
-          </p:cNvPr>
-          <p:cNvSpPr>
-            <a:spLocks noGrp="1"/>
-          </p:cNvSpPr>
-          <p:nvPr>
-            <p:ph type="title"/>
-          </p:nvPr>
-        </p:nvSpPr>
-        <p:spPr/>
-        <p:txBody>
-          <a:bodyPr/>
+          <p:cNvPr id="3" name="TextBox 2">
+            <a:extLst>
+              <a:ext uri="{FF2B5EF4-FFF2-40B4-BE49-F238E27FC236}">
+                <a16:creationId xmlns:a16="http://schemas.microsoft.com/office/drawing/2014/main" id="{AE5BF5F9-0D8D-EEA7-8124-2059C2BB669B}"/>
+              </a:ext>
+            </a:extLst>
+          </p:cNvPr>
+          <p:cNvSpPr txBox="1"/>
+          <p:nvPr/>
+        </p:nvSpPr>
+        <p:spPr>
+          <a:xfrm>
+            <a:off x="3508075" y="3213556"/>
+            <a:ext cx="5175849" cy="430887"/>
+          </a:xfrm>
+          <a:prstGeom prst="rect">
+            <a:avLst/>
+          </a:prstGeom>
+        </p:spPr>
+        <p:txBody>
+          <a:bodyPr wrap="square" lIns="0" tIns="0" rIns="0" bIns="0" rtlCol="0" anchor="t" anchorCtr="0">
+            <a:spAutoFit/>
+          </a:bodyPr>
           <a:lstStyle/>
           <a:p>
-            <a:r>
-              <a:rPr lang="en-US" dirty="0"/>
-              <a:t>Literature Review – Input Devices</a:t>
-            </a:r>
-          </a:p>
-        </p:txBody>
-      </p:sp>
-      <p:sp>
-        <p:nvSpPr>
-          <p:cNvPr id="3" name="Content Placeholder 2">
-            <a:extLst>
-              <a:ext uri="{FF2B5EF4-FFF2-40B4-BE49-F238E27FC236}">
-                <a16:creationId xmlns:a16="http://schemas.microsoft.com/office/drawing/2014/main" id="{BE023199-1780-4DDC-97DD-D9F8968803EE}"/>
-              </a:ext>
-            </a:extLst>
-          </p:cNvPr>
-          <p:cNvSpPr>
-            <a:spLocks noGrp="1"/>
-          </p:cNvSpPr>
-          <p:nvPr>
-            <p:ph idx="1"/>
-          </p:nvPr>
-        </p:nvSpPr>
-        <p:spPr/>
-        <p:txBody>
-          <a:bodyPr/>
-          <a:lstStyle/>
-          <a:p>
-            <a:endParaRPr lang="en-US"/>
+            <a:pPr algn="ctr"/>
+            <a:r>
+              <a:rPr lang="en-US" sz="2800" b="1" dirty="0">
+                <a:solidFill>
+                  <a:schemeClr val="bg1"/>
+                </a:solidFill>
+                <a:latin typeface="Gotham Black"/>
+              </a:rPr>
+              <a:t>LITERATURE REVIEW</a:t>
+            </a:r>
           </a:p>
         </p:txBody>
       </p:sp>
     </p:spTree>
     <p:extLst>
       <p:ext uri="{BB962C8B-B14F-4D97-AF65-F5344CB8AC3E}">
-        <p14:creationId xmlns:p14="http://schemas.microsoft.com/office/powerpoint/2010/main" val="477341"/>
+        <p14:creationId xmlns:p14="http://schemas.microsoft.com/office/powerpoint/2010/main" val="1109583541"/>
       </p:ext>
     </p:extLst>
   </p:cSld>
@@ -22074,95 +23533,6 @@
 </file>
 
 <file path=ppt/slides/slide12.xml><?xml version="1.0" encoding="utf-8"?>
-<p:sld xmlns:a="http://schemas.openxmlformats.org/drawingml/2006/main" xmlns:r="http://schemas.openxmlformats.org/officeDocument/2006/relationships" xmlns:p="http://schemas.openxmlformats.org/presentationml/2006/main">
-  <p:cSld>
-    <p:spTree>
-      <p:nvGrpSpPr>
-        <p:cNvPr id="1" name="">
-          <a:extLst>
-            <a:ext uri="{FF2B5EF4-FFF2-40B4-BE49-F238E27FC236}">
-              <a16:creationId xmlns:a16="http://schemas.microsoft.com/office/drawing/2014/main" id="{1A770F1A-DD80-915E-41A1-0EF5C63B206B}"/>
-            </a:ext>
-          </a:extLst>
-        </p:cNvPr>
-        <p:cNvGrpSpPr/>
-        <p:nvPr/>
-      </p:nvGrpSpPr>
-      <p:grpSpPr>
-        <a:xfrm>
-          <a:off x="0" y="0"/>
-          <a:ext cx="0" cy="0"/>
-          <a:chOff x="0" y="0"/>
-          <a:chExt cx="0" cy="0"/>
-        </a:xfrm>
-      </p:grpSpPr>
-      <p:sp>
-        <p:nvSpPr>
-          <p:cNvPr id="2" name="Title 1">
-            <a:extLst>
-              <a:ext uri="{FF2B5EF4-FFF2-40B4-BE49-F238E27FC236}">
-                <a16:creationId xmlns:a16="http://schemas.microsoft.com/office/drawing/2014/main" id="{4D3DE2B3-ED18-B97C-6E98-DACF01D98949}"/>
-              </a:ext>
-            </a:extLst>
-          </p:cNvPr>
-          <p:cNvSpPr>
-            <a:spLocks noGrp="1"/>
-          </p:cNvSpPr>
-          <p:nvPr>
-            <p:ph type="title"/>
-          </p:nvPr>
-        </p:nvSpPr>
-        <p:spPr/>
-        <p:txBody>
-          <a:bodyPr/>
-          <a:lstStyle/>
-          <a:p>
-            <a:r>
-              <a:rPr lang="en-US" dirty="0"/>
-              <a:t>Literature Review – Input Devices</a:t>
-            </a:r>
-          </a:p>
-        </p:txBody>
-      </p:sp>
-      <p:sp>
-        <p:nvSpPr>
-          <p:cNvPr id="3" name="Content Placeholder 2">
-            <a:extLst>
-              <a:ext uri="{FF2B5EF4-FFF2-40B4-BE49-F238E27FC236}">
-                <a16:creationId xmlns:a16="http://schemas.microsoft.com/office/drawing/2014/main" id="{D6E1BE6A-12C7-04E5-F9E1-A775A0D2AA47}"/>
-              </a:ext>
-            </a:extLst>
-          </p:cNvPr>
-          <p:cNvSpPr>
-            <a:spLocks noGrp="1"/>
-          </p:cNvSpPr>
-          <p:nvPr>
-            <p:ph idx="1"/>
-          </p:nvPr>
-        </p:nvSpPr>
-        <p:spPr/>
-        <p:txBody>
-          <a:bodyPr/>
-          <a:lstStyle/>
-          <a:p>
-            <a:endParaRPr lang="en-US"/>
-          </a:p>
-        </p:txBody>
-      </p:sp>
-    </p:spTree>
-    <p:extLst>
-      <p:ext uri="{BB962C8B-B14F-4D97-AF65-F5344CB8AC3E}">
-        <p14:creationId xmlns:p14="http://schemas.microsoft.com/office/powerpoint/2010/main" val="2938728103"/>
-      </p:ext>
-    </p:extLst>
-  </p:cSld>
-  <p:clrMapOvr>
-    <a:masterClrMapping/>
-  </p:clrMapOvr>
-</p:sld>
-</file>
-
-<file path=ppt/slides/slide13.xml><?xml version="1.0" encoding="utf-8"?>
 <p:sld xmlns:a="http://schemas.openxmlformats.org/drawingml/2006/main" xmlns:r="http://schemas.openxmlformats.org/officeDocument/2006/relationships" xmlns:p="http://schemas.openxmlformats.org/presentationml/2006/main">
   <p:cSld>
     <p:spTree>
@@ -22251,7 +23621,7 @@
 </p:sld>
 </file>
 
-<file path=ppt/slides/slide14.xml><?xml version="1.0" encoding="utf-8"?>
+<file path=ppt/slides/slide13.xml><?xml version="1.0" encoding="utf-8"?>
 <p:sld xmlns:a="http://schemas.openxmlformats.org/drawingml/2006/main" xmlns:r="http://schemas.openxmlformats.org/officeDocument/2006/relationships" xmlns:p="http://schemas.openxmlformats.org/presentationml/2006/main">
   <p:cSld>
     <p:spTree>
@@ -22340,7 +23710,7 @@
 </p:sld>
 </file>
 
-<file path=ppt/slides/slide15.xml><?xml version="1.0" encoding="utf-8"?>
+<file path=ppt/slides/slide14.xml><?xml version="1.0" encoding="utf-8"?>
 <p:sld xmlns:a="http://schemas.openxmlformats.org/drawingml/2006/main" xmlns:r="http://schemas.openxmlformats.org/officeDocument/2006/relationships" xmlns:p="http://schemas.openxmlformats.org/presentationml/2006/main">
   <p:cSld>
     <p:spTree>
@@ -22429,7 +23799,7 @@
 </p:sld>
 </file>
 
-<file path=ppt/slides/slide16.xml><?xml version="1.0" encoding="utf-8"?>
+<file path=ppt/slides/slide15.xml><?xml version="1.0" encoding="utf-8"?>
 <p:sld xmlns:a="http://schemas.openxmlformats.org/drawingml/2006/main" xmlns:r="http://schemas.openxmlformats.org/officeDocument/2006/relationships" xmlns:p="http://schemas.openxmlformats.org/presentationml/2006/main">
   <p:cSld>
     <p:spTree>
@@ -22505,7 +23875,7 @@
 </p:sld>
 </file>
 
-<file path=ppt/slides/slide17.xml><?xml version="1.0" encoding="utf-8"?>
+<file path=ppt/slides/slide16.xml><?xml version="1.0" encoding="utf-8"?>
 <p:sld xmlns:a="http://schemas.openxmlformats.org/drawingml/2006/main" xmlns:r="http://schemas.openxmlformats.org/officeDocument/2006/relationships" xmlns:p="http://schemas.openxmlformats.org/presentationml/2006/main">
   <p:cSld>
     <p:spTree>
@@ -22594,7 +23964,7 @@
 </p:sld>
 </file>
 
-<file path=ppt/slides/slide18.xml><?xml version="1.0" encoding="utf-8"?>
+<file path=ppt/slides/slide17.xml><?xml version="1.0" encoding="utf-8"?>
 <p:sld xmlns:a="http://schemas.openxmlformats.org/drawingml/2006/main" xmlns:r="http://schemas.openxmlformats.org/officeDocument/2006/relationships" xmlns:p="http://schemas.openxmlformats.org/presentationml/2006/main">
   <p:cSld>
     <p:spTree>
@@ -22683,7 +24053,7 @@
 </p:sld>
 </file>
 
-<file path=ppt/slides/slide19.xml><?xml version="1.0" encoding="utf-8"?>
+<file path=ppt/slides/slide18.xml><?xml version="1.0" encoding="utf-8"?>
 <p:sld xmlns:a="http://schemas.openxmlformats.org/drawingml/2006/main" xmlns:r="http://schemas.openxmlformats.org/officeDocument/2006/relationships" xmlns:p="http://schemas.openxmlformats.org/presentationml/2006/main">
   <p:cSld>
     <p:spTree>
@@ -22763,6 +24133,95 @@
     <p:extLst>
       <p:ext uri="{BB962C8B-B14F-4D97-AF65-F5344CB8AC3E}">
         <p14:creationId xmlns:p14="http://schemas.microsoft.com/office/powerpoint/2010/main" val="3747504028"/>
+      </p:ext>
+    </p:extLst>
+  </p:cSld>
+  <p:clrMapOvr>
+    <a:masterClrMapping/>
+  </p:clrMapOvr>
+</p:sld>
+</file>
+
+<file path=ppt/slides/slide19.xml><?xml version="1.0" encoding="utf-8"?>
+<p:sld xmlns:a="http://schemas.openxmlformats.org/drawingml/2006/main" xmlns:r="http://schemas.openxmlformats.org/officeDocument/2006/relationships" xmlns:p="http://schemas.openxmlformats.org/presentationml/2006/main">
+  <p:cSld>
+    <p:spTree>
+      <p:nvGrpSpPr>
+        <p:cNvPr id="1" name="">
+          <a:extLst>
+            <a:ext uri="{FF2B5EF4-FFF2-40B4-BE49-F238E27FC236}">
+              <a16:creationId xmlns:a16="http://schemas.microsoft.com/office/drawing/2014/main" id="{F1327596-6B21-6CE8-D4D8-E60193A930AD}"/>
+            </a:ext>
+          </a:extLst>
+        </p:cNvPr>
+        <p:cNvGrpSpPr/>
+        <p:nvPr/>
+      </p:nvGrpSpPr>
+      <p:grpSpPr>
+        <a:xfrm>
+          <a:off x="0" y="0"/>
+          <a:ext cx="0" cy="0"/>
+          <a:chOff x="0" y="0"/>
+          <a:chExt cx="0" cy="0"/>
+        </a:xfrm>
+      </p:grpSpPr>
+      <p:sp>
+        <p:nvSpPr>
+          <p:cNvPr id="2" name="Title 1">
+            <a:extLst>
+              <a:ext uri="{FF2B5EF4-FFF2-40B4-BE49-F238E27FC236}">
+                <a16:creationId xmlns:a16="http://schemas.microsoft.com/office/drawing/2014/main" id="{831E46DE-69CA-3147-1F20-A5A427C3C3E0}"/>
+              </a:ext>
+            </a:extLst>
+          </p:cNvPr>
+          <p:cNvSpPr>
+            <a:spLocks noGrp="1"/>
+          </p:cNvSpPr>
+          <p:nvPr>
+            <p:ph type="title"/>
+          </p:nvPr>
+        </p:nvSpPr>
+        <p:spPr/>
+        <p:txBody>
+          <a:bodyPr/>
+          <a:lstStyle/>
+          <a:p>
+            <a:r>
+              <a:rPr lang="en-US" dirty="0"/>
+              <a:t>Software &amp; System Design: EEG Hardware</a:t>
+            </a:r>
+          </a:p>
+        </p:txBody>
+      </p:sp>
+      <p:sp>
+        <p:nvSpPr>
+          <p:cNvPr id="3" name="Content Placeholder 2">
+            <a:extLst>
+              <a:ext uri="{FF2B5EF4-FFF2-40B4-BE49-F238E27FC236}">
+                <a16:creationId xmlns:a16="http://schemas.microsoft.com/office/drawing/2014/main" id="{29F10B4D-A347-D3E1-4DB0-446ECD784FB4}"/>
+              </a:ext>
+            </a:extLst>
+          </p:cNvPr>
+          <p:cNvSpPr>
+            <a:spLocks noGrp="1"/>
+          </p:cNvSpPr>
+          <p:nvPr>
+            <p:ph idx="1"/>
+          </p:nvPr>
+        </p:nvSpPr>
+        <p:spPr/>
+        <p:txBody>
+          <a:bodyPr/>
+          <a:lstStyle/>
+          <a:p>
+            <a:endParaRPr lang="en-US" dirty="0"/>
+          </a:p>
+        </p:txBody>
+      </p:sp>
+    </p:spTree>
+    <p:extLst>
+      <p:ext uri="{BB962C8B-B14F-4D97-AF65-F5344CB8AC3E}">
+        <p14:creationId xmlns:p14="http://schemas.microsoft.com/office/powerpoint/2010/main" val="679562749"/>
       </p:ext>
     </p:extLst>
   </p:cSld>
@@ -22915,95 +24374,6 @@
         <p:cNvPr id="1" name="">
           <a:extLst>
             <a:ext uri="{FF2B5EF4-FFF2-40B4-BE49-F238E27FC236}">
-              <a16:creationId xmlns:a16="http://schemas.microsoft.com/office/drawing/2014/main" id="{F1327596-6B21-6CE8-D4D8-E60193A930AD}"/>
-            </a:ext>
-          </a:extLst>
-        </p:cNvPr>
-        <p:cNvGrpSpPr/>
-        <p:nvPr/>
-      </p:nvGrpSpPr>
-      <p:grpSpPr>
-        <a:xfrm>
-          <a:off x="0" y="0"/>
-          <a:ext cx="0" cy="0"/>
-          <a:chOff x="0" y="0"/>
-          <a:chExt cx="0" cy="0"/>
-        </a:xfrm>
-      </p:grpSpPr>
-      <p:sp>
-        <p:nvSpPr>
-          <p:cNvPr id="2" name="Title 1">
-            <a:extLst>
-              <a:ext uri="{FF2B5EF4-FFF2-40B4-BE49-F238E27FC236}">
-                <a16:creationId xmlns:a16="http://schemas.microsoft.com/office/drawing/2014/main" id="{831E46DE-69CA-3147-1F20-A5A427C3C3E0}"/>
-              </a:ext>
-            </a:extLst>
-          </p:cNvPr>
-          <p:cNvSpPr>
-            <a:spLocks noGrp="1"/>
-          </p:cNvSpPr>
-          <p:nvPr>
-            <p:ph type="title"/>
-          </p:nvPr>
-        </p:nvSpPr>
-        <p:spPr/>
-        <p:txBody>
-          <a:bodyPr/>
-          <a:lstStyle/>
-          <a:p>
-            <a:r>
-              <a:rPr lang="en-US" dirty="0"/>
-              <a:t>Software &amp; System Design: EEG Hardware</a:t>
-            </a:r>
-          </a:p>
-        </p:txBody>
-      </p:sp>
-      <p:sp>
-        <p:nvSpPr>
-          <p:cNvPr id="3" name="Content Placeholder 2">
-            <a:extLst>
-              <a:ext uri="{FF2B5EF4-FFF2-40B4-BE49-F238E27FC236}">
-                <a16:creationId xmlns:a16="http://schemas.microsoft.com/office/drawing/2014/main" id="{29F10B4D-A347-D3E1-4DB0-446ECD784FB4}"/>
-              </a:ext>
-            </a:extLst>
-          </p:cNvPr>
-          <p:cNvSpPr>
-            <a:spLocks noGrp="1"/>
-          </p:cNvSpPr>
-          <p:nvPr>
-            <p:ph idx="1"/>
-          </p:nvPr>
-        </p:nvSpPr>
-        <p:spPr/>
-        <p:txBody>
-          <a:bodyPr/>
-          <a:lstStyle/>
-          <a:p>
-            <a:endParaRPr lang="en-US" dirty="0"/>
-          </a:p>
-        </p:txBody>
-      </p:sp>
-    </p:spTree>
-    <p:extLst>
-      <p:ext uri="{BB962C8B-B14F-4D97-AF65-F5344CB8AC3E}">
-        <p14:creationId xmlns:p14="http://schemas.microsoft.com/office/powerpoint/2010/main" val="679562749"/>
-      </p:ext>
-    </p:extLst>
-  </p:cSld>
-  <p:clrMapOvr>
-    <a:masterClrMapping/>
-  </p:clrMapOvr>
-</p:sld>
-</file>
-
-<file path=ppt/slides/slide21.xml><?xml version="1.0" encoding="utf-8"?>
-<p:sld xmlns:a="http://schemas.openxmlformats.org/drawingml/2006/main" xmlns:r="http://schemas.openxmlformats.org/officeDocument/2006/relationships" xmlns:p="http://schemas.openxmlformats.org/presentationml/2006/main">
-  <p:cSld>
-    <p:spTree>
-      <p:nvGrpSpPr>
-        <p:cNvPr id="1" name="">
-          <a:extLst>
-            <a:ext uri="{FF2B5EF4-FFF2-40B4-BE49-F238E27FC236}">
               <a16:creationId xmlns:a16="http://schemas.microsoft.com/office/drawing/2014/main" id="{8860BC07-EF42-7935-BD6F-E6377D403115}"/>
             </a:ext>
           </a:extLst>
@@ -23085,7 +24455,7 @@
 </p:sld>
 </file>
 
-<file path=ppt/slides/slide22.xml><?xml version="1.0" encoding="utf-8"?>
+<file path=ppt/slides/slide21.xml><?xml version="1.0" encoding="utf-8"?>
 <p:sld xmlns:a="http://schemas.openxmlformats.org/drawingml/2006/main" xmlns:r="http://schemas.openxmlformats.org/officeDocument/2006/relationships" xmlns:p="http://schemas.openxmlformats.org/presentationml/2006/main">
   <p:cSld>
     <p:spTree>
@@ -23174,7 +24544,7 @@
 </p:sld>
 </file>
 
-<file path=ppt/slides/slide23.xml><?xml version="1.0" encoding="utf-8"?>
+<file path=ppt/slides/slide22.xml><?xml version="1.0" encoding="utf-8"?>
 <p:sld xmlns:a="http://schemas.openxmlformats.org/drawingml/2006/main" xmlns:r="http://schemas.openxmlformats.org/officeDocument/2006/relationships" xmlns:p="http://schemas.openxmlformats.org/presentationml/2006/main">
   <p:cSld>
     <p:spTree>
@@ -23263,7 +24633,7 @@
 </p:sld>
 </file>
 
-<file path=ppt/slides/slide24.xml><?xml version="1.0" encoding="utf-8"?>
+<file path=ppt/slides/slide23.xml><?xml version="1.0" encoding="utf-8"?>
 <p:sld xmlns:a="http://schemas.openxmlformats.org/drawingml/2006/main" xmlns:r="http://schemas.openxmlformats.org/officeDocument/2006/relationships" xmlns:p="http://schemas.openxmlformats.org/presentationml/2006/main">
   <p:cSld>
     <p:spTree>
@@ -23352,7 +24722,7 @@
 </p:sld>
 </file>
 
-<file path=ppt/slides/slide25.xml><?xml version="1.0" encoding="utf-8"?>
+<file path=ppt/slides/slide24.xml><?xml version="1.0" encoding="utf-8"?>
 <p:sld xmlns:a="http://schemas.openxmlformats.org/drawingml/2006/main" xmlns:r="http://schemas.openxmlformats.org/officeDocument/2006/relationships" xmlns:p="http://schemas.openxmlformats.org/presentationml/2006/main">
   <p:cSld>
     <p:spTree>
@@ -23441,7 +24811,7 @@
 </p:sld>
 </file>
 
-<file path=ppt/slides/slide26.xml><?xml version="1.0" encoding="utf-8"?>
+<file path=ppt/slides/slide25.xml><?xml version="1.0" encoding="utf-8"?>
 <p:sld xmlns:a="http://schemas.openxmlformats.org/drawingml/2006/main" xmlns:r="http://schemas.openxmlformats.org/officeDocument/2006/relationships" xmlns:p="http://schemas.openxmlformats.org/presentationml/2006/main">
   <p:cSld>
     <p:spTree>
@@ -23530,7 +24900,7 @@
 </p:sld>
 </file>
 
-<file path=ppt/slides/slide27.xml><?xml version="1.0" encoding="utf-8"?>
+<file path=ppt/slides/slide26.xml><?xml version="1.0" encoding="utf-8"?>
 <p:sld xmlns:a="http://schemas.openxmlformats.org/drawingml/2006/main" xmlns:r="http://schemas.openxmlformats.org/officeDocument/2006/relationships" xmlns:p="http://schemas.openxmlformats.org/presentationml/2006/main">
   <p:cSld>
     <p:spTree>
@@ -23619,7 +24989,7 @@
 </p:sld>
 </file>
 
-<file path=ppt/slides/slide28.xml><?xml version="1.0" encoding="utf-8"?>
+<file path=ppt/slides/slide27.xml><?xml version="1.0" encoding="utf-8"?>
 <p:sld xmlns:a="http://schemas.openxmlformats.org/drawingml/2006/main" xmlns:r="http://schemas.openxmlformats.org/officeDocument/2006/relationships" xmlns:p="http://schemas.openxmlformats.org/presentationml/2006/main">
   <p:cSld>
     <p:spTree>
@@ -23708,7 +25078,7 @@
 </p:sld>
 </file>
 
-<file path=ppt/slides/slide29.xml><?xml version="1.0" encoding="utf-8"?>
+<file path=ppt/slides/slide28.xml><?xml version="1.0" encoding="utf-8"?>
 <p:sld xmlns:a="http://schemas.openxmlformats.org/drawingml/2006/main" xmlns:r="http://schemas.openxmlformats.org/officeDocument/2006/relationships" xmlns:p="http://schemas.openxmlformats.org/presentationml/2006/main">
   <p:cSld>
     <p:spTree>
@@ -23788,6 +25158,95 @@
     <p:extLst>
       <p:ext uri="{BB962C8B-B14F-4D97-AF65-F5344CB8AC3E}">
         <p14:creationId xmlns:p14="http://schemas.microsoft.com/office/powerpoint/2010/main" val="3530715501"/>
+      </p:ext>
+    </p:extLst>
+  </p:cSld>
+  <p:clrMapOvr>
+    <a:masterClrMapping/>
+  </p:clrMapOvr>
+</p:sld>
+</file>
+
+<file path=ppt/slides/slide29.xml><?xml version="1.0" encoding="utf-8"?>
+<p:sld xmlns:a="http://schemas.openxmlformats.org/drawingml/2006/main" xmlns:r="http://schemas.openxmlformats.org/officeDocument/2006/relationships" xmlns:p="http://schemas.openxmlformats.org/presentationml/2006/main">
+  <p:cSld>
+    <p:spTree>
+      <p:nvGrpSpPr>
+        <p:cNvPr id="1" name="">
+          <a:extLst>
+            <a:ext uri="{FF2B5EF4-FFF2-40B4-BE49-F238E27FC236}">
+              <a16:creationId xmlns:a16="http://schemas.microsoft.com/office/drawing/2014/main" id="{0BFEC8FD-3801-17C1-E9C7-543679E06DD6}"/>
+            </a:ext>
+          </a:extLst>
+        </p:cNvPr>
+        <p:cNvGrpSpPr/>
+        <p:nvPr/>
+      </p:nvGrpSpPr>
+      <p:grpSpPr>
+        <a:xfrm>
+          <a:off x="0" y="0"/>
+          <a:ext cx="0" cy="0"/>
+          <a:chOff x="0" y="0"/>
+          <a:chExt cx="0" cy="0"/>
+        </a:xfrm>
+      </p:grpSpPr>
+      <p:sp>
+        <p:nvSpPr>
+          <p:cNvPr id="2" name="Title 1">
+            <a:extLst>
+              <a:ext uri="{FF2B5EF4-FFF2-40B4-BE49-F238E27FC236}">
+                <a16:creationId xmlns:a16="http://schemas.microsoft.com/office/drawing/2014/main" id="{489189F0-FA72-DBFF-FF9E-BD6139794514}"/>
+              </a:ext>
+            </a:extLst>
+          </p:cNvPr>
+          <p:cNvSpPr>
+            <a:spLocks noGrp="1"/>
+          </p:cNvSpPr>
+          <p:nvPr>
+            <p:ph type="title"/>
+          </p:nvPr>
+        </p:nvSpPr>
+        <p:spPr/>
+        <p:txBody>
+          <a:bodyPr/>
+          <a:lstStyle/>
+          <a:p>
+            <a:r>
+              <a:rPr lang="en-US" dirty="0"/>
+              <a:t>Software &amp; System Design: NeuroGaze Design Architecture</a:t>
+            </a:r>
+          </a:p>
+        </p:txBody>
+      </p:sp>
+      <p:sp>
+        <p:nvSpPr>
+          <p:cNvPr id="3" name="Content Placeholder 2">
+            <a:extLst>
+              <a:ext uri="{FF2B5EF4-FFF2-40B4-BE49-F238E27FC236}">
+                <a16:creationId xmlns:a16="http://schemas.microsoft.com/office/drawing/2014/main" id="{2425D9C9-2799-7568-6ED3-948B859771A2}"/>
+              </a:ext>
+            </a:extLst>
+          </p:cNvPr>
+          <p:cNvSpPr>
+            <a:spLocks noGrp="1"/>
+          </p:cNvSpPr>
+          <p:nvPr>
+            <p:ph idx="1"/>
+          </p:nvPr>
+        </p:nvSpPr>
+        <p:spPr/>
+        <p:txBody>
+          <a:bodyPr/>
+          <a:lstStyle/>
+          <a:p>
+            <a:endParaRPr lang="en-US" dirty="0"/>
+          </a:p>
+        </p:txBody>
+      </p:sp>
+    </p:spTree>
+    <p:extLst>
+      <p:ext uri="{BB962C8B-B14F-4D97-AF65-F5344CB8AC3E}">
+        <p14:creationId xmlns:p14="http://schemas.microsoft.com/office/powerpoint/2010/main" val="3689775091"/>
       </p:ext>
     </p:extLst>
   </p:cSld>
@@ -24497,95 +25956,6 @@
         <p:cNvPr id="1" name="">
           <a:extLst>
             <a:ext uri="{FF2B5EF4-FFF2-40B4-BE49-F238E27FC236}">
-              <a16:creationId xmlns:a16="http://schemas.microsoft.com/office/drawing/2014/main" id="{0BFEC8FD-3801-17C1-E9C7-543679E06DD6}"/>
-            </a:ext>
-          </a:extLst>
-        </p:cNvPr>
-        <p:cNvGrpSpPr/>
-        <p:nvPr/>
-      </p:nvGrpSpPr>
-      <p:grpSpPr>
-        <a:xfrm>
-          <a:off x="0" y="0"/>
-          <a:ext cx="0" cy="0"/>
-          <a:chOff x="0" y="0"/>
-          <a:chExt cx="0" cy="0"/>
-        </a:xfrm>
-      </p:grpSpPr>
-      <p:sp>
-        <p:nvSpPr>
-          <p:cNvPr id="2" name="Title 1">
-            <a:extLst>
-              <a:ext uri="{FF2B5EF4-FFF2-40B4-BE49-F238E27FC236}">
-                <a16:creationId xmlns:a16="http://schemas.microsoft.com/office/drawing/2014/main" id="{489189F0-FA72-DBFF-FF9E-BD6139794514}"/>
-              </a:ext>
-            </a:extLst>
-          </p:cNvPr>
-          <p:cNvSpPr>
-            <a:spLocks noGrp="1"/>
-          </p:cNvSpPr>
-          <p:nvPr>
-            <p:ph type="title"/>
-          </p:nvPr>
-        </p:nvSpPr>
-        <p:spPr/>
-        <p:txBody>
-          <a:bodyPr/>
-          <a:lstStyle/>
-          <a:p>
-            <a:r>
-              <a:rPr lang="en-US" dirty="0"/>
-              <a:t>Software &amp; System Design: NeuroGaze Design Architecture</a:t>
-            </a:r>
-          </a:p>
-        </p:txBody>
-      </p:sp>
-      <p:sp>
-        <p:nvSpPr>
-          <p:cNvPr id="3" name="Content Placeholder 2">
-            <a:extLst>
-              <a:ext uri="{FF2B5EF4-FFF2-40B4-BE49-F238E27FC236}">
-                <a16:creationId xmlns:a16="http://schemas.microsoft.com/office/drawing/2014/main" id="{2425D9C9-2799-7568-6ED3-948B859771A2}"/>
-              </a:ext>
-            </a:extLst>
-          </p:cNvPr>
-          <p:cNvSpPr>
-            <a:spLocks noGrp="1"/>
-          </p:cNvSpPr>
-          <p:nvPr>
-            <p:ph idx="1"/>
-          </p:nvPr>
-        </p:nvSpPr>
-        <p:spPr/>
-        <p:txBody>
-          <a:bodyPr/>
-          <a:lstStyle/>
-          <a:p>
-            <a:endParaRPr lang="en-US" dirty="0"/>
-          </a:p>
-        </p:txBody>
-      </p:sp>
-    </p:spTree>
-    <p:extLst>
-      <p:ext uri="{BB962C8B-B14F-4D97-AF65-F5344CB8AC3E}">
-        <p14:creationId xmlns:p14="http://schemas.microsoft.com/office/powerpoint/2010/main" val="3689775091"/>
-      </p:ext>
-    </p:extLst>
-  </p:cSld>
-  <p:clrMapOvr>
-    <a:masterClrMapping/>
-  </p:clrMapOvr>
-</p:sld>
-</file>
-
-<file path=ppt/slides/slide31.xml><?xml version="1.0" encoding="utf-8"?>
-<p:sld xmlns:a="http://schemas.openxmlformats.org/drawingml/2006/main" xmlns:r="http://schemas.openxmlformats.org/officeDocument/2006/relationships" xmlns:p="http://schemas.openxmlformats.org/presentationml/2006/main">
-  <p:cSld>
-    <p:spTree>
-      <p:nvGrpSpPr>
-        <p:cNvPr id="1" name="">
-          <a:extLst>
-            <a:ext uri="{FF2B5EF4-FFF2-40B4-BE49-F238E27FC236}">
               <a16:creationId xmlns:a16="http://schemas.microsoft.com/office/drawing/2014/main" id="{2C225CC1-98EA-5283-D182-FCA492784DEF}"/>
             </a:ext>
           </a:extLst>
@@ -24654,7 +26024,7 @@
 </p:sld>
 </file>
 
-<file path=ppt/slides/slide32.xml><?xml version="1.0" encoding="utf-8"?>
+<file path=ppt/slides/slide31.xml><?xml version="1.0" encoding="utf-8"?>
 <p:sld xmlns:a="http://schemas.openxmlformats.org/drawingml/2006/main" xmlns:r="http://schemas.openxmlformats.org/officeDocument/2006/relationships" xmlns:p="http://schemas.openxmlformats.org/presentationml/2006/main">
   <p:cSld>
     <p:spTree>
@@ -24743,7 +26113,7 @@
 </p:sld>
 </file>
 
-<file path=ppt/slides/slide33.xml><?xml version="1.0" encoding="utf-8"?>
+<file path=ppt/slides/slide32.xml><?xml version="1.0" encoding="utf-8"?>
 <p:sld xmlns:a="http://schemas.openxmlformats.org/drawingml/2006/main" xmlns:r="http://schemas.openxmlformats.org/officeDocument/2006/relationships" xmlns:p="http://schemas.openxmlformats.org/presentationml/2006/main">
   <p:cSld>
     <p:spTree>
@@ -24832,7 +26202,7 @@
 </p:sld>
 </file>
 
-<file path=ppt/slides/slide34.xml><?xml version="1.0" encoding="utf-8"?>
+<file path=ppt/slides/slide33.xml><?xml version="1.0" encoding="utf-8"?>
 <p:sld xmlns:a="http://schemas.openxmlformats.org/drawingml/2006/main" xmlns:r="http://schemas.openxmlformats.org/officeDocument/2006/relationships" xmlns:p="http://schemas.openxmlformats.org/presentationml/2006/main">
   <p:cSld>
     <p:spTree>
@@ -24921,7 +26291,7 @@
 </p:sld>
 </file>
 
-<file path=ppt/slides/slide35.xml><?xml version="1.0" encoding="utf-8"?>
+<file path=ppt/slides/slide34.xml><?xml version="1.0" encoding="utf-8"?>
 <p:sld xmlns:a="http://schemas.openxmlformats.org/drawingml/2006/main" xmlns:r="http://schemas.openxmlformats.org/officeDocument/2006/relationships" xmlns:p="http://schemas.openxmlformats.org/presentationml/2006/main">
   <p:cSld>
     <p:spTree>
@@ -25015,7 +26385,7 @@
 </p:sld>
 </file>
 
-<file path=ppt/slides/slide36.xml><?xml version="1.0" encoding="utf-8"?>
+<file path=ppt/slides/slide35.xml><?xml version="1.0" encoding="utf-8"?>
 <p:sld xmlns:a="http://schemas.openxmlformats.org/drawingml/2006/main" xmlns:r="http://schemas.openxmlformats.org/officeDocument/2006/relationships" xmlns:p="http://schemas.openxmlformats.org/presentationml/2006/main">
   <p:cSld>
     <p:spTree>
@@ -25109,7 +26479,7 @@
 </p:sld>
 </file>
 
-<file path=ppt/slides/slide37.xml><?xml version="1.0" encoding="utf-8"?>
+<file path=ppt/slides/slide36.xml><?xml version="1.0" encoding="utf-8"?>
 <p:sld xmlns:a="http://schemas.openxmlformats.org/drawingml/2006/main" xmlns:r="http://schemas.openxmlformats.org/officeDocument/2006/relationships" xmlns:p="http://schemas.openxmlformats.org/presentationml/2006/main">
   <p:cSld>
     <p:spTree>
@@ -25203,7 +26573,7 @@
 </p:sld>
 </file>
 
-<file path=ppt/slides/slide38.xml><?xml version="1.0" encoding="utf-8"?>
+<file path=ppt/slides/slide37.xml><?xml version="1.0" encoding="utf-8"?>
 <p:sld xmlns:a="http://schemas.openxmlformats.org/drawingml/2006/main" xmlns:r="http://schemas.openxmlformats.org/officeDocument/2006/relationships" xmlns:p="http://schemas.openxmlformats.org/presentationml/2006/main">
   <p:cSld>
     <p:spTree>
@@ -25297,7 +26667,7 @@
 </p:sld>
 </file>
 
-<file path=ppt/slides/slide39.xml><?xml version="1.0" encoding="utf-8"?>
+<file path=ppt/slides/slide38.xml><?xml version="1.0" encoding="utf-8"?>
 <p:sld xmlns:a="http://schemas.openxmlformats.org/drawingml/2006/main" xmlns:r="http://schemas.openxmlformats.org/officeDocument/2006/relationships" xmlns:p="http://schemas.openxmlformats.org/presentationml/2006/main">
   <p:cSld>
     <p:spTree>
@@ -25382,6 +26752,100 @@
     <p:extLst>
       <p:ext uri="{BB962C8B-B14F-4D97-AF65-F5344CB8AC3E}">
         <p14:creationId xmlns:p14="http://schemas.microsoft.com/office/powerpoint/2010/main" val="197765116"/>
+      </p:ext>
+    </p:extLst>
+  </p:cSld>
+  <p:clrMapOvr>
+    <a:masterClrMapping/>
+  </p:clrMapOvr>
+</p:sld>
+</file>
+
+<file path=ppt/slides/slide39.xml><?xml version="1.0" encoding="utf-8"?>
+<p:sld xmlns:a="http://schemas.openxmlformats.org/drawingml/2006/main" xmlns:r="http://schemas.openxmlformats.org/officeDocument/2006/relationships" xmlns:p="http://schemas.openxmlformats.org/presentationml/2006/main">
+  <p:cSld>
+    <p:spTree>
+      <p:nvGrpSpPr>
+        <p:cNvPr id="1" name="">
+          <a:extLst>
+            <a:ext uri="{FF2B5EF4-FFF2-40B4-BE49-F238E27FC236}">
+              <a16:creationId xmlns:a16="http://schemas.microsoft.com/office/drawing/2014/main" id="{8E217584-CE09-1CEA-9DF5-8D80F41D080F}"/>
+            </a:ext>
+          </a:extLst>
+        </p:cNvPr>
+        <p:cNvGrpSpPr/>
+        <p:nvPr/>
+      </p:nvGrpSpPr>
+      <p:grpSpPr>
+        <a:xfrm>
+          <a:off x="0" y="0"/>
+          <a:ext cx="0" cy="0"/>
+          <a:chOff x="0" y="0"/>
+          <a:chExt cx="0" cy="0"/>
+        </a:xfrm>
+      </p:grpSpPr>
+      <p:sp>
+        <p:nvSpPr>
+          <p:cNvPr id="2" name="Title 1">
+            <a:extLst>
+              <a:ext uri="{FF2B5EF4-FFF2-40B4-BE49-F238E27FC236}">
+                <a16:creationId xmlns:a16="http://schemas.microsoft.com/office/drawing/2014/main" id="{BB5414E0-FB26-B90E-5BA2-70744B340E62}"/>
+              </a:ext>
+            </a:extLst>
+          </p:cNvPr>
+          <p:cNvSpPr>
+            <a:spLocks noGrp="1"/>
+          </p:cNvSpPr>
+          <p:nvPr>
+            <p:ph type="title"/>
+          </p:nvPr>
+        </p:nvSpPr>
+        <p:spPr>
+          <a:xfrm>
+            <a:off x="1104900" y="1124950"/>
+            <a:ext cx="9982199" cy="981801"/>
+          </a:xfrm>
+        </p:spPr>
+        <p:txBody>
+          <a:bodyPr/>
+          <a:lstStyle/>
+          <a:p>
+            <a:r>
+              <a:rPr lang="en-US" dirty="0"/>
+              <a:t>User Study: Discussion</a:t>
+            </a:r>
+          </a:p>
+        </p:txBody>
+      </p:sp>
+      <p:sp>
+        <p:nvSpPr>
+          <p:cNvPr id="3" name="Content Placeholder 2">
+            <a:extLst>
+              <a:ext uri="{FF2B5EF4-FFF2-40B4-BE49-F238E27FC236}">
+                <a16:creationId xmlns:a16="http://schemas.microsoft.com/office/drawing/2014/main" id="{AD9C581E-B3E7-D790-DACB-EA9A5C77339F}"/>
+              </a:ext>
+            </a:extLst>
+          </p:cNvPr>
+          <p:cNvSpPr>
+            <a:spLocks noGrp="1"/>
+          </p:cNvSpPr>
+          <p:nvPr>
+            <p:ph idx="1"/>
+          </p:nvPr>
+        </p:nvSpPr>
+        <p:spPr/>
+        <p:txBody>
+          <a:bodyPr/>
+          <a:lstStyle/>
+          <a:p>
+            <a:endParaRPr lang="en-US" dirty="0"/>
+          </a:p>
+        </p:txBody>
+      </p:sp>
+    </p:spTree>
+    <p:extLst>
+      <p:ext uri="{BB962C8B-B14F-4D97-AF65-F5344CB8AC3E}">
+        <p14:creationId xmlns:p14="http://schemas.microsoft.com/office/powerpoint/2010/main" val="1994865373"/>
       </p:ext>
     </p:extLst>
   </p:cSld>
@@ -25475,100 +26939,6 @@
         <p:cNvPr id="1" name="">
           <a:extLst>
             <a:ext uri="{FF2B5EF4-FFF2-40B4-BE49-F238E27FC236}">
-              <a16:creationId xmlns:a16="http://schemas.microsoft.com/office/drawing/2014/main" id="{8E217584-CE09-1CEA-9DF5-8D80F41D080F}"/>
-            </a:ext>
-          </a:extLst>
-        </p:cNvPr>
-        <p:cNvGrpSpPr/>
-        <p:nvPr/>
-      </p:nvGrpSpPr>
-      <p:grpSpPr>
-        <a:xfrm>
-          <a:off x="0" y="0"/>
-          <a:ext cx="0" cy="0"/>
-          <a:chOff x="0" y="0"/>
-          <a:chExt cx="0" cy="0"/>
-        </a:xfrm>
-      </p:grpSpPr>
-      <p:sp>
-        <p:nvSpPr>
-          <p:cNvPr id="2" name="Title 1">
-            <a:extLst>
-              <a:ext uri="{FF2B5EF4-FFF2-40B4-BE49-F238E27FC236}">
-                <a16:creationId xmlns:a16="http://schemas.microsoft.com/office/drawing/2014/main" id="{BB5414E0-FB26-B90E-5BA2-70744B340E62}"/>
-              </a:ext>
-            </a:extLst>
-          </p:cNvPr>
-          <p:cNvSpPr>
-            <a:spLocks noGrp="1"/>
-          </p:cNvSpPr>
-          <p:nvPr>
-            <p:ph type="title"/>
-          </p:nvPr>
-        </p:nvSpPr>
-        <p:spPr>
-          <a:xfrm>
-            <a:off x="1104900" y="1124950"/>
-            <a:ext cx="9982199" cy="981801"/>
-          </a:xfrm>
-        </p:spPr>
-        <p:txBody>
-          <a:bodyPr/>
-          <a:lstStyle/>
-          <a:p>
-            <a:r>
-              <a:rPr lang="en-US" dirty="0"/>
-              <a:t>User Study: Discussion</a:t>
-            </a:r>
-          </a:p>
-        </p:txBody>
-      </p:sp>
-      <p:sp>
-        <p:nvSpPr>
-          <p:cNvPr id="3" name="Content Placeholder 2">
-            <a:extLst>
-              <a:ext uri="{FF2B5EF4-FFF2-40B4-BE49-F238E27FC236}">
-                <a16:creationId xmlns:a16="http://schemas.microsoft.com/office/drawing/2014/main" id="{AD9C581E-B3E7-D790-DACB-EA9A5C77339F}"/>
-              </a:ext>
-            </a:extLst>
-          </p:cNvPr>
-          <p:cNvSpPr>
-            <a:spLocks noGrp="1"/>
-          </p:cNvSpPr>
-          <p:nvPr>
-            <p:ph idx="1"/>
-          </p:nvPr>
-        </p:nvSpPr>
-        <p:spPr/>
-        <p:txBody>
-          <a:bodyPr/>
-          <a:lstStyle/>
-          <a:p>
-            <a:endParaRPr lang="en-US" dirty="0"/>
-          </a:p>
-        </p:txBody>
-      </p:sp>
-    </p:spTree>
-    <p:extLst>
-      <p:ext uri="{BB962C8B-B14F-4D97-AF65-F5344CB8AC3E}">
-        <p14:creationId xmlns:p14="http://schemas.microsoft.com/office/powerpoint/2010/main" val="1994865373"/>
-      </p:ext>
-    </p:extLst>
-  </p:cSld>
-  <p:clrMapOvr>
-    <a:masterClrMapping/>
-  </p:clrMapOvr>
-</p:sld>
-</file>
-
-<file path=ppt/slides/slide41.xml><?xml version="1.0" encoding="utf-8"?>
-<p:sld xmlns:a="http://schemas.openxmlformats.org/drawingml/2006/main" xmlns:r="http://schemas.openxmlformats.org/officeDocument/2006/relationships" xmlns:p="http://schemas.openxmlformats.org/presentationml/2006/main">
-  <p:cSld>
-    <p:spTree>
-      <p:nvGrpSpPr>
-        <p:cNvPr id="1" name="">
-          <a:extLst>
-            <a:ext uri="{FF2B5EF4-FFF2-40B4-BE49-F238E27FC236}">
               <a16:creationId xmlns:a16="http://schemas.microsoft.com/office/drawing/2014/main" id="{8449E08F-E504-AA07-142C-60DF837E00DC}"/>
             </a:ext>
           </a:extLst>
@@ -25637,7 +27007,7 @@
 </p:sld>
 </file>
 
-<file path=ppt/slides/slide42.xml><?xml version="1.0" encoding="utf-8"?>
+<file path=ppt/slides/slide41.xml><?xml version="1.0" encoding="utf-8"?>
 <p:sld xmlns:a="http://schemas.openxmlformats.org/drawingml/2006/main" xmlns:r="http://schemas.openxmlformats.org/officeDocument/2006/relationships" xmlns:p="http://schemas.openxmlformats.org/presentationml/2006/main">
   <p:cSld>
     <p:spTree>
@@ -25688,7 +27058,7 @@
           <a:p>
             <a:r>
               <a:rPr lang="en-US" dirty="0"/>
-              <a:t>Future Work: Addressing Ergonomics</a:t>
+              <a:t>Future Work: Addressing Ergonomics &amp; Limitations</a:t>
             </a:r>
           </a:p>
         </p:txBody>
@@ -25714,7 +27084,38 @@
           <a:bodyPr/>
           <a:lstStyle/>
           <a:p>
+            <a:r>
+              <a:rPr lang="en-US" dirty="0" err="1"/>
+              <a:t>Dwdw</a:t>
+            </a:r>
             <a:endParaRPr lang="en-US" dirty="0"/>
+          </a:p>
+          <a:p>
+            <a:r>
+              <a:rPr lang="en-US" dirty="0" err="1"/>
+              <a:t>Dwdwd</a:t>
+            </a:r>
+            <a:endParaRPr lang="en-US" dirty="0"/>
+          </a:p>
+          <a:p>
+            <a:r>
+              <a:rPr lang="en-US" dirty="0" err="1"/>
+              <a:t>Wdwddw</a:t>
+            </a:r>
+            <a:endParaRPr lang="en-US" dirty="0"/>
+          </a:p>
+          <a:p>
+            <a:r>
+              <a:rPr lang="en-US" dirty="0" err="1"/>
+              <a:t>Dwdwdw</a:t>
+            </a:r>
+            <a:endParaRPr lang="en-US" dirty="0"/>
+          </a:p>
+          <a:p>
+            <a:r>
+              <a:rPr lang="en-US" dirty="0"/>
+              <a:t>Universal only pays me so much… </a:t>
+            </a:r>
           </a:p>
         </p:txBody>
       </p:sp>
@@ -25731,7 +27132,7 @@
 </p:sld>
 </file>
 
-<file path=ppt/slides/slide43.xml><?xml version="1.0" encoding="utf-8"?>
+<file path=ppt/slides/slide42.xml><?xml version="1.0" encoding="utf-8"?>
 <p:sld xmlns:a="http://schemas.openxmlformats.org/drawingml/2006/main" xmlns:r="http://schemas.openxmlformats.org/officeDocument/2006/relationships" xmlns:p="http://schemas.openxmlformats.org/presentationml/2006/main">
   <p:cSld>
     <p:spTree>
@@ -25825,7 +27226,7 @@
 </p:sld>
 </file>
 
-<file path=ppt/slides/slide44.xml><?xml version="1.0" encoding="utf-8"?>
+<file path=ppt/slides/slide43.xml><?xml version="1.0" encoding="utf-8"?>
 <p:sld xmlns:a="http://schemas.openxmlformats.org/drawingml/2006/main" xmlns:r="http://schemas.openxmlformats.org/officeDocument/2006/relationships" xmlns:p="http://schemas.openxmlformats.org/presentationml/2006/main">
   <p:cSld>
     <p:spTree>
@@ -25919,7 +27320,7 @@
 </p:sld>
 </file>
 
-<file path=ppt/slides/slide45.xml><?xml version="1.0" encoding="utf-8"?>
+<file path=ppt/slides/slide44.xml><?xml version="1.0" encoding="utf-8"?>
 <p:sld xmlns:a="http://schemas.openxmlformats.org/drawingml/2006/main" xmlns:r="http://schemas.openxmlformats.org/officeDocument/2006/relationships" xmlns:p="http://schemas.openxmlformats.org/presentationml/2006/main">
   <p:cSld>
     <p:spTree>
@@ -25995,7 +27396,7 @@
 </p:sld>
 </file>
 
-<file path=ppt/slides/slide46.xml><?xml version="1.0" encoding="utf-8"?>
+<file path=ppt/slides/slide45.xml><?xml version="1.0" encoding="utf-8"?>
 <p:sld xmlns:a="http://schemas.openxmlformats.org/drawingml/2006/main" xmlns:r="http://schemas.openxmlformats.org/officeDocument/2006/relationships" xmlns:p="http://schemas.openxmlformats.org/presentationml/2006/main">
   <p:cSld>
     <p:spTree>
@@ -26080,6 +27481,109 @@
     <p:extLst>
       <p:ext uri="{BB962C8B-B14F-4D97-AF65-F5344CB8AC3E}">
         <p14:creationId xmlns:p14="http://schemas.microsoft.com/office/powerpoint/2010/main" val="4012891072"/>
+      </p:ext>
+    </p:extLst>
+  </p:cSld>
+  <p:clrMapOvr>
+    <a:masterClrMapping/>
+  </p:clrMapOvr>
+</p:sld>
+</file>
+
+<file path=ppt/slides/slide46.xml><?xml version="1.0" encoding="utf-8"?>
+<p:sld xmlns:a="http://schemas.openxmlformats.org/drawingml/2006/main" xmlns:r="http://schemas.openxmlformats.org/officeDocument/2006/relationships" xmlns:p="http://schemas.openxmlformats.org/presentationml/2006/main">
+  <p:cSld>
+    <p:spTree>
+      <p:nvGrpSpPr>
+        <p:cNvPr id="1" name=""/>
+        <p:cNvGrpSpPr/>
+        <p:nvPr/>
+      </p:nvGrpSpPr>
+      <p:grpSpPr>
+        <a:xfrm>
+          <a:off x="0" y="0"/>
+          <a:ext cx="0" cy="0"/>
+          <a:chOff x="0" y="0"/>
+          <a:chExt cx="0" cy="0"/>
+        </a:xfrm>
+      </p:grpSpPr>
+      <p:sp>
+        <p:nvSpPr>
+          <p:cNvPr id="2" name="Title 1">
+            <a:extLst>
+              <a:ext uri="{FF2B5EF4-FFF2-40B4-BE49-F238E27FC236}">
+                <a16:creationId xmlns:a16="http://schemas.microsoft.com/office/drawing/2014/main" id="{1BE064B3-3CBE-F640-94A7-65A0B9010AA2}"/>
+              </a:ext>
+            </a:extLst>
+          </p:cNvPr>
+          <p:cNvSpPr>
+            <a:spLocks noGrp="1"/>
+          </p:cNvSpPr>
+          <p:nvPr>
+            <p:ph type="title"/>
+          </p:nvPr>
+        </p:nvSpPr>
+        <p:spPr/>
+        <p:txBody>
+          <a:bodyPr/>
+          <a:lstStyle/>
+          <a:p>
+            <a:r>
+              <a:rPr lang="en-US" dirty="0"/>
+              <a:t>INSERTING A NEW SLIDE</a:t>
+            </a:r>
+          </a:p>
+        </p:txBody>
+      </p:sp>
+      <p:sp>
+        <p:nvSpPr>
+          <p:cNvPr id="3" name="Content Placeholder 2">
+            <a:extLst>
+              <a:ext uri="{FF2B5EF4-FFF2-40B4-BE49-F238E27FC236}">
+                <a16:creationId xmlns:a16="http://schemas.microsoft.com/office/drawing/2014/main" id="{6500551A-1F49-694A-AEDC-95D6EA386A3B}"/>
+              </a:ext>
+            </a:extLst>
+          </p:cNvPr>
+          <p:cNvSpPr>
+            <a:spLocks noGrp="1"/>
+          </p:cNvSpPr>
+          <p:nvPr>
+            <p:ph idx="1"/>
+          </p:nvPr>
+        </p:nvSpPr>
+        <p:spPr>
+          <a:xfrm>
+            <a:off x="723900" y="2638696"/>
+            <a:ext cx="10744200" cy="2391105"/>
+          </a:xfrm>
+        </p:spPr>
+        <p:txBody>
+          <a:bodyPr/>
+          <a:lstStyle/>
+          <a:p>
+            <a:pPr marL="0" indent="0">
+              <a:buNone/>
+            </a:pPr>
+            <a:r>
+              <a:rPr lang="en-US" dirty="0"/>
+              <a:t>To insert a new slide, go to the “Home” Tab and click on the drop-down arrow next to “New Slide.” From there, you may select a slide layout from pre-made templates.</a:t>
+            </a:r>
+          </a:p>
+          <a:p>
+            <a:pPr marL="0" indent="0">
+              <a:buNone/>
+            </a:pPr>
+            <a:r>
+              <a:rPr lang="en-US" dirty="0"/>
+              <a:t>These will give you a starting point for your presentation, but you may need to make slight modifications — such as font size and text-box placement — based on the length of your content.</a:t>
+            </a:r>
+          </a:p>
+        </p:txBody>
+      </p:sp>
+    </p:spTree>
+    <p:extLst>
+      <p:ext uri="{BB962C8B-B14F-4D97-AF65-F5344CB8AC3E}">
+        <p14:creationId xmlns:p14="http://schemas.microsoft.com/office/powerpoint/2010/main" val="3122194143"/>
       </p:ext>
     </p:extLst>
   </p:cSld>
@@ -26111,7 +27615,7 @@
           <p:cNvPr id="2" name="Title 1">
             <a:extLst>
               <a:ext uri="{FF2B5EF4-FFF2-40B4-BE49-F238E27FC236}">
-                <a16:creationId xmlns:a16="http://schemas.microsoft.com/office/drawing/2014/main" id="{1BE064B3-3CBE-F640-94A7-65A0B9010AA2}"/>
+                <a16:creationId xmlns:a16="http://schemas.microsoft.com/office/drawing/2014/main" id="{BB4A9D69-859E-2F4B-A2D6-55364C11687F}"/>
               </a:ext>
             </a:extLst>
           </p:cNvPr>
@@ -26129,7 +27633,7 @@
           <a:p>
             <a:r>
               <a:rPr lang="en-US" dirty="0"/>
-              <a:t>INSERTING A NEW SLIDE</a:t>
+              <a:t>FEATURES</a:t>
             </a:r>
           </a:p>
         </p:txBody>
@@ -26139,7 +27643,7 @@
           <p:cNvPr id="3" name="Content Placeholder 2">
             <a:extLst>
               <a:ext uri="{FF2B5EF4-FFF2-40B4-BE49-F238E27FC236}">
-                <a16:creationId xmlns:a16="http://schemas.microsoft.com/office/drawing/2014/main" id="{6500551A-1F49-694A-AEDC-95D6EA386A3B}"/>
+                <a16:creationId xmlns:a16="http://schemas.microsoft.com/office/drawing/2014/main" id="{FD9BECCE-4C5E-1D4D-8B1A-523FBFC19033}"/>
               </a:ext>
             </a:extLst>
           </p:cNvPr>
@@ -26152,8 +27656,8 @@
         </p:nvSpPr>
         <p:spPr>
           <a:xfrm>
-            <a:off x="723900" y="2638696"/>
-            <a:ext cx="10744200" cy="2391105"/>
+            <a:off x="6553200" y="2275840"/>
+            <a:ext cx="4914899" cy="3858262"/>
           </a:xfrm>
         </p:spPr>
         <p:txBody>
@@ -26164,25 +27668,96 @@
               <a:buNone/>
             </a:pPr>
             <a:r>
-              <a:rPr lang="en-US" dirty="0"/>
-              <a:t>To insert a new slide, go to the “Home” Tab and click on the drop-down arrow next to “New Slide.” From there, you may select a slide layout from pre-made templates.</a:t>
-            </a:r>
+              <a:rPr lang="en-US" sz="1400" b="1" dirty="0">
+                <a:highlight>
+                  <a:srgbClr val="F9C423"/>
+                </a:highlight>
+                <a:latin typeface="Gotham Bold" pitchFamily="2" charset="0"/>
+                <a:cs typeface="Gotham Bold" pitchFamily="2" charset="0"/>
+              </a:rPr>
+              <a:t>FOOTER AND PAGE NUMBERS</a:t>
+            </a:r>
+            <a:br>
+              <a:rPr lang="en-US" sz="1400" b="1" dirty="0">
+                <a:highlight>
+                  <a:srgbClr val="F9C423"/>
+                </a:highlight>
+                <a:latin typeface="Gotham Bold" pitchFamily="2" charset="0"/>
+                <a:cs typeface="Gotham Bold" pitchFamily="2" charset="0"/>
+              </a:rPr>
+            </a:br>
+            <a:r>
+              <a:rPr lang="en-US" sz="1400" dirty="0"/>
+              <a:t>Slides with white backgrounds include a footer with the name of the university and page numbers that update automatically.</a:t>
+            </a:r>
+            <a:endParaRPr lang="en-US" sz="1400" b="1" dirty="0">
+              <a:latin typeface="Gotham Bold" pitchFamily="2" charset="0"/>
+              <a:cs typeface="Gotham Bold" pitchFamily="2" charset="0"/>
+            </a:endParaRPr>
           </a:p>
           <a:p>
             <a:pPr marL="0" indent="0">
               <a:buNone/>
             </a:pPr>
             <a:r>
-              <a:rPr lang="en-US" dirty="0"/>
-              <a:t>These will give you a starting point for your presentation, but you may need to make slight modifications — such as font size and text-box placement — based on the length of your content.</a:t>
-            </a:r>
+              <a:rPr lang="en-US" sz="1400" b="1" dirty="0">
+                <a:highlight>
+                  <a:srgbClr val="F9C423"/>
+                </a:highlight>
+                <a:latin typeface="Gotham Bold" pitchFamily="2" charset="0"/>
+                <a:cs typeface="Gotham Bold" pitchFamily="2" charset="0"/>
+              </a:rPr>
+              <a:t>GUIDES</a:t>
+            </a:r>
+            <a:br>
+              <a:rPr lang="en-US" sz="1400" b="1" dirty="0">
+                <a:highlight>
+                  <a:srgbClr val="F9C423"/>
+                </a:highlight>
+                <a:latin typeface="Gotham Bold" pitchFamily="2" charset="0"/>
+                <a:cs typeface="Gotham Bold" pitchFamily="2" charset="0"/>
+              </a:rPr>
+            </a:br>
+            <a:r>
+              <a:rPr lang="en-US" sz="1400" dirty="0"/>
+              <a:t>To assist with layouts, all slides include guidelines with suggested margins. Guides can be turned on and off under “View,” and then “Guides.”</a:t>
+            </a:r>
+            <a:br>
+              <a:rPr lang="en-US" sz="1400" dirty="0"/>
+            </a:br>
+            <a:endParaRPr lang="en-US" dirty="0"/>
+          </a:p>
+        </p:txBody>
+      </p:sp>
+      <p:sp>
+        <p:nvSpPr>
+          <p:cNvPr id="8" name="Picture Placeholder 7">
+            <a:extLst>
+              <a:ext uri="{FF2B5EF4-FFF2-40B4-BE49-F238E27FC236}">
+                <a16:creationId xmlns:a16="http://schemas.microsoft.com/office/drawing/2014/main" id="{A0F719E9-E61F-9F41-AC80-7FE2BB6E61AD}"/>
+              </a:ext>
+            </a:extLst>
+          </p:cNvPr>
+          <p:cNvSpPr>
+            <a:spLocks noGrp="1"/>
+          </p:cNvSpPr>
+          <p:nvPr>
+            <p:ph type="pic" sz="quarter" idx="13"/>
+          </p:nvPr>
+        </p:nvSpPr>
+        <p:spPr/>
+        <p:txBody>
+          <a:bodyPr/>
+          <a:lstStyle/>
+          <a:p>
+            <a:endParaRPr lang="en-US"/>
           </a:p>
         </p:txBody>
       </p:sp>
     </p:spTree>
     <p:extLst>
       <p:ext uri="{BB962C8B-B14F-4D97-AF65-F5344CB8AC3E}">
-        <p14:creationId xmlns:p14="http://schemas.microsoft.com/office/powerpoint/2010/main" val="3122194143"/>
+        <p14:creationId xmlns:p14="http://schemas.microsoft.com/office/powerpoint/2010/main" val="1690427527"/>
       </p:ext>
     </p:extLst>
   </p:cSld>
@@ -26214,7 +27789,7 @@
           <p:cNvPr id="2" name="Title 1">
             <a:extLst>
               <a:ext uri="{FF2B5EF4-FFF2-40B4-BE49-F238E27FC236}">
-                <a16:creationId xmlns:a16="http://schemas.microsoft.com/office/drawing/2014/main" id="{BB4A9D69-859E-2F4B-A2D6-55364C11687F}"/>
+                <a16:creationId xmlns:a16="http://schemas.microsoft.com/office/drawing/2014/main" id="{AC711B78-0083-0D4C-80FF-9DCDBB7FF23B}"/>
               </a:ext>
             </a:extLst>
           </p:cNvPr>
@@ -26232,7 +27807,7 @@
           <a:p>
             <a:r>
               <a:rPr lang="en-US" dirty="0"/>
-              <a:t>FEATURES</a:t>
+              <a:t>ADJUSTING TEXT</a:t>
             </a:r>
           </a:p>
         </p:txBody>
@@ -26242,7 +27817,7 @@
           <p:cNvPr id="3" name="Content Placeholder 2">
             <a:extLst>
               <a:ext uri="{FF2B5EF4-FFF2-40B4-BE49-F238E27FC236}">
-                <a16:creationId xmlns:a16="http://schemas.microsoft.com/office/drawing/2014/main" id="{FD9BECCE-4C5E-1D4D-8B1A-523FBFC19033}"/>
+                <a16:creationId xmlns:a16="http://schemas.microsoft.com/office/drawing/2014/main" id="{9785DCC8-DAF1-D543-8FA4-0D6AE35E2DB3}"/>
               </a:ext>
             </a:extLst>
           </p:cNvPr>
@@ -26253,10 +27828,38 @@
             <p:ph idx="1"/>
           </p:nvPr>
         </p:nvSpPr>
-        <p:spPr>
-          <a:xfrm>
-            <a:off x="6553200" y="2275840"/>
-            <a:ext cx="4914899" cy="3858262"/>
+        <p:spPr/>
+        <p:txBody>
+          <a:bodyPr/>
+          <a:lstStyle/>
+          <a:p>
+            <a:r>
+              <a:rPr lang="en-US" dirty="0"/>
+              <a:t>By default, all new text and content frames will include bulleted lists. If you would like to remove these, go to the “Home” tab, and select “None” in the “Bullets” drop-down </a:t>
+            </a:r>
+          </a:p>
+        </p:txBody>
+      </p:sp>
+      <p:sp>
+        <p:nvSpPr>
+          <p:cNvPr id="4" name="Text Placeholder 3">
+            <a:extLst>
+              <a:ext uri="{FF2B5EF4-FFF2-40B4-BE49-F238E27FC236}">
+                <a16:creationId xmlns:a16="http://schemas.microsoft.com/office/drawing/2014/main" id="{5D52FD2F-1FD6-DB4C-8FEC-C662C46AB152}"/>
+              </a:ext>
+            </a:extLst>
+          </p:cNvPr>
+          <p:cNvSpPr>
+            <a:spLocks noGrp="1"/>
+          </p:cNvSpPr>
+          <p:nvPr>
+            <p:ph type="body" sz="quarter" idx="10"/>
+          </p:nvPr>
+        </p:nvSpPr>
+        <p:spPr>
+          <a:xfrm>
+            <a:off x="4533901" y="1104900"/>
+            <a:ext cx="3086097" cy="4838700"/>
           </a:xfrm>
         </p:spPr>
         <p:txBody>
@@ -26267,17 +27870,17 @@
               <a:buNone/>
             </a:pPr>
             <a:r>
-              <a:rPr lang="en-US" sz="1400" b="1" dirty="0">
+              <a:rPr lang="en-US" b="1" dirty="0">
                 <a:highlight>
                   <a:srgbClr val="F9C423"/>
                 </a:highlight>
                 <a:latin typeface="Gotham Bold" pitchFamily="2" charset="0"/>
                 <a:cs typeface="Gotham Bold" pitchFamily="2" charset="0"/>
               </a:rPr>
-              <a:t>FOOTER AND PAGE NUMBERS</a:t>
+              <a:t>TYPEFACES</a:t>
             </a:r>
             <a:br>
-              <a:rPr lang="en-US" sz="1400" b="1" dirty="0">
+              <a:rPr lang="en-US" b="1" dirty="0">
                 <a:highlight>
                   <a:srgbClr val="F9C423"/>
                 </a:highlight>
@@ -26286,12 +27889,34 @@
               </a:rPr>
             </a:br>
             <a:r>
-              <a:rPr lang="en-US" sz="1400" dirty="0"/>
-              <a:t>Slides with white backgrounds include a footer with the name of the university and page numbers that update automatically.</a:t>
-            </a:r>
-            <a:endParaRPr lang="en-US" sz="1400" b="1" dirty="0">
-              <a:latin typeface="Gotham Bold" pitchFamily="2" charset="0"/>
-              <a:cs typeface="Gotham Bold" pitchFamily="2" charset="0"/>
+              <a:rPr lang="en-US" dirty="0"/>
+              <a:t>This template uses the typeface Gotham. A limited number of discounted Gotham font licenses are available for purchase by UCF communicators only. </a:t>
+            </a:r>
+            <a:r>
+              <a:rPr lang="en-US" u="sng" dirty="0">
+                <a:hlinkClick r:id="rId2"/>
+              </a:rPr>
+              <a:t>Get Gotham here</a:t>
+            </a:r>
+            <a:r>
+              <a:rPr lang="en-US" dirty="0">
+                <a:hlinkClick r:id="rId2"/>
+              </a:rPr>
+              <a:t>.</a:t>
+            </a:r>
+            <a:r>
+              <a:rPr lang="en-US" dirty="0"/>
+              <a:t> Alternate suggested typefaces are Helvetica, Verdana, or Arial.</a:t>
+            </a:r>
+            <a:endParaRPr lang="en-US" dirty="0">
+              <a:solidFill>
+                <a:schemeClr val="bg1">
+                  <a:lumMod val="65000"/>
+                </a:schemeClr>
+              </a:solidFill>
+              <a:highlight>
+                <a:srgbClr val="F9C423"/>
+              </a:highlight>
             </a:endParaRPr>
           </a:p>
           <a:p>
@@ -26299,17 +27924,17 @@
               <a:buNone/>
             </a:pPr>
             <a:r>
-              <a:rPr lang="en-US" sz="1400" b="1" dirty="0">
+              <a:rPr lang="en-US" b="1" dirty="0">
                 <a:highlight>
                   <a:srgbClr val="F9C423"/>
                 </a:highlight>
                 <a:latin typeface="Gotham Bold" pitchFamily="2" charset="0"/>
                 <a:cs typeface="Gotham Bold" pitchFamily="2" charset="0"/>
               </a:rPr>
-              <a:t>GUIDES</a:t>
+              <a:t>EXTRA STYLING</a:t>
             </a:r>
             <a:br>
-              <a:rPr lang="en-US" sz="1400" b="1" dirty="0">
+              <a:rPr lang="en-US" b="1" dirty="0">
                 <a:highlight>
                   <a:srgbClr val="F9C423"/>
                 </a:highlight>
@@ -26318,22 +27943,65 @@
               </a:rPr>
             </a:br>
             <a:r>
-              <a:rPr lang="en-US" sz="1400" dirty="0"/>
-              <a:t>To assist with layouts, all slides include guidelines with suggested margins. Guides can be turned on and off under “View,” and then “Guides.”</a:t>
-            </a:r>
-            <a:br>
-              <a:rPr lang="en-US" sz="1400" dirty="0"/>
-            </a:br>
+              <a:rPr lang="en-US" dirty="0"/>
+              <a:t>A couple of ways to add emphasis to a word or phrase within your content are to add </a:t>
+            </a:r>
+            <a:r>
+              <a:rPr lang="en-US" dirty="0">
+                <a:latin typeface="Gotham Bold" pitchFamily="2" charset="0"/>
+                <a:cs typeface="Gotham Bold" pitchFamily="2" charset="0"/>
+              </a:rPr>
+              <a:t>bold styling </a:t>
+            </a:r>
+            <a:r>
+              <a:rPr lang="en-US" dirty="0"/>
+              <a:t>or adding a </a:t>
+            </a:r>
+            <a:r>
+              <a:rPr lang="en-US" dirty="0">
+                <a:highlight>
+                  <a:srgbClr val="F9C423"/>
+                </a:highlight>
+              </a:rPr>
+              <a:t>highlight</a:t>
+            </a:r>
+            <a:r>
+              <a:rPr lang="en-US" dirty="0"/>
+              <a:t> in “bright gold.”</a:t>
+            </a:r>
+          </a:p>
+          <a:p>
+            <a:pPr marL="0" indent="0">
+              <a:buNone/>
+            </a:pPr>
+            <a:endParaRPr lang="en-US" dirty="0">
+              <a:solidFill>
+                <a:schemeClr val="bg1">
+                  <a:lumMod val="65000"/>
+                </a:schemeClr>
+              </a:solidFill>
+            </a:endParaRPr>
+          </a:p>
+          <a:p>
+            <a:pPr marL="0" indent="0">
+              <a:buNone/>
+            </a:pPr>
             <a:endParaRPr lang="en-US" dirty="0"/>
           </a:p>
-        </p:txBody>
-      </p:sp>
-      <p:sp>
-        <p:nvSpPr>
-          <p:cNvPr id="8" name="Picture Placeholder 7">
-            <a:extLst>
-              <a:ext uri="{FF2B5EF4-FFF2-40B4-BE49-F238E27FC236}">
-                <a16:creationId xmlns:a16="http://schemas.microsoft.com/office/drawing/2014/main" id="{A0F719E9-E61F-9F41-AC80-7FE2BB6E61AD}"/>
+          <a:p>
+            <a:pPr marL="0" indent="0">
+              <a:buNone/>
+            </a:pPr>
+            <a:endParaRPr lang="en-US" dirty="0"/>
+          </a:p>
+        </p:txBody>
+      </p:sp>
+      <p:sp>
+        <p:nvSpPr>
+          <p:cNvPr id="5" name="Text Placeholder 4">
+            <a:extLst>
+              <a:ext uri="{FF2B5EF4-FFF2-40B4-BE49-F238E27FC236}">
+                <a16:creationId xmlns:a16="http://schemas.microsoft.com/office/drawing/2014/main" id="{D34456E5-09CA-D447-904C-D21AB25838F5}"/>
               </a:ext>
             </a:extLst>
           </p:cNvPr>
@@ -26341,22 +28009,87 @@
             <a:spLocks noGrp="1"/>
           </p:cNvSpPr>
           <p:nvPr>
-            <p:ph type="pic" sz="quarter" idx="13"/>
+            <p:ph type="body" sz="quarter" idx="11"/>
           </p:nvPr>
         </p:nvSpPr>
-        <p:spPr/>
+        <p:spPr>
+          <a:xfrm>
+            <a:off x="8001003" y="1104900"/>
+            <a:ext cx="3086097" cy="4838700"/>
+          </a:xfrm>
+        </p:spPr>
         <p:txBody>
           <a:bodyPr/>
           <a:lstStyle/>
           <a:p>
-            <a:endParaRPr lang="en-US"/>
+            <a:pPr marL="0" indent="0">
+              <a:buNone/>
+            </a:pPr>
+            <a:r>
+              <a:rPr lang="en-US" b="1" dirty="0">
+                <a:highlight>
+                  <a:srgbClr val="F9C423"/>
+                </a:highlight>
+                <a:latin typeface="Gotham Bold" pitchFamily="2" charset="0"/>
+                <a:cs typeface="Gotham Bold" pitchFamily="2" charset="0"/>
+              </a:rPr>
+              <a:t>FONT SIZES AND LINE SPACING</a:t>
+            </a:r>
+            <a:br>
+              <a:rPr lang="en-US" b="1" dirty="0">
+                <a:highlight>
+                  <a:srgbClr val="F9C423"/>
+                </a:highlight>
+                <a:latin typeface="Gotham Bold" pitchFamily="2" charset="0"/>
+                <a:cs typeface="Gotham Bold" pitchFamily="2" charset="0"/>
+              </a:rPr>
+            </a:br>
+            <a:r>
+              <a:rPr lang="en-US" dirty="0"/>
+              <a:t>These can be adjusted manually to fit your content. The default font size for slide titles is 24pt. The default font sizes for slide text are 18pt and 14pt. The default line spacing is 1.5 with 10pt set for the “Space After” in the “Line Spacing Options” dialog box.</a:t>
+            </a:r>
+            <a:endParaRPr lang="en-US" b="1" dirty="0">
+              <a:highlight>
+                <a:srgbClr val="F9C423"/>
+              </a:highlight>
+              <a:latin typeface="Gotham Bold" pitchFamily="2" charset="0"/>
+              <a:cs typeface="Gotham Bold" pitchFamily="2" charset="0"/>
+            </a:endParaRPr>
+          </a:p>
+          <a:p>
+            <a:pPr marL="0" indent="0">
+              <a:buNone/>
+            </a:pPr>
+            <a:r>
+              <a:rPr lang="en-US" b="1" dirty="0">
+                <a:highlight>
+                  <a:srgbClr val="F9C423"/>
+                </a:highlight>
+                <a:latin typeface="Gotham Bold" pitchFamily="2" charset="0"/>
+                <a:cs typeface="Gotham Bold" pitchFamily="2" charset="0"/>
+              </a:rPr>
+              <a:t>CONTENT FRAMES</a:t>
+            </a:r>
+            <a:br>
+              <a:rPr lang="en-US" b="1" dirty="0">
+                <a:highlight>
+                  <a:srgbClr val="F9C423"/>
+                </a:highlight>
+                <a:latin typeface="Gotham Bold" pitchFamily="2" charset="0"/>
+                <a:cs typeface="Gotham Bold" pitchFamily="2" charset="0"/>
+              </a:rPr>
+            </a:br>
+            <a:r>
+              <a:rPr lang="en-US" dirty="0"/>
+              <a:t>The size and placement of your content frames may be adjusted to fit you content. </a:t>
+            </a:r>
           </a:p>
         </p:txBody>
       </p:sp>
     </p:spTree>
     <p:extLst>
       <p:ext uri="{BB962C8B-B14F-4D97-AF65-F5344CB8AC3E}">
-        <p14:creationId xmlns:p14="http://schemas.microsoft.com/office/powerpoint/2010/main" val="1690427527"/>
+        <p14:creationId xmlns:p14="http://schemas.microsoft.com/office/powerpoint/2010/main" val="139783339"/>
       </p:ext>
     </p:extLst>
   </p:cSld>
@@ -26388,7 +28121,7 @@
           <p:cNvPr id="2" name="Title 1">
             <a:extLst>
               <a:ext uri="{FF2B5EF4-FFF2-40B4-BE49-F238E27FC236}">
-                <a16:creationId xmlns:a16="http://schemas.microsoft.com/office/drawing/2014/main" id="{AC711B78-0083-0D4C-80FF-9DCDBB7FF23B}"/>
+                <a16:creationId xmlns:a16="http://schemas.microsoft.com/office/drawing/2014/main" id="{7C84BCB0-F970-9348-9ED7-C526C51F86A6}"/>
               </a:ext>
             </a:extLst>
           </p:cNvPr>
@@ -26401,12 +28134,14 @@
         </p:nvSpPr>
         <p:spPr/>
         <p:txBody>
-          <a:bodyPr/>
+          <a:bodyPr anchor="b">
+            <a:normAutofit/>
+          </a:bodyPr>
           <a:lstStyle/>
           <a:p>
             <a:r>
               <a:rPr lang="en-US" dirty="0"/>
-              <a:t>ADJUSTING TEXT</a:t>
+              <a:t>PICTURE PLACEHOLDERS</a:t>
             </a:r>
           </a:p>
         </p:txBody>
@@ -26416,7 +28151,7 @@
           <p:cNvPr id="3" name="Content Placeholder 2">
             <a:extLst>
               <a:ext uri="{FF2B5EF4-FFF2-40B4-BE49-F238E27FC236}">
-                <a16:creationId xmlns:a16="http://schemas.microsoft.com/office/drawing/2014/main" id="{9785DCC8-DAF1-D543-8FA4-0D6AE35E2DB3}"/>
+                <a16:creationId xmlns:a16="http://schemas.microsoft.com/office/drawing/2014/main" id="{59B84D4B-560F-C64B-81F9-16880002E837}"/>
               </a:ext>
             </a:extLst>
           </p:cNvPr>
@@ -26429,22 +28164,36 @@
         </p:nvSpPr>
         <p:spPr/>
         <p:txBody>
-          <a:bodyPr/>
+          <a:bodyPr anchor="t">
+            <a:normAutofit/>
+          </a:bodyPr>
           <a:lstStyle/>
           <a:p>
             <a:r>
               <a:rPr lang="en-US" dirty="0"/>
-              <a:t>By default, all new text and content frames will include bulleted lists. If you would like to remove these, go to the “Home” tab, and select “None” in the “Bullets” drop-down </a:t>
-            </a:r>
-          </a:p>
-        </p:txBody>
-      </p:sp>
-      <p:sp>
-        <p:nvSpPr>
-          <p:cNvPr id="4" name="Text Placeholder 3">
-            <a:extLst>
-              <a:ext uri="{FF2B5EF4-FFF2-40B4-BE49-F238E27FC236}">
-                <a16:creationId xmlns:a16="http://schemas.microsoft.com/office/drawing/2014/main" id="{5D52FD2F-1FD6-DB4C-8FEC-C662C46AB152}"/>
+              <a:t>To add a photo, click on the icon in the picture placeholder area</a:t>
+            </a:r>
+          </a:p>
+          <a:p>
+            <a:r>
+              <a:rPr lang="en-US" dirty="0"/>
+              <a:t>If you are inserting an image with a transparent background — such as a .png file — you can remove the light grey background in the picture placeholder. Select the picture frame, go to the ”Home” tab, select “Shape Fill.” Select “No Fill” from the drop-down menu.</a:t>
+            </a:r>
+          </a:p>
+          <a:p>
+            <a:r>
+              <a:rPr lang="en-US" dirty="0"/>
+              <a:t>You may additional photos to each slide manually</a:t>
+            </a:r>
+          </a:p>
+        </p:txBody>
+      </p:sp>
+      <p:sp>
+        <p:nvSpPr>
+          <p:cNvPr id="13" name="Picture Placeholder 3">
+            <a:extLst>
+              <a:ext uri="{FF2B5EF4-FFF2-40B4-BE49-F238E27FC236}">
+                <a16:creationId xmlns:a16="http://schemas.microsoft.com/office/drawing/2014/main" id="{0A129AB9-BE43-EAC4-A536-136445C586AC}"/>
               </a:ext>
             </a:extLst>
           </p:cNvPr>
@@ -26452,243 +28201,22 @@
             <a:spLocks noGrp="1"/>
           </p:cNvSpPr>
           <p:nvPr>
-            <p:ph type="body" sz="quarter" idx="10"/>
+            <p:ph type="pic" sz="quarter" idx="13"/>
           </p:nvPr>
         </p:nvSpPr>
-        <p:spPr>
-          <a:xfrm>
-            <a:off x="4533901" y="1104900"/>
-            <a:ext cx="3086097" cy="4838700"/>
-          </a:xfrm>
-        </p:spPr>
+        <p:spPr/>
         <p:txBody>
           <a:bodyPr/>
           <a:lstStyle/>
           <a:p>
-            <a:pPr marL="0" indent="0">
-              <a:buNone/>
-            </a:pPr>
-            <a:r>
-              <a:rPr lang="en-US" b="1" dirty="0">
-                <a:highlight>
-                  <a:srgbClr val="F9C423"/>
-                </a:highlight>
-                <a:latin typeface="Gotham Bold" pitchFamily="2" charset="0"/>
-                <a:cs typeface="Gotham Bold" pitchFamily="2" charset="0"/>
-              </a:rPr>
-              <a:t>TYPEFACES</a:t>
-            </a:r>
-            <a:br>
-              <a:rPr lang="en-US" b="1" dirty="0">
-                <a:highlight>
-                  <a:srgbClr val="F9C423"/>
-                </a:highlight>
-                <a:latin typeface="Gotham Bold" pitchFamily="2" charset="0"/>
-                <a:cs typeface="Gotham Bold" pitchFamily="2" charset="0"/>
-              </a:rPr>
-            </a:br>
-            <a:r>
-              <a:rPr lang="en-US" dirty="0"/>
-              <a:t>This template uses the typeface Gotham. A limited number of discounted Gotham font licenses are available for purchase by UCF communicators only. </a:t>
-            </a:r>
-            <a:r>
-              <a:rPr lang="en-US" u="sng" dirty="0">
-                <a:hlinkClick r:id="rId2"/>
-              </a:rPr>
-              <a:t>Get Gotham here</a:t>
-            </a:r>
-            <a:r>
-              <a:rPr lang="en-US" dirty="0">
-                <a:hlinkClick r:id="rId2"/>
-              </a:rPr>
-              <a:t>.</a:t>
-            </a:r>
-            <a:r>
-              <a:rPr lang="en-US" dirty="0"/>
-              <a:t> Alternate suggested typefaces are Helvetica, Verdana, or Arial.</a:t>
-            </a:r>
-            <a:endParaRPr lang="en-US" dirty="0">
-              <a:solidFill>
-                <a:schemeClr val="bg1">
-                  <a:lumMod val="65000"/>
-                </a:schemeClr>
-              </a:solidFill>
-              <a:highlight>
-                <a:srgbClr val="F9C423"/>
-              </a:highlight>
-            </a:endParaRPr>
-          </a:p>
-          <a:p>
-            <a:pPr marL="0" indent="0">
-              <a:buNone/>
-            </a:pPr>
-            <a:r>
-              <a:rPr lang="en-US" b="1" dirty="0">
-                <a:highlight>
-                  <a:srgbClr val="F9C423"/>
-                </a:highlight>
-                <a:latin typeface="Gotham Bold" pitchFamily="2" charset="0"/>
-                <a:cs typeface="Gotham Bold" pitchFamily="2" charset="0"/>
-              </a:rPr>
-              <a:t>EXTRA STYLING</a:t>
-            </a:r>
-            <a:br>
-              <a:rPr lang="en-US" b="1" dirty="0">
-                <a:highlight>
-                  <a:srgbClr val="F9C423"/>
-                </a:highlight>
-                <a:latin typeface="Gotham Bold" pitchFamily="2" charset="0"/>
-                <a:cs typeface="Gotham Bold" pitchFamily="2" charset="0"/>
-              </a:rPr>
-            </a:br>
-            <a:r>
-              <a:rPr lang="en-US" dirty="0"/>
-              <a:t>A couple of ways to add emphasis to a word or phrase within your content are to add </a:t>
-            </a:r>
-            <a:r>
-              <a:rPr lang="en-US" dirty="0">
-                <a:latin typeface="Gotham Bold" pitchFamily="2" charset="0"/>
-                <a:cs typeface="Gotham Bold" pitchFamily="2" charset="0"/>
-              </a:rPr>
-              <a:t>bold styling </a:t>
-            </a:r>
-            <a:r>
-              <a:rPr lang="en-US" dirty="0"/>
-              <a:t>or adding a </a:t>
-            </a:r>
-            <a:r>
-              <a:rPr lang="en-US" dirty="0">
-                <a:highlight>
-                  <a:srgbClr val="F9C423"/>
-                </a:highlight>
-              </a:rPr>
-              <a:t>highlight</a:t>
-            </a:r>
-            <a:r>
-              <a:rPr lang="en-US" dirty="0"/>
-              <a:t> in “bright gold.”</a:t>
-            </a:r>
-          </a:p>
-          <a:p>
-            <a:pPr marL="0" indent="0">
-              <a:buNone/>
-            </a:pPr>
-            <a:endParaRPr lang="en-US" dirty="0">
-              <a:solidFill>
-                <a:schemeClr val="bg1">
-                  <a:lumMod val="65000"/>
-                </a:schemeClr>
-              </a:solidFill>
-            </a:endParaRPr>
-          </a:p>
-          <a:p>
-            <a:pPr marL="0" indent="0">
-              <a:buNone/>
-            </a:pPr>
-            <a:endParaRPr lang="en-US" dirty="0"/>
-          </a:p>
-          <a:p>
-            <a:pPr marL="0" indent="0">
-              <a:buNone/>
-            </a:pPr>
-            <a:endParaRPr lang="en-US" dirty="0"/>
-          </a:p>
-        </p:txBody>
-      </p:sp>
-      <p:sp>
-        <p:nvSpPr>
-          <p:cNvPr id="5" name="Text Placeholder 4">
-            <a:extLst>
-              <a:ext uri="{FF2B5EF4-FFF2-40B4-BE49-F238E27FC236}">
-                <a16:creationId xmlns:a16="http://schemas.microsoft.com/office/drawing/2014/main" id="{D34456E5-09CA-D447-904C-D21AB25838F5}"/>
-              </a:ext>
-            </a:extLst>
-          </p:cNvPr>
-          <p:cNvSpPr>
-            <a:spLocks noGrp="1"/>
-          </p:cNvSpPr>
-          <p:nvPr>
-            <p:ph type="body" sz="quarter" idx="11"/>
-          </p:nvPr>
-        </p:nvSpPr>
-        <p:spPr>
-          <a:xfrm>
-            <a:off x="8001003" y="1104900"/>
-            <a:ext cx="3086097" cy="4838700"/>
-          </a:xfrm>
-        </p:spPr>
-        <p:txBody>
-          <a:bodyPr/>
-          <a:lstStyle/>
-          <a:p>
-            <a:pPr marL="0" indent="0">
-              <a:buNone/>
-            </a:pPr>
-            <a:r>
-              <a:rPr lang="en-US" b="1" dirty="0">
-                <a:highlight>
-                  <a:srgbClr val="F9C423"/>
-                </a:highlight>
-                <a:latin typeface="Gotham Bold" pitchFamily="2" charset="0"/>
-                <a:cs typeface="Gotham Bold" pitchFamily="2" charset="0"/>
-              </a:rPr>
-              <a:t>FONT SIZES AND LINE SPACING</a:t>
-            </a:r>
-            <a:br>
-              <a:rPr lang="en-US" b="1" dirty="0">
-                <a:highlight>
-                  <a:srgbClr val="F9C423"/>
-                </a:highlight>
-                <a:latin typeface="Gotham Bold" pitchFamily="2" charset="0"/>
-                <a:cs typeface="Gotham Bold" pitchFamily="2" charset="0"/>
-              </a:rPr>
-            </a:br>
-            <a:r>
-              <a:rPr lang="en-US" dirty="0"/>
-              <a:t>These can be adjusted manually to fit your content. The default font size for slide titles is 24pt. The default font sizes for slide text are 18pt and 14pt. The default line spacing is 1.5 with 10pt set for the “Space After” in the “Line Spacing Options” dialog box.</a:t>
-            </a:r>
-            <a:endParaRPr lang="en-US" b="1" dirty="0">
-              <a:highlight>
-                <a:srgbClr val="F9C423"/>
-              </a:highlight>
-              <a:latin typeface="Gotham Bold" pitchFamily="2" charset="0"/>
-              <a:cs typeface="Gotham Bold" pitchFamily="2" charset="0"/>
-            </a:endParaRPr>
-          </a:p>
-          <a:p>
-            <a:pPr marL="0" indent="0">
-              <a:buNone/>
-            </a:pPr>
-            <a:r>
-              <a:rPr lang="en-US" b="1" dirty="0">
-                <a:highlight>
-                  <a:srgbClr val="F9C423"/>
-                </a:highlight>
-                <a:latin typeface="Gotham Bold" pitchFamily="2" charset="0"/>
-                <a:cs typeface="Gotham Bold" pitchFamily="2" charset="0"/>
-              </a:rPr>
-              <a:t>CONTENT FRAMES</a:t>
-            </a:r>
-            <a:br>
-              <a:rPr lang="en-US" b="1" dirty="0">
-                <a:highlight>
-                  <a:srgbClr val="F9C423"/>
-                </a:highlight>
-                <a:latin typeface="Gotham Bold" pitchFamily="2" charset="0"/>
-                <a:cs typeface="Gotham Bold" pitchFamily="2" charset="0"/>
-              </a:rPr>
-            </a:br>
-            <a:r>
-              <a:rPr lang="en-US" dirty="0"/>
-              <a:t>The size and placement of your content frames may be adjusted to fit you content. </a:t>
-            </a:r>
+            <a:endParaRPr lang="en-US"/>
           </a:p>
         </p:txBody>
       </p:sp>
     </p:spTree>
     <p:extLst>
       <p:ext uri="{BB962C8B-B14F-4D97-AF65-F5344CB8AC3E}">
-        <p14:creationId xmlns:p14="http://schemas.microsoft.com/office/powerpoint/2010/main" val="139783339"/>
+        <p14:creationId xmlns:p14="http://schemas.microsoft.com/office/powerpoint/2010/main" val="2686573242"/>
       </p:ext>
     </p:extLst>
   </p:cSld>
@@ -26759,7 +28287,12 @@
             <p:ph idx="1"/>
           </p:nvPr>
         </p:nvSpPr>
-        <p:spPr/>
+        <p:spPr>
+          <a:xfrm>
+            <a:off x="1104902" y="2693317"/>
+            <a:ext cx="9982193" cy="3214330"/>
+          </a:xfrm>
+        </p:spPr>
         <p:txBody>
           <a:bodyPr/>
           <a:lstStyle/>
@@ -26770,7 +28303,7 @@
             </a:pPr>
             <a:r>
               <a:rPr lang="en-US" dirty="0"/>
-              <a:t>Earliest visions for VR systems </a:t>
+              <a:t>Earliest visions for VR systems – a young scholar with a dream for the future</a:t>
             </a:r>
           </a:p>
           <a:p>
@@ -26810,7 +28343,7 @@
             </a:pPr>
             <a:r>
               <a:rPr lang="en-US" dirty="0"/>
-              <a:t>High physical demand for repeated actions</a:t>
+              <a:t>High physical demand for repeated motions</a:t>
             </a:r>
           </a:p>
           <a:p>
@@ -26866,7 +28399,7 @@
           <p:cNvPr id="2" name="Title 1">
             <a:extLst>
               <a:ext uri="{FF2B5EF4-FFF2-40B4-BE49-F238E27FC236}">
-                <a16:creationId xmlns:a16="http://schemas.microsoft.com/office/drawing/2014/main" id="{7C84BCB0-F970-9348-9ED7-C526C51F86A6}"/>
+                <a16:creationId xmlns:a16="http://schemas.microsoft.com/office/drawing/2014/main" id="{17670727-96F5-C74F-B0B8-ED7ED348C415}"/>
               </a:ext>
             </a:extLst>
           </p:cNvPr>
@@ -26874,29 +28407,38 @@
             <a:spLocks noGrp="1"/>
           </p:cNvSpPr>
           <p:nvPr>
-            <p:ph type="title"/>
+            <p:ph type="ctrTitle"/>
           </p:nvPr>
         </p:nvSpPr>
         <p:spPr/>
         <p:txBody>
-          <a:bodyPr anchor="b">
-            <a:normAutofit/>
-          </a:bodyPr>
+          <a:bodyPr/>
           <a:lstStyle/>
           <a:p>
             <a:r>
               <a:rPr lang="en-US" dirty="0"/>
-              <a:t>PICTURE PLACEHOLDERS</a:t>
-            </a:r>
-          </a:p>
-        </p:txBody>
-      </p:sp>
-      <p:sp>
-        <p:nvSpPr>
-          <p:cNvPr id="3" name="Content Placeholder 2">
-            <a:extLst>
-              <a:ext uri="{FF2B5EF4-FFF2-40B4-BE49-F238E27FC236}">
-                <a16:creationId xmlns:a16="http://schemas.microsoft.com/office/drawing/2014/main" id="{59B84D4B-560F-C64B-81F9-16880002E837}"/>
+              <a:t>“We remain committed to </a:t>
+            </a:r>
+            <a:r>
+              <a:rPr lang="en-US" dirty="0">
+                <a:latin typeface="Gotham Black" pitchFamily="2" charset="0"/>
+                <a:cs typeface="Gotham Black" pitchFamily="2" charset="0"/>
+              </a:rPr>
+              <a:t>unleashing potential </a:t>
+            </a:r>
+            <a:r>
+              <a:rPr lang="en-US" dirty="0"/>
+              <a:t>in people, organizations, ideas, and the communities we serve. That charge inspires us and illuminates fantastic possibilities ahead.”</a:t>
+            </a:r>
+          </a:p>
+        </p:txBody>
+      </p:sp>
+      <p:sp>
+        <p:nvSpPr>
+          <p:cNvPr id="3" name="Subtitle 2">
+            <a:extLst>
+              <a:ext uri="{FF2B5EF4-FFF2-40B4-BE49-F238E27FC236}">
+                <a16:creationId xmlns:a16="http://schemas.microsoft.com/office/drawing/2014/main" id="{C6B874A2-33D7-6646-AA5A-38973C883ABF}"/>
               </a:ext>
             </a:extLst>
           </p:cNvPr>
@@ -26904,49 +28446,7 @@
             <a:spLocks noGrp="1"/>
           </p:cNvSpPr>
           <p:nvPr>
-            <p:ph idx="1"/>
-          </p:nvPr>
-        </p:nvSpPr>
-        <p:spPr/>
-        <p:txBody>
-          <a:bodyPr anchor="t">
-            <a:normAutofit/>
-          </a:bodyPr>
-          <a:lstStyle/>
-          <a:p>
-            <a:r>
-              <a:rPr lang="en-US" dirty="0"/>
-              <a:t>To add a photo, click on the icon in the picture placeholder area</a:t>
-            </a:r>
-          </a:p>
-          <a:p>
-            <a:r>
-              <a:rPr lang="en-US" dirty="0"/>
-              <a:t>If you are inserting an image with a transparent background — such as a .png file — you can remove the light grey background in the picture placeholder. Select the picture frame, go to the ”Home” tab, select “Shape Fill.” Select “No Fill” from the drop-down menu.</a:t>
-            </a:r>
-          </a:p>
-          <a:p>
-            <a:r>
-              <a:rPr lang="en-US" dirty="0"/>
-              <a:t>You may additional photos to each slide manually</a:t>
-            </a:r>
-          </a:p>
-        </p:txBody>
-      </p:sp>
-      <p:sp>
-        <p:nvSpPr>
-          <p:cNvPr id="13" name="Picture Placeholder 3">
-            <a:extLst>
-              <a:ext uri="{FF2B5EF4-FFF2-40B4-BE49-F238E27FC236}">
-                <a16:creationId xmlns:a16="http://schemas.microsoft.com/office/drawing/2014/main" id="{0A129AB9-BE43-EAC4-A536-136445C586AC}"/>
-              </a:ext>
-            </a:extLst>
-          </p:cNvPr>
-          <p:cNvSpPr>
-            <a:spLocks noGrp="1"/>
-          </p:cNvSpPr>
-          <p:nvPr>
-            <p:ph type="pic" sz="quarter" idx="13"/>
+            <p:ph type="subTitle" idx="1"/>
           </p:nvPr>
         </p:nvSpPr>
         <p:spPr/>
@@ -26954,14 +28454,26 @@
           <a:bodyPr/>
           <a:lstStyle/>
           <a:p>
-            <a:endParaRPr lang="en-US"/>
+            <a:r>
+              <a:rPr lang="en-US" dirty="0"/>
+              <a:t>Dr. Alexander N. Cartwright</a:t>
+            </a:r>
+          </a:p>
+          <a:p>
+            <a:r>
+              <a:rPr lang="en-US" dirty="0"/>
+              <a:t>UCF President</a:t>
+            </a:r>
+          </a:p>
+          <a:p>
+            <a:endParaRPr lang="en-US" dirty="0"/>
           </a:p>
         </p:txBody>
       </p:sp>
     </p:spTree>
     <p:extLst>
       <p:ext uri="{BB962C8B-B14F-4D97-AF65-F5344CB8AC3E}">
-        <p14:creationId xmlns:p14="http://schemas.microsoft.com/office/powerpoint/2010/main" val="2686573242"/>
+        <p14:creationId xmlns:p14="http://schemas.microsoft.com/office/powerpoint/2010/main" val="3444068894"/>
       </p:ext>
     </p:extLst>
   </p:cSld>
@@ -26993,112 +28505,6 @@
           <p:cNvPr id="2" name="Title 1">
             <a:extLst>
               <a:ext uri="{FF2B5EF4-FFF2-40B4-BE49-F238E27FC236}">
-                <a16:creationId xmlns:a16="http://schemas.microsoft.com/office/drawing/2014/main" id="{17670727-96F5-C74F-B0B8-ED7ED348C415}"/>
-              </a:ext>
-            </a:extLst>
-          </p:cNvPr>
-          <p:cNvSpPr>
-            <a:spLocks noGrp="1"/>
-          </p:cNvSpPr>
-          <p:nvPr>
-            <p:ph type="ctrTitle"/>
-          </p:nvPr>
-        </p:nvSpPr>
-        <p:spPr/>
-        <p:txBody>
-          <a:bodyPr/>
-          <a:lstStyle/>
-          <a:p>
-            <a:r>
-              <a:rPr lang="en-US" dirty="0"/>
-              <a:t>“We remain committed to </a:t>
-            </a:r>
-            <a:r>
-              <a:rPr lang="en-US" dirty="0">
-                <a:latin typeface="Gotham Black" pitchFamily="2" charset="0"/>
-                <a:cs typeface="Gotham Black" pitchFamily="2" charset="0"/>
-              </a:rPr>
-              <a:t>unleashing potential </a:t>
-            </a:r>
-            <a:r>
-              <a:rPr lang="en-US" dirty="0"/>
-              <a:t>in people, organizations, ideas, and the communities we serve. That charge inspires us and illuminates fantastic possibilities ahead.”</a:t>
-            </a:r>
-          </a:p>
-        </p:txBody>
-      </p:sp>
-      <p:sp>
-        <p:nvSpPr>
-          <p:cNvPr id="3" name="Subtitle 2">
-            <a:extLst>
-              <a:ext uri="{FF2B5EF4-FFF2-40B4-BE49-F238E27FC236}">
-                <a16:creationId xmlns:a16="http://schemas.microsoft.com/office/drawing/2014/main" id="{C6B874A2-33D7-6646-AA5A-38973C883ABF}"/>
-              </a:ext>
-            </a:extLst>
-          </p:cNvPr>
-          <p:cNvSpPr>
-            <a:spLocks noGrp="1"/>
-          </p:cNvSpPr>
-          <p:nvPr>
-            <p:ph type="subTitle" idx="1"/>
-          </p:nvPr>
-        </p:nvSpPr>
-        <p:spPr/>
-        <p:txBody>
-          <a:bodyPr/>
-          <a:lstStyle/>
-          <a:p>
-            <a:r>
-              <a:rPr lang="en-US" dirty="0"/>
-              <a:t>Dr. Alexander N. Cartwright</a:t>
-            </a:r>
-          </a:p>
-          <a:p>
-            <a:r>
-              <a:rPr lang="en-US" dirty="0"/>
-              <a:t>UCF President</a:t>
-            </a:r>
-          </a:p>
-          <a:p>
-            <a:endParaRPr lang="en-US" dirty="0"/>
-          </a:p>
-        </p:txBody>
-      </p:sp>
-    </p:spTree>
-    <p:extLst>
-      <p:ext uri="{BB962C8B-B14F-4D97-AF65-F5344CB8AC3E}">
-        <p14:creationId xmlns:p14="http://schemas.microsoft.com/office/powerpoint/2010/main" val="3444068894"/>
-      </p:ext>
-    </p:extLst>
-  </p:cSld>
-  <p:clrMapOvr>
-    <a:masterClrMapping/>
-  </p:clrMapOvr>
-</p:sld>
-</file>
-
-<file path=ppt/slides/slide52.xml><?xml version="1.0" encoding="utf-8"?>
-<p:sld xmlns:a="http://schemas.openxmlformats.org/drawingml/2006/main" xmlns:r="http://schemas.openxmlformats.org/officeDocument/2006/relationships" xmlns:p="http://schemas.openxmlformats.org/presentationml/2006/main">
-  <p:cSld>
-    <p:spTree>
-      <p:nvGrpSpPr>
-        <p:cNvPr id="1" name=""/>
-        <p:cNvGrpSpPr/>
-        <p:nvPr/>
-      </p:nvGrpSpPr>
-      <p:grpSpPr>
-        <a:xfrm>
-          <a:off x="0" y="0"/>
-          <a:ext cx="0" cy="0"/>
-          <a:chOff x="0" y="0"/>
-          <a:chExt cx="0" cy="0"/>
-        </a:xfrm>
-      </p:grpSpPr>
-      <p:sp>
-        <p:nvSpPr>
-          <p:cNvPr id="2" name="Title 1">
-            <a:extLst>
-              <a:ext uri="{FF2B5EF4-FFF2-40B4-BE49-F238E27FC236}">
                 <a16:creationId xmlns:a16="http://schemas.microsoft.com/office/drawing/2014/main" id="{2E1BD114-A5AB-2145-B41D-0097EED2F61B}"/>
               </a:ext>
             </a:extLst>
@@ -27183,7 +28589,7 @@
 </p:sld>
 </file>
 
-<file path=ppt/slides/slide53.xml><?xml version="1.0" encoding="utf-8"?>
+<file path=ppt/slides/slide52.xml><?xml version="1.0" encoding="utf-8"?>
 <p:sld xmlns:a="http://schemas.openxmlformats.org/drawingml/2006/main" xmlns:r="http://schemas.openxmlformats.org/officeDocument/2006/relationships" xmlns:p="http://schemas.openxmlformats.org/presentationml/2006/main">
   <p:cSld>
     <p:spTree>
@@ -28436,7 +29842,7 @@
 </p:sld>
 </file>
 
-<file path=ppt/slides/slide54.xml><?xml version="1.0" encoding="utf-8"?>
+<file path=ppt/slides/slide53.xml><?xml version="1.0" encoding="utf-8"?>
 <p:sld xmlns:a="http://schemas.openxmlformats.org/drawingml/2006/main" xmlns:r="http://schemas.openxmlformats.org/officeDocument/2006/relationships" xmlns:p="http://schemas.openxmlformats.org/presentationml/2006/main">
   <p:cSld>
     <p:spTree>
@@ -29499,7 +30905,7 @@
 </p:sld>
 </file>
 
-<file path=ppt/slides/slide55.xml><?xml version="1.0" encoding="utf-8"?>
+<file path=ppt/slides/slide54.xml><?xml version="1.0" encoding="utf-8"?>
 <p:sld xmlns:a="http://schemas.openxmlformats.org/drawingml/2006/main" xmlns:r="http://schemas.openxmlformats.org/officeDocument/2006/relationships" xmlns:p="http://schemas.openxmlformats.org/presentationml/2006/main">
   <p:cSld>
     <p:spTree>
@@ -30427,7 +31833,7 @@
 </p:sld>
 </file>
 
-<file path=ppt/slides/slide56.xml><?xml version="1.0" encoding="utf-8"?>
+<file path=ppt/slides/slide55.xml><?xml version="1.0" encoding="utf-8"?>
 <p:sld xmlns:a="http://schemas.openxmlformats.org/drawingml/2006/main" xmlns:r="http://schemas.openxmlformats.org/officeDocument/2006/relationships" xmlns:p="http://schemas.openxmlformats.org/presentationml/2006/main">
   <p:cSld>
     <p:spTree>
@@ -30835,6 +32241,206 @@
         <p:cNvPr id="1" name="">
           <a:extLst>
             <a:ext uri="{FF2B5EF4-FFF2-40B4-BE49-F238E27FC236}">
+              <a16:creationId xmlns:a16="http://schemas.microsoft.com/office/drawing/2014/main" id="{160FD0E6-C3D6-5238-C300-1D0F577FF5FF}"/>
+            </a:ext>
+          </a:extLst>
+        </p:cNvPr>
+        <p:cNvGrpSpPr/>
+        <p:nvPr/>
+      </p:nvGrpSpPr>
+      <p:grpSpPr>
+        <a:xfrm>
+          <a:off x="0" y="0"/>
+          <a:ext cx="0" cy="0"/>
+          <a:chOff x="0" y="0"/>
+          <a:chExt cx="0" cy="0"/>
+        </a:xfrm>
+      </p:grpSpPr>
+      <p:sp>
+        <p:nvSpPr>
+          <p:cNvPr id="2" name="Title 1">
+            <a:extLst>
+              <a:ext uri="{FF2B5EF4-FFF2-40B4-BE49-F238E27FC236}">
+                <a16:creationId xmlns:a16="http://schemas.microsoft.com/office/drawing/2014/main" id="{8CB5AFBE-38A2-A733-1526-60F814E35E7C}"/>
+              </a:ext>
+            </a:extLst>
+          </p:cNvPr>
+          <p:cNvSpPr>
+            <a:spLocks noGrp="1"/>
+          </p:cNvSpPr>
+          <p:nvPr>
+            <p:ph type="title"/>
+          </p:nvPr>
+        </p:nvSpPr>
+        <p:spPr/>
+        <p:txBody>
+          <a:bodyPr/>
+          <a:lstStyle/>
+          <a:p>
+            <a:r>
+              <a:rPr lang="en-US" b="1" dirty="0"/>
+              <a:t>Introduction - Motivation</a:t>
+            </a:r>
+          </a:p>
+        </p:txBody>
+      </p:sp>
+      <p:sp>
+        <p:nvSpPr>
+          <p:cNvPr id="3" name="Content Placeholder 2">
+            <a:extLst>
+              <a:ext uri="{FF2B5EF4-FFF2-40B4-BE49-F238E27FC236}">
+                <a16:creationId xmlns:a16="http://schemas.microsoft.com/office/drawing/2014/main" id="{823F418F-F564-0CEA-A3B2-EDA9B8C440F3}"/>
+              </a:ext>
+            </a:extLst>
+          </p:cNvPr>
+          <p:cNvSpPr>
+            <a:spLocks noGrp="1"/>
+          </p:cNvSpPr>
+          <p:nvPr>
+            <p:ph idx="1"/>
+          </p:nvPr>
+        </p:nvSpPr>
+        <p:spPr>
+          <a:xfrm>
+            <a:off x="1104902" y="2783468"/>
+            <a:ext cx="9982193" cy="3214330"/>
+          </a:xfrm>
+        </p:spPr>
+        <p:txBody>
+          <a:bodyPr/>
+          <a:lstStyle/>
+          <a:p>
+            <a:pPr>
+              <a:buFont typeface="Wingdings" panose="05000000000000000000" pitchFamily="2" charset="2"/>
+              <a:buChar char="Ø"/>
+            </a:pPr>
+            <a:r>
+              <a:rPr lang="en-US" dirty="0"/>
+              <a:t>The BCI Solution</a:t>
+            </a:r>
+          </a:p>
+          <a:p>
+            <a:pPr lvl="1">
+              <a:buFont typeface="Wingdings" panose="05000000000000000000" pitchFamily="2" charset="2"/>
+              <a:buChar char="Ø"/>
+            </a:pPr>
+            <a:r>
+              <a:rPr lang="en-US" dirty="0"/>
+              <a:t>Industry research and</a:t>
+            </a:r>
+            <a:r>
+              <a:rPr lang="en-US" i="1" dirty="0"/>
+              <a:t> Towards Brain-Computer Interfaces</a:t>
+            </a:r>
+            <a:r>
+              <a:rPr lang="en-US" dirty="0"/>
+              <a:t> </a:t>
+            </a:r>
+          </a:p>
+          <a:p>
+            <a:pPr lvl="1">
+              <a:buFont typeface="Wingdings" panose="05000000000000000000" pitchFamily="2" charset="2"/>
+              <a:buChar char="Ø"/>
+            </a:pPr>
+            <a:r>
+              <a:rPr lang="en-US" dirty="0"/>
+              <a:t>Existing but limited research for BCI selection in VR</a:t>
+            </a:r>
+          </a:p>
+          <a:p>
+            <a:pPr lvl="1">
+              <a:buFont typeface="Wingdings" panose="05000000000000000000" pitchFamily="2" charset="2"/>
+              <a:buChar char="Ø"/>
+            </a:pPr>
+            <a:r>
+              <a:rPr lang="en-US" dirty="0"/>
+              <a:t>Eye-movement artifacts found in EEG stream to build artifact correction methods </a:t>
+            </a:r>
+            <a:r>
+              <a:rPr lang="en-US" b="1" dirty="0"/>
+              <a:t>[21]</a:t>
+            </a:r>
+          </a:p>
+          <a:p>
+            <a:pPr lvl="1">
+              <a:buFont typeface="Wingdings" panose="05000000000000000000" pitchFamily="2" charset="2"/>
+              <a:buChar char="Ø"/>
+            </a:pPr>
+            <a:r>
+              <a:rPr lang="en-US" dirty="0"/>
+              <a:t>Using VR as a medium to simulate environments for recording EEG data</a:t>
+            </a:r>
+          </a:p>
+          <a:p>
+            <a:pPr lvl="1">
+              <a:buFont typeface="Wingdings" panose="05000000000000000000" pitchFamily="2" charset="2"/>
+              <a:buChar char="Ø"/>
+            </a:pPr>
+            <a:endParaRPr lang="en-US" dirty="0"/>
+          </a:p>
+          <a:p>
+            <a:pPr lvl="1">
+              <a:buFont typeface="Wingdings" panose="05000000000000000000" pitchFamily="2" charset="2"/>
+              <a:buChar char="Ø"/>
+            </a:pPr>
+            <a:endParaRPr lang="en-US" dirty="0"/>
+          </a:p>
+          <a:p>
+            <a:pPr lvl="2">
+              <a:buFont typeface="Wingdings" panose="05000000000000000000" pitchFamily="2" charset="2"/>
+              <a:buChar char="Ø"/>
+            </a:pPr>
+            <a:endParaRPr lang="en-US" dirty="0"/>
+          </a:p>
+          <a:p>
+            <a:pPr>
+              <a:buFont typeface="Wingdings" panose="05000000000000000000" pitchFamily="2" charset="2"/>
+              <a:buChar char="Ø"/>
+            </a:pPr>
+            <a:endParaRPr lang="en-US" dirty="0"/>
+          </a:p>
+          <a:p>
+            <a:pPr>
+              <a:buFont typeface="Wingdings" panose="05000000000000000000" pitchFamily="2" charset="2"/>
+              <a:buChar char="Ø"/>
+            </a:pPr>
+            <a:endParaRPr lang="en-US" dirty="0"/>
+          </a:p>
+          <a:p>
+            <a:pPr marL="0" indent="0">
+              <a:buNone/>
+            </a:pPr>
+            <a:endParaRPr lang="en-US" dirty="0"/>
+          </a:p>
+          <a:p>
+            <a:pPr marL="0" indent="0">
+              <a:buNone/>
+            </a:pPr>
+            <a:endParaRPr lang="en-US" dirty="0"/>
+          </a:p>
+        </p:txBody>
+      </p:sp>
+    </p:spTree>
+    <p:extLst>
+      <p:ext uri="{BB962C8B-B14F-4D97-AF65-F5344CB8AC3E}">
+        <p14:creationId xmlns:p14="http://schemas.microsoft.com/office/powerpoint/2010/main" val="1690266810"/>
+      </p:ext>
+    </p:extLst>
+  </p:cSld>
+  <p:clrMapOvr>
+    <a:masterClrMapping/>
+  </p:clrMapOvr>
+</p:sld>
+</file>
+
+<file path=ppt/slides/slide7.xml><?xml version="1.0" encoding="utf-8"?>
+<p:sld xmlns:a="http://schemas.openxmlformats.org/drawingml/2006/main" xmlns:r="http://schemas.openxmlformats.org/officeDocument/2006/relationships" xmlns:p="http://schemas.openxmlformats.org/presentationml/2006/main">
+  <p:cSld>
+    <p:spTree>
+      <p:nvGrpSpPr>
+        <p:cNvPr id="1" name="">
+          <a:extLst>
+            <a:ext uri="{FF2B5EF4-FFF2-40B4-BE49-F238E27FC236}">
               <a16:creationId xmlns:a16="http://schemas.microsoft.com/office/drawing/2014/main" id="{530B49FF-CBDE-04DA-B558-32DE6164E528}"/>
             </a:ext>
           </a:extLst>
@@ -30978,7 +32584,7 @@
 </p:sld>
 </file>
 
-<file path=ppt/slides/slide7.xml><?xml version="1.0" encoding="utf-8"?>
+<file path=ppt/slides/slide8.xml><?xml version="1.0" encoding="utf-8"?>
 <p:sld xmlns:a="http://schemas.openxmlformats.org/drawingml/2006/main" xmlns:r="http://schemas.openxmlformats.org/officeDocument/2006/relationships" xmlns:p="http://schemas.openxmlformats.org/presentationml/2006/main">
   <p:cSld>
     <p:spTree>
@@ -31118,7 +32724,7 @@
 </p:sld>
 </file>
 
-<file path=ppt/slides/slide8.xml><?xml version="1.0" encoding="utf-8"?>
+<file path=ppt/slides/slide9.xml><?xml version="1.0" encoding="utf-8"?>
 <p:sld xmlns:a="http://schemas.openxmlformats.org/drawingml/2006/main" xmlns:r="http://schemas.openxmlformats.org/officeDocument/2006/relationships" xmlns:p="http://schemas.openxmlformats.org/presentationml/2006/main">
   <p:cSld>
     <p:spTree>
@@ -31268,139 +32874,6 @@
     <p:extLst>
       <p:ext uri="{BB962C8B-B14F-4D97-AF65-F5344CB8AC3E}">
         <p14:creationId xmlns:p14="http://schemas.microsoft.com/office/powerpoint/2010/main" val="3024392868"/>
-      </p:ext>
-    </p:extLst>
-  </p:cSld>
-  <p:clrMapOvr>
-    <a:masterClrMapping/>
-  </p:clrMapOvr>
-</p:sld>
-</file>
-
-<file path=ppt/slides/slide9.xml><?xml version="1.0" encoding="utf-8"?>
-<p:sld xmlns:a="http://schemas.openxmlformats.org/drawingml/2006/main" xmlns:r="http://schemas.openxmlformats.org/officeDocument/2006/relationships" xmlns:p="http://schemas.openxmlformats.org/presentationml/2006/main">
-  <p:cSld>
-    <p:spTree>
-      <p:nvGrpSpPr>
-        <p:cNvPr id="1" name="">
-          <a:extLst>
-            <a:ext uri="{FF2B5EF4-FFF2-40B4-BE49-F238E27FC236}">
-              <a16:creationId xmlns:a16="http://schemas.microsoft.com/office/drawing/2014/main" id="{2D937850-13E5-EBAF-CEC8-92E441C446D1}"/>
-            </a:ext>
-          </a:extLst>
-        </p:cNvPr>
-        <p:cNvGrpSpPr/>
-        <p:nvPr/>
-      </p:nvGrpSpPr>
-      <p:grpSpPr>
-        <a:xfrm>
-          <a:off x="0" y="0"/>
-          <a:ext cx="0" cy="0"/>
-          <a:chOff x="0" y="0"/>
-          <a:chExt cx="0" cy="0"/>
-        </a:xfrm>
-      </p:grpSpPr>
-      <p:sp>
-        <p:nvSpPr>
-          <p:cNvPr id="2" name="Title 1">
-            <a:extLst>
-              <a:ext uri="{FF2B5EF4-FFF2-40B4-BE49-F238E27FC236}">
-                <a16:creationId xmlns:a16="http://schemas.microsoft.com/office/drawing/2014/main" id="{39E5F5F7-B28F-DAA6-F49F-3AE53A6520E8}"/>
-              </a:ext>
-            </a:extLst>
-          </p:cNvPr>
-          <p:cNvSpPr>
-            <a:spLocks noGrp="1"/>
-          </p:cNvSpPr>
-          <p:nvPr>
-            <p:ph type="title"/>
-          </p:nvPr>
-        </p:nvSpPr>
-        <p:spPr/>
-        <p:txBody>
-          <a:bodyPr anchor="b">
-            <a:normAutofit/>
-          </a:bodyPr>
-          <a:lstStyle/>
-          <a:p>
-            <a:r>
-              <a:rPr lang="en-US" dirty="0"/>
-              <a:t>PICTURE PLACEHOLDERS</a:t>
-            </a:r>
-          </a:p>
-        </p:txBody>
-      </p:sp>
-      <p:sp>
-        <p:nvSpPr>
-          <p:cNvPr id="3" name="Content Placeholder 2">
-            <a:extLst>
-              <a:ext uri="{FF2B5EF4-FFF2-40B4-BE49-F238E27FC236}">
-                <a16:creationId xmlns:a16="http://schemas.microsoft.com/office/drawing/2014/main" id="{D5FEECAD-6B1D-40D1-71D2-5DF58B3B0D50}"/>
-              </a:ext>
-            </a:extLst>
-          </p:cNvPr>
-          <p:cNvSpPr>
-            <a:spLocks noGrp="1"/>
-          </p:cNvSpPr>
-          <p:nvPr>
-            <p:ph idx="1"/>
-          </p:nvPr>
-        </p:nvSpPr>
-        <p:spPr/>
-        <p:txBody>
-          <a:bodyPr anchor="t">
-            <a:normAutofit/>
-          </a:bodyPr>
-          <a:lstStyle/>
-          <a:p>
-            <a:r>
-              <a:rPr lang="en-US" dirty="0"/>
-              <a:t>To add a photo, click on the icon in the picture placeholder area</a:t>
-            </a:r>
-          </a:p>
-          <a:p>
-            <a:r>
-              <a:rPr lang="en-US" dirty="0"/>
-              <a:t>If you are inserting an image with a transparent background — such as a .png file — you can remove the light grey background in the picture placeholder. Select the picture frame, go to the ”Home” tab, select “Shape Fill.” Select “No Fill” from the drop-down menu.</a:t>
-            </a:r>
-          </a:p>
-          <a:p>
-            <a:r>
-              <a:rPr lang="en-US" dirty="0"/>
-              <a:t>You may additional photos to each slide manually</a:t>
-            </a:r>
-          </a:p>
-        </p:txBody>
-      </p:sp>
-      <p:sp>
-        <p:nvSpPr>
-          <p:cNvPr id="13" name="Picture Placeholder 3">
-            <a:extLst>
-              <a:ext uri="{FF2B5EF4-FFF2-40B4-BE49-F238E27FC236}">
-                <a16:creationId xmlns:a16="http://schemas.microsoft.com/office/drawing/2014/main" id="{7CC0CA8C-F189-AEE3-404A-A572B9D181ED}"/>
-              </a:ext>
-            </a:extLst>
-          </p:cNvPr>
-          <p:cNvSpPr>
-            <a:spLocks noGrp="1"/>
-          </p:cNvSpPr>
-          <p:nvPr>
-            <p:ph type="pic" sz="quarter" idx="13"/>
-          </p:nvPr>
-        </p:nvSpPr>
-        <p:spPr/>
-        <p:txBody>
-          <a:bodyPr/>
-          <a:lstStyle/>
-          <a:p>
-            <a:endParaRPr lang="en-US"/>
-          </a:p>
-        </p:txBody>
-      </p:sp>
-    </p:spTree>
-    <p:extLst>
-      <p:ext uri="{BB962C8B-B14F-4D97-AF65-F5344CB8AC3E}">
-        <p14:creationId xmlns:p14="http://schemas.microsoft.com/office/powerpoint/2010/main" val="1225507778"/>
       </p:ext>
     </p:extLst>
   </p:cSld>
@@ -32608,4 +34081,299 @@
     </a:ext>
   </a:extLst>
 </a:theme>
+</file>
+
+<file path=ppt/theme/theme5.xml><?xml version="1.0" encoding="utf-8"?>
+<a:theme xmlns:a="http://schemas.openxmlformats.org/drawingml/2006/main" name="Office Theme">
+  <a:themeElements>
+    <a:clrScheme name="Office">
+      <a:dk1>
+        <a:sysClr val="windowText" lastClr="000000"/>
+      </a:dk1>
+      <a:lt1>
+        <a:sysClr val="window" lastClr="FFFFFF"/>
+      </a:lt1>
+      <a:dk2>
+        <a:srgbClr val="44546A"/>
+      </a:dk2>
+      <a:lt2>
+        <a:srgbClr val="E7E6E6"/>
+      </a:lt2>
+      <a:accent1>
+        <a:srgbClr val="4472C4"/>
+      </a:accent1>
+      <a:accent2>
+        <a:srgbClr val="ED7D31"/>
+      </a:accent2>
+      <a:accent3>
+        <a:srgbClr val="A5A5A5"/>
+      </a:accent3>
+      <a:accent4>
+        <a:srgbClr val="FFC000"/>
+      </a:accent4>
+      <a:accent5>
+        <a:srgbClr val="5B9BD5"/>
+      </a:accent5>
+      <a:accent6>
+        <a:srgbClr val="70AD47"/>
+      </a:accent6>
+      <a:hlink>
+        <a:srgbClr val="0563C1"/>
+      </a:hlink>
+      <a:folHlink>
+        <a:srgbClr val="954F72"/>
+      </a:folHlink>
+    </a:clrScheme>
+    <a:fontScheme name="Office">
+      <a:majorFont>
+        <a:latin typeface="Calibri Light" panose="020F0302020204030204"/>
+        <a:ea typeface=""/>
+        <a:cs typeface=""/>
+        <a:font script="Jpan" typeface="游ゴシック Light"/>
+        <a:font script="Hang" typeface="맑은 고딕"/>
+        <a:font script="Hans" typeface="等线 Light"/>
+        <a:font script="Hant" typeface="新細明體"/>
+        <a:font script="Arab" typeface="Times New Roman"/>
+        <a:font script="Hebr" typeface="Times New Roman"/>
+        <a:font script="Thai" typeface="Angsana New"/>
+        <a:font script="Ethi" typeface="Nyala"/>
+        <a:font script="Beng" typeface="Vrinda"/>
+        <a:font script="Gujr" typeface="Shruti"/>
+        <a:font script="Khmr" typeface="MoolBoran"/>
+        <a:font script="Knda" typeface="Tunga"/>
+        <a:font script="Guru" typeface="Raavi"/>
+        <a:font script="Cans" typeface="Euphemia"/>
+        <a:font script="Cher" typeface="Plantagenet Cherokee"/>
+        <a:font script="Yiii" typeface="Microsoft Yi Baiti"/>
+        <a:font script="Tibt" typeface="Microsoft Himalaya"/>
+        <a:font script="Thaa" typeface="MV Boli"/>
+        <a:font script="Deva" typeface="Mangal"/>
+        <a:font script="Telu" typeface="Gautami"/>
+        <a:font script="Taml" typeface="Latha"/>
+        <a:font script="Syrc" typeface="Estrangelo Edessa"/>
+        <a:font script="Orya" typeface="Kalinga"/>
+        <a:font script="Mlym" typeface="Kartika"/>
+        <a:font script="Laoo" typeface="DokChampa"/>
+        <a:font script="Sinh" typeface="Iskoola Pota"/>
+        <a:font script="Mong" typeface="Mongolian Baiti"/>
+        <a:font script="Viet" typeface="Times New Roman"/>
+        <a:font script="Uigh" typeface="Microsoft Uighur"/>
+        <a:font script="Geor" typeface="Sylfaen"/>
+        <a:font script="Armn" typeface="Arial"/>
+        <a:font script="Bugi" typeface="Leelawadee UI"/>
+        <a:font script="Bopo" typeface="Microsoft JhengHei"/>
+        <a:font script="Java" typeface="Javanese Text"/>
+        <a:font script="Lisu" typeface="Segoe UI"/>
+        <a:font script="Mymr" typeface="Myanmar Text"/>
+        <a:font script="Nkoo" typeface="Ebrima"/>
+        <a:font script="Olck" typeface="Nirmala UI"/>
+        <a:font script="Osma" typeface="Ebrima"/>
+        <a:font script="Phag" typeface="Phagspa"/>
+        <a:font script="Syrn" typeface="Estrangelo Edessa"/>
+        <a:font script="Syrj" typeface="Estrangelo Edessa"/>
+        <a:font script="Syre" typeface="Estrangelo Edessa"/>
+        <a:font script="Sora" typeface="Nirmala UI"/>
+        <a:font script="Tale" typeface="Microsoft Tai Le"/>
+        <a:font script="Talu" typeface="Microsoft New Tai Lue"/>
+        <a:font script="Tfng" typeface="Ebrima"/>
+      </a:majorFont>
+      <a:minorFont>
+        <a:latin typeface="Calibri" panose="020F0502020204030204"/>
+        <a:ea typeface=""/>
+        <a:cs typeface=""/>
+        <a:font script="Jpan" typeface="游ゴシック"/>
+        <a:font script="Hang" typeface="맑은 고딕"/>
+        <a:font script="Hans" typeface="等线"/>
+        <a:font script="Hant" typeface="新細明體"/>
+        <a:font script="Arab" typeface="Arial"/>
+        <a:font script="Hebr" typeface="Arial"/>
+        <a:font script="Thai" typeface="Cordia New"/>
+        <a:font script="Ethi" typeface="Nyala"/>
+        <a:font script="Beng" typeface="Vrinda"/>
+        <a:font script="Gujr" typeface="Shruti"/>
+        <a:font script="Khmr" typeface="DaunPenh"/>
+        <a:font script="Knda" typeface="Tunga"/>
+        <a:font script="Guru" typeface="Raavi"/>
+        <a:font script="Cans" typeface="Euphemia"/>
+        <a:font script="Cher" typeface="Plantagenet Cherokee"/>
+        <a:font script="Yiii" typeface="Microsoft Yi Baiti"/>
+        <a:font script="Tibt" typeface="Microsoft Himalaya"/>
+        <a:font script="Thaa" typeface="MV Boli"/>
+        <a:font script="Deva" typeface="Mangal"/>
+        <a:font script="Telu" typeface="Gautami"/>
+        <a:font script="Taml" typeface="Latha"/>
+        <a:font script="Syrc" typeface="Estrangelo Edessa"/>
+        <a:font script="Orya" typeface="Kalinga"/>
+        <a:font script="Mlym" typeface="Kartika"/>
+        <a:font script="Laoo" typeface="DokChampa"/>
+        <a:font script="Sinh" typeface="Iskoola Pota"/>
+        <a:font script="Mong" typeface="Mongolian Baiti"/>
+        <a:font script="Viet" typeface="Arial"/>
+        <a:font script="Uigh" typeface="Microsoft Uighur"/>
+        <a:font script="Geor" typeface="Sylfaen"/>
+        <a:font script="Armn" typeface="Arial"/>
+        <a:font script="Bugi" typeface="Leelawadee UI"/>
+        <a:font script="Bopo" typeface="Microsoft JhengHei"/>
+        <a:font script="Java" typeface="Javanese Text"/>
+        <a:font script="Lisu" typeface="Segoe UI"/>
+        <a:font script="Mymr" typeface="Myanmar Text"/>
+        <a:font script="Nkoo" typeface="Ebrima"/>
+        <a:font script="Olck" typeface="Nirmala UI"/>
+        <a:font script="Osma" typeface="Ebrima"/>
+        <a:font script="Phag" typeface="Phagspa"/>
+        <a:font script="Syrn" typeface="Estrangelo Edessa"/>
+        <a:font script="Syrj" typeface="Estrangelo Edessa"/>
+        <a:font script="Syre" typeface="Estrangelo Edessa"/>
+        <a:font script="Sora" typeface="Nirmala UI"/>
+        <a:font script="Tale" typeface="Microsoft Tai Le"/>
+        <a:font script="Talu" typeface="Microsoft New Tai Lue"/>
+        <a:font script="Tfng" typeface="Ebrima"/>
+      </a:minorFont>
+    </a:fontScheme>
+    <a:fmtScheme name="Office">
+      <a:fillStyleLst>
+        <a:solidFill>
+          <a:schemeClr val="phClr"/>
+        </a:solidFill>
+        <a:gradFill rotWithShape="1">
+          <a:gsLst>
+            <a:gs pos="0">
+              <a:schemeClr val="phClr">
+                <a:lumMod val="110000"/>
+                <a:satMod val="105000"/>
+                <a:tint val="67000"/>
+              </a:schemeClr>
+            </a:gs>
+            <a:gs pos="50000">
+              <a:schemeClr val="phClr">
+                <a:lumMod val="105000"/>
+                <a:satMod val="103000"/>
+                <a:tint val="73000"/>
+              </a:schemeClr>
+            </a:gs>
+            <a:gs pos="100000">
+              <a:schemeClr val="phClr">
+                <a:lumMod val="105000"/>
+                <a:satMod val="109000"/>
+                <a:tint val="81000"/>
+              </a:schemeClr>
+            </a:gs>
+          </a:gsLst>
+          <a:lin ang="5400000" scaled="0"/>
+        </a:gradFill>
+        <a:gradFill rotWithShape="1">
+          <a:gsLst>
+            <a:gs pos="0">
+              <a:schemeClr val="phClr">
+                <a:satMod val="103000"/>
+                <a:lumMod val="102000"/>
+                <a:tint val="94000"/>
+              </a:schemeClr>
+            </a:gs>
+            <a:gs pos="50000">
+              <a:schemeClr val="phClr">
+                <a:satMod val="110000"/>
+                <a:lumMod val="100000"/>
+                <a:shade val="100000"/>
+              </a:schemeClr>
+            </a:gs>
+            <a:gs pos="100000">
+              <a:schemeClr val="phClr">
+                <a:lumMod val="99000"/>
+                <a:satMod val="120000"/>
+                <a:shade val="78000"/>
+              </a:schemeClr>
+            </a:gs>
+          </a:gsLst>
+          <a:lin ang="5400000" scaled="0"/>
+        </a:gradFill>
+      </a:fillStyleLst>
+      <a:lnStyleLst>
+        <a:ln w="6350" cap="flat" cmpd="sng" algn="ctr">
+          <a:solidFill>
+            <a:schemeClr val="phClr"/>
+          </a:solidFill>
+          <a:prstDash val="solid"/>
+          <a:miter lim="800000"/>
+        </a:ln>
+        <a:ln w="12700" cap="flat" cmpd="sng" algn="ctr">
+          <a:solidFill>
+            <a:schemeClr val="phClr"/>
+          </a:solidFill>
+          <a:prstDash val="solid"/>
+          <a:miter lim="800000"/>
+        </a:ln>
+        <a:ln w="19050" cap="flat" cmpd="sng" algn="ctr">
+          <a:solidFill>
+            <a:schemeClr val="phClr"/>
+          </a:solidFill>
+          <a:prstDash val="solid"/>
+          <a:miter lim="800000"/>
+        </a:ln>
+      </a:lnStyleLst>
+      <a:effectStyleLst>
+        <a:effectStyle>
+          <a:effectLst/>
+        </a:effectStyle>
+        <a:effectStyle>
+          <a:effectLst/>
+        </a:effectStyle>
+        <a:effectStyle>
+          <a:effectLst>
+            <a:outerShdw blurRad="57150" dist="19050" dir="5400000" algn="ctr" rotWithShape="0">
+              <a:srgbClr val="000000">
+                <a:alpha val="63000"/>
+              </a:srgbClr>
+            </a:outerShdw>
+          </a:effectLst>
+        </a:effectStyle>
+      </a:effectStyleLst>
+      <a:bgFillStyleLst>
+        <a:solidFill>
+          <a:schemeClr val="phClr"/>
+        </a:solidFill>
+        <a:solidFill>
+          <a:schemeClr val="phClr">
+            <a:tint val="95000"/>
+            <a:satMod val="170000"/>
+          </a:schemeClr>
+        </a:solidFill>
+        <a:gradFill rotWithShape="1">
+          <a:gsLst>
+            <a:gs pos="0">
+              <a:schemeClr val="phClr">
+                <a:tint val="93000"/>
+                <a:satMod val="150000"/>
+                <a:shade val="98000"/>
+                <a:lumMod val="102000"/>
+              </a:schemeClr>
+            </a:gs>
+            <a:gs pos="50000">
+              <a:schemeClr val="phClr">
+                <a:tint val="98000"/>
+                <a:satMod val="130000"/>
+                <a:shade val="90000"/>
+                <a:lumMod val="103000"/>
+              </a:schemeClr>
+            </a:gs>
+            <a:gs pos="100000">
+              <a:schemeClr val="phClr">
+                <a:shade val="63000"/>
+                <a:satMod val="120000"/>
+              </a:schemeClr>
+            </a:gs>
+          </a:gsLst>
+          <a:lin ang="5400000" scaled="0"/>
+        </a:gradFill>
+      </a:bgFillStyleLst>
+    </a:fmtScheme>
+  </a:themeElements>
+  <a:objectDefaults/>
+  <a:extraClrSchemeLst/>
+  <a:extLst>
+    <a:ext uri="{05A4C25C-085E-4340-85A3-A5531E510DB2}">
+      <thm15:themeFamily xmlns:thm15="http://schemas.microsoft.com/office/thememl/2012/main" name="Office Theme" id="{62F939B6-93AF-4DB8-9C6B-D6C7DFDC589F}" vid="{4A3C46E8-61CC-4603-A589-7422A47A8E4A}"/>
+    </a:ext>
+  </a:extLst>
+</a:theme>
 </file>
</xml_diff>